<commit_message>
small fixes lesson 4
</commit_message>
<xml_diff>
--- a/Lesson slides/Unit 4 - Binary trees.pptx
+++ b/Lesson slides/Unit 4 - Binary trees.pptx
@@ -1,6 +1,6 @@
 
 <file path=ppt/presentation.xml><?xml version="1.0" encoding="utf-8"?>
-<p:presentation xmlns:a="http://schemas.openxmlformats.org/drawingml/2006/main" xmlns:r="http://schemas.openxmlformats.org/officeDocument/2006/relationships" xmlns:p="http://schemas.openxmlformats.org/presentationml/2006/main" saveSubsetFonts="1">
+<p:presentation xmlns:a="http://schemas.openxmlformats.org/drawingml/2006/main" xmlns:r="http://schemas.openxmlformats.org/officeDocument/2006/relationships" xmlns:p="http://schemas.openxmlformats.org/presentationml/2006/main" showSpecialPlsOnTitleSld="0" saveSubsetFonts="1">
   <p:sldMasterIdLst>
     <p:sldMasterId id="2147483660" r:id="rId1"/>
   </p:sldMasterIdLst>
@@ -252,7 +252,7 @@
           <a:p>
             <a:fld id="{F58F4026-CF18-472A-B4DE-F2B442FB8B54}" type="datetimeFigureOut">
               <a:rPr lang="en-GB" smtClean="0"/>
-              <a:t>08/12/2016</a:t>
+              <a:t>11/12/2017</a:t>
             </a:fld>
             <a:endParaRPr lang="en-GB"/>
           </a:p>
@@ -411,7 +411,7 @@
           <a:p>
             <a:fld id="{45D2D7CA-6CE3-45DF-8A30-AE9A6D67911F}" type="slidenum">
               <a:rPr lang="en-GB" smtClean="0"/>
-              <a:t>‹#›</a:t>
+              <a:t>‹nr.›</a:t>
             </a:fld>
             <a:endParaRPr lang="en-GB"/>
           </a:p>
@@ -521,6 +521,90 @@
 </file>
 
 <file path=ppt/notesSlides/notesSlide1.xml><?xml version="1.0" encoding="utf-8"?>
+<p:notes xmlns:a="http://schemas.openxmlformats.org/drawingml/2006/main" xmlns:r="http://schemas.openxmlformats.org/officeDocument/2006/relationships" xmlns:p="http://schemas.openxmlformats.org/presentationml/2006/main">
+  <p:cSld>
+    <p:spTree>
+      <p:nvGrpSpPr>
+        <p:cNvPr id="1" name=""/>
+        <p:cNvGrpSpPr/>
+        <p:nvPr/>
+      </p:nvGrpSpPr>
+      <p:grpSpPr>
+        <a:xfrm>
+          <a:off x="0" y="0"/>
+          <a:ext cx="0" cy="0"/>
+          <a:chOff x="0" y="0"/>
+          <a:chExt cx="0" cy="0"/>
+        </a:xfrm>
+      </p:grpSpPr>
+      <p:sp>
+        <p:nvSpPr>
+          <p:cNvPr id="2" name="Tijdelijke aanduiding voor dia-afbeelding 1"/>
+          <p:cNvSpPr>
+            <a:spLocks noGrp="1" noRot="1" noChangeAspect="1"/>
+          </p:cNvSpPr>
+          <p:nvPr>
+            <p:ph type="sldImg"/>
+          </p:nvPr>
+        </p:nvSpPr>
+        <p:spPr/>
+      </p:sp>
+      <p:sp>
+        <p:nvSpPr>
+          <p:cNvPr id="3" name="Tijdelijke aanduiding voor notities 2"/>
+          <p:cNvSpPr>
+            <a:spLocks noGrp="1"/>
+          </p:cNvSpPr>
+          <p:nvPr>
+            <p:ph type="body" idx="1"/>
+          </p:nvPr>
+        </p:nvSpPr>
+        <p:spPr/>
+        <p:txBody>
+          <a:bodyPr/>
+          <a:lstStyle/>
+          <a:p>
+            <a:endParaRPr lang="en-US"/>
+          </a:p>
+        </p:txBody>
+      </p:sp>
+      <p:sp>
+        <p:nvSpPr>
+          <p:cNvPr id="4" name="Tijdelijke aanduiding voor dianummer 3"/>
+          <p:cNvSpPr>
+            <a:spLocks noGrp="1"/>
+          </p:cNvSpPr>
+          <p:nvPr>
+            <p:ph type="sldNum" sz="quarter" idx="10"/>
+          </p:nvPr>
+        </p:nvSpPr>
+        <p:spPr/>
+        <p:txBody>
+          <a:bodyPr/>
+          <a:lstStyle/>
+          <a:p>
+            <a:fld id="{45D2D7CA-6CE3-45DF-8A30-AE9A6D67911F}" type="slidenum">
+              <a:rPr lang="en-GB" smtClean="0"/>
+              <a:t>1</a:t>
+            </a:fld>
+            <a:endParaRPr lang="en-GB"/>
+          </a:p>
+        </p:txBody>
+      </p:sp>
+    </p:spTree>
+    <p:extLst>
+      <p:ext uri="{BB962C8B-B14F-4D97-AF65-F5344CB8AC3E}">
+        <p14:creationId xmlns:p14="http://schemas.microsoft.com/office/powerpoint/2010/main" val="892741774"/>
+      </p:ext>
+    </p:extLst>
+  </p:cSld>
+  <p:clrMapOvr>
+    <a:masterClrMapping/>
+  </p:clrMapOvr>
+</p:notes>
+</file>
+
+<file path=ppt/notesSlides/notesSlide2.xml><?xml version="1.0" encoding="utf-8"?>
 <p:notes xmlns:a="http://schemas.openxmlformats.org/drawingml/2006/main" xmlns:r="http://schemas.openxmlformats.org/officeDocument/2006/relationships" xmlns:p="http://schemas.openxmlformats.org/presentationml/2006/main">
   <p:cSld>
     <p:spTree>
@@ -1328,7 +1412,7 @@
           <a:bodyPr/>
           <a:lstStyle/>
           <a:p>
-            <a:fld id="{BE9BA27D-8BFA-460E-8BA3-6F3E3102DCB6}" type="datetime1">
+            <a:fld id="{1C7C84E7-E7CA-4158-8FE0-D22255C9914B}" type="datetime1">
               <a:rPr lang="en-GB" smtClean="0">
                 <a:solidFill>
                   <a:prstClr val="black">
@@ -1336,7 +1420,7 @@
                   </a:prstClr>
                 </a:solidFill>
               </a:rPr>
-              <a:t>08/12/2016</a:t>
+              <a:t>11/12/2017</a:t>
             </a:fld>
             <a:endParaRPr lang="en-GB">
               <a:solidFill>
@@ -1364,14 +1448,14 @@
           <a:lstStyle/>
           <a:p>
             <a:r>
-              <a:rPr lang="it-IT">
+              <a:rPr lang="it-IT" smtClean="0">
                 <a:solidFill>
                   <a:prstClr val="black">
                     <a:tint val="75000"/>
                   </a:prstClr>
                 </a:solidFill>
               </a:rPr>
-              <a:t>INFDEV026A - G. Costantini, F. Di Giacomo, G. Maggiore</a:t>
+              <a:t>INFDEV036A - G. Costantini, F. Di Giacomo</a:t>
             </a:r>
             <a:endParaRPr lang="en-GB">
               <a:solidFill>
@@ -1407,7 +1491,7 @@
                 </a:solidFill>
               </a:rPr>
               <a:pPr/>
-              <a:t>‹#›</a:t>
+              <a:t>‹nr.›</a:t>
             </a:fld>
             <a:endParaRPr lang="en-GB">
               <a:solidFill>
@@ -1620,7 +1704,7 @@
           <a:bodyPr/>
           <a:lstStyle/>
           <a:p>
-            <a:fld id="{BE25CA4F-360E-4261-A8B3-40933D2276E4}" type="datetime1">
+            <a:fld id="{58FDB3DF-C838-4EB8-9E5C-B8F2599A6F1E}" type="datetime1">
               <a:rPr lang="en-GB" smtClean="0">
                 <a:solidFill>
                   <a:prstClr val="black">
@@ -1628,7 +1712,7 @@
                   </a:prstClr>
                 </a:solidFill>
               </a:rPr>
-              <a:t>08/12/2016</a:t>
+              <a:t>11/12/2017</a:t>
             </a:fld>
             <a:endParaRPr lang="en-GB">
               <a:solidFill>
@@ -1656,14 +1740,14 @@
           <a:lstStyle/>
           <a:p>
             <a:r>
-              <a:rPr lang="it-IT">
+              <a:rPr lang="it-IT" smtClean="0">
                 <a:solidFill>
                   <a:prstClr val="black">
                     <a:tint val="75000"/>
                   </a:prstClr>
                 </a:solidFill>
               </a:rPr>
-              <a:t>INFDEV026A - G. Costantini, F. Di Giacomo, G. Maggiore</a:t>
+              <a:t>INFDEV036A - G. Costantini, F. Di Giacomo</a:t>
             </a:r>
             <a:endParaRPr lang="en-GB">
               <a:solidFill>
@@ -1699,7 +1783,7 @@
                 </a:solidFill>
               </a:rPr>
               <a:pPr/>
-              <a:t>‹#›</a:t>
+              <a:t>‹nr.›</a:t>
             </a:fld>
             <a:endParaRPr lang="en-GB">
               <a:solidFill>
@@ -1975,7 +2059,7 @@
           <a:bodyPr/>
           <a:lstStyle/>
           <a:p>
-            <a:fld id="{BF6F05FC-4CA9-4B5A-A36A-9D7E56A82F41}" type="datetime1">
+            <a:fld id="{60A78436-067E-40BC-B293-59AC96B41F20}" type="datetime1">
               <a:rPr lang="en-GB" smtClean="0">
                 <a:solidFill>
                   <a:prstClr val="black">
@@ -1983,7 +2067,7 @@
                   </a:prstClr>
                 </a:solidFill>
               </a:rPr>
-              <a:t>08/12/2016</a:t>
+              <a:t>11/12/2017</a:t>
             </a:fld>
             <a:endParaRPr lang="en-GB">
               <a:solidFill>
@@ -2011,14 +2095,14 @@
           <a:lstStyle/>
           <a:p>
             <a:r>
-              <a:rPr lang="it-IT">
+              <a:rPr lang="it-IT" smtClean="0">
                 <a:solidFill>
                   <a:prstClr val="black">
                     <a:tint val="75000"/>
                   </a:prstClr>
                 </a:solidFill>
               </a:rPr>
-              <a:t>INFDEV026A - G. Costantini, F. Di Giacomo, G. Maggiore</a:t>
+              <a:t>INFDEV036A - G. Costantini, F. Di Giacomo</a:t>
             </a:r>
             <a:endParaRPr lang="en-GB">
               <a:solidFill>
@@ -2054,7 +2138,7 @@
                 </a:solidFill>
               </a:rPr>
               <a:pPr/>
-              <a:t>‹#›</a:t>
+              <a:t>‹nr.›</a:t>
             </a:fld>
             <a:endParaRPr lang="en-GB">
               <a:solidFill>
@@ -2339,7 +2423,7 @@
           <a:bodyPr/>
           <a:lstStyle/>
           <a:p>
-            <a:fld id="{260472F4-767A-4637-A184-B2427A3A03C4}" type="datetime1">
+            <a:fld id="{B40C6B5F-EF04-4182-95BB-7FC1493D03AB}" type="datetime1">
               <a:rPr lang="en-GB" smtClean="0">
                 <a:solidFill>
                   <a:prstClr val="black">
@@ -2347,7 +2431,7 @@
                   </a:prstClr>
                 </a:solidFill>
               </a:rPr>
-              <a:t>08/12/2016</a:t>
+              <a:t>11/12/2017</a:t>
             </a:fld>
             <a:endParaRPr lang="en-GB">
               <a:solidFill>
@@ -2375,14 +2459,14 @@
           <a:lstStyle/>
           <a:p>
             <a:r>
-              <a:rPr lang="it-IT">
+              <a:rPr lang="it-IT" smtClean="0">
                 <a:solidFill>
                   <a:prstClr val="black">
                     <a:tint val="75000"/>
                   </a:prstClr>
                 </a:solidFill>
               </a:rPr>
-              <a:t>INFDEV026A - G. Costantini, F. Di Giacomo, G. Maggiore</a:t>
+              <a:t>INFDEV036A - G. Costantini, F. Di Giacomo</a:t>
             </a:r>
             <a:endParaRPr lang="en-GB">
               <a:solidFill>
@@ -2418,7 +2502,7 @@
                 </a:solidFill>
               </a:rPr>
               <a:pPr/>
-              <a:t>‹#›</a:t>
+              <a:t>‹nr.›</a:t>
             </a:fld>
             <a:endParaRPr lang="en-GB">
               <a:solidFill>
@@ -2694,7 +2778,7 @@
           <a:bodyPr/>
           <a:lstStyle/>
           <a:p>
-            <a:fld id="{FEE79C78-290A-4D99-98B5-33AF968C75C9}" type="datetime1">
+            <a:fld id="{01A00A77-2F69-49A9-8102-D62D1130D354}" type="datetime1">
               <a:rPr lang="en-GB" smtClean="0">
                 <a:solidFill>
                   <a:prstClr val="black">
@@ -2702,7 +2786,7 @@
                   </a:prstClr>
                 </a:solidFill>
               </a:rPr>
-              <a:t>08/12/2016</a:t>
+              <a:t>11/12/2017</a:t>
             </a:fld>
             <a:endParaRPr lang="en-GB">
               <a:solidFill>
@@ -2730,14 +2814,14 @@
           <a:lstStyle/>
           <a:p>
             <a:r>
-              <a:rPr lang="it-IT">
+              <a:rPr lang="it-IT" smtClean="0">
                 <a:solidFill>
                   <a:prstClr val="black">
                     <a:tint val="75000"/>
                   </a:prstClr>
                 </a:solidFill>
               </a:rPr>
-              <a:t>INFDEV026A - G. Costantini, F. Di Giacomo, G. Maggiore</a:t>
+              <a:t>INFDEV036A - G. Costantini, F. Di Giacomo</a:t>
             </a:r>
             <a:endParaRPr lang="en-GB">
               <a:solidFill>
@@ -2773,7 +2857,7 @@
                 </a:solidFill>
               </a:rPr>
               <a:pPr/>
-              <a:t>‹#›</a:t>
+              <a:t>‹nr.›</a:t>
             </a:fld>
             <a:endParaRPr lang="en-GB">
               <a:solidFill>
@@ -3118,7 +3202,7 @@
           <a:bodyPr/>
           <a:lstStyle/>
           <a:p>
-            <a:fld id="{2311C1BD-1C23-4258-A846-D71F91412418}" type="datetime1">
+            <a:fld id="{7F80A4EF-F47F-41C5-B5FC-B9A604D46F95}" type="datetime1">
               <a:rPr lang="en-GB" smtClean="0">
                 <a:solidFill>
                   <a:prstClr val="black">
@@ -3126,7 +3210,7 @@
                   </a:prstClr>
                 </a:solidFill>
               </a:rPr>
-              <a:t>08/12/2016</a:t>
+              <a:t>11/12/2017</a:t>
             </a:fld>
             <a:endParaRPr lang="en-GB">
               <a:solidFill>
@@ -3154,14 +3238,14 @@
           <a:lstStyle/>
           <a:p>
             <a:r>
-              <a:rPr lang="it-IT">
+              <a:rPr lang="it-IT" smtClean="0">
                 <a:solidFill>
                   <a:prstClr val="black">
                     <a:tint val="75000"/>
                   </a:prstClr>
                 </a:solidFill>
               </a:rPr>
-              <a:t>INFDEV026A - G. Costantini, F. Di Giacomo, G. Maggiore</a:t>
+              <a:t>INFDEV036A - G. Costantini, F. Di Giacomo</a:t>
             </a:r>
             <a:endParaRPr lang="en-GB">
               <a:solidFill>
@@ -3197,7 +3281,7 @@
                 </a:solidFill>
               </a:rPr>
               <a:pPr/>
-              <a:t>‹#›</a:t>
+              <a:t>‹nr.›</a:t>
             </a:fld>
             <a:endParaRPr lang="en-GB">
               <a:solidFill>
@@ -3329,7 +3413,7 @@
           <a:bodyPr/>
           <a:lstStyle/>
           <a:p>
-            <a:fld id="{93976ACC-315B-4D1F-9BB1-1D6AB4BB4087}" type="datetime1">
+            <a:fld id="{C86562C7-0AB7-42F6-B5EE-CE8779F2599C}" type="datetime1">
               <a:rPr lang="en-GB" smtClean="0">
                 <a:solidFill>
                   <a:prstClr val="black">
@@ -3337,7 +3421,7 @@
                   </a:prstClr>
                 </a:solidFill>
               </a:rPr>
-              <a:t>08/12/2016</a:t>
+              <a:t>11/12/2017</a:t>
             </a:fld>
             <a:endParaRPr lang="en-GB">
               <a:solidFill>
@@ -3365,14 +3449,14 @@
           <a:lstStyle/>
           <a:p>
             <a:r>
-              <a:rPr lang="it-IT">
+              <a:rPr lang="it-IT" smtClean="0">
                 <a:solidFill>
                   <a:prstClr val="black">
                     <a:tint val="75000"/>
                   </a:prstClr>
                 </a:solidFill>
               </a:rPr>
-              <a:t>INFDEV026A - G. Costantini, F. Di Giacomo, G. Maggiore</a:t>
+              <a:t>INFDEV036A - G. Costantini, F. Di Giacomo</a:t>
             </a:r>
             <a:endParaRPr lang="en-GB">
               <a:solidFill>
@@ -3408,7 +3492,7 @@
                 </a:solidFill>
               </a:rPr>
               <a:pPr/>
-              <a:t>‹#›</a:t>
+              <a:t>‹nr.›</a:t>
             </a:fld>
             <a:endParaRPr lang="en-GB">
               <a:solidFill>
@@ -3550,7 +3634,7 @@
           <a:bodyPr/>
           <a:lstStyle/>
           <a:p>
-            <a:fld id="{27062A41-2395-4CC7-AD72-3BFBF5833E3C}" type="datetime1">
+            <a:fld id="{B5BA90C3-D6BA-4A0E-999D-EE5DCC07A82A}" type="datetime1">
               <a:rPr lang="en-GB" smtClean="0">
                 <a:solidFill>
                   <a:prstClr val="black">
@@ -3558,7 +3642,7 @@
                   </a:prstClr>
                 </a:solidFill>
               </a:rPr>
-              <a:t>08/12/2016</a:t>
+              <a:t>11/12/2017</a:t>
             </a:fld>
             <a:endParaRPr lang="en-GB">
               <a:solidFill>
@@ -3586,14 +3670,14 @@
           <a:lstStyle/>
           <a:p>
             <a:r>
-              <a:rPr lang="it-IT">
+              <a:rPr lang="it-IT" smtClean="0">
                 <a:solidFill>
                   <a:prstClr val="black">
                     <a:tint val="75000"/>
                   </a:prstClr>
                 </a:solidFill>
               </a:rPr>
-              <a:t>INFDEV026A - G. Costantini, F. Di Giacomo, G. Maggiore</a:t>
+              <a:t>INFDEV036A - G. Costantini, F. Di Giacomo</a:t>
             </a:r>
             <a:endParaRPr lang="en-GB">
               <a:solidFill>
@@ -3629,7 +3713,7 @@
                 </a:solidFill>
               </a:rPr>
               <a:pPr/>
-              <a:t>‹#›</a:t>
+              <a:t>‹nr.›</a:t>
             </a:fld>
             <a:endParaRPr lang="en-GB">
               <a:solidFill>
@@ -3761,7 +3845,7 @@
           <a:bodyPr/>
           <a:lstStyle/>
           <a:p>
-            <a:fld id="{EDAC9601-7B6E-4908-8276-FA6A9494D1A7}" type="datetime1">
+            <a:fld id="{212FDF78-B452-4266-9E76-16FEA0F0AD00}" type="datetime1">
               <a:rPr lang="en-GB" smtClean="0">
                 <a:solidFill>
                   <a:prstClr val="black">
@@ -3769,7 +3853,7 @@
                   </a:prstClr>
                 </a:solidFill>
               </a:rPr>
-              <a:t>08/12/2016</a:t>
+              <a:t>11/12/2017</a:t>
             </a:fld>
             <a:endParaRPr lang="en-GB">
               <a:solidFill>
@@ -3797,14 +3881,14 @@
           <a:lstStyle/>
           <a:p>
             <a:r>
-              <a:rPr lang="it-IT">
+              <a:rPr lang="it-IT" smtClean="0">
                 <a:solidFill>
                   <a:prstClr val="black">
                     <a:tint val="75000"/>
                   </a:prstClr>
                 </a:solidFill>
               </a:rPr>
-              <a:t>INFDEV026A - G. Costantini, F. Di Giacomo, G. Maggiore</a:t>
+              <a:t>INFDEV036A - G. Costantini, F. Di Giacomo</a:t>
             </a:r>
             <a:endParaRPr lang="en-GB">
               <a:solidFill>
@@ -3840,7 +3924,7 @@
                 </a:solidFill>
               </a:rPr>
               <a:pPr/>
-              <a:t>‹#›</a:t>
+              <a:t>‹nr.›</a:t>
             </a:fld>
             <a:endParaRPr lang="en-GB">
               <a:solidFill>
@@ -4049,7 +4133,7 @@
           <a:bodyPr/>
           <a:lstStyle/>
           <a:p>
-            <a:fld id="{7A9AA382-B8AC-4F98-BD00-D64DC1DD9385}" type="datetime1">
+            <a:fld id="{12D2189A-F0EB-4799-8836-DEC3B10D9338}" type="datetime1">
               <a:rPr lang="en-GB" smtClean="0">
                 <a:solidFill>
                   <a:prstClr val="black">
@@ -4057,7 +4141,7 @@
                   </a:prstClr>
                 </a:solidFill>
               </a:rPr>
-              <a:t>08/12/2016</a:t>
+              <a:t>11/12/2017</a:t>
             </a:fld>
             <a:endParaRPr lang="en-GB">
               <a:solidFill>
@@ -4085,14 +4169,14 @@
           <a:lstStyle/>
           <a:p>
             <a:r>
-              <a:rPr lang="it-IT">
+              <a:rPr lang="it-IT" smtClean="0">
                 <a:solidFill>
                   <a:prstClr val="black">
                     <a:tint val="75000"/>
                   </a:prstClr>
                 </a:solidFill>
               </a:rPr>
-              <a:t>INFDEV026A - G. Costantini, F. Di Giacomo, G. Maggiore</a:t>
+              <a:t>INFDEV036A - G. Costantini, F. Di Giacomo</a:t>
             </a:r>
             <a:endParaRPr lang="en-GB">
               <a:solidFill>
@@ -4128,7 +4212,7 @@
                 </a:solidFill>
               </a:rPr>
               <a:pPr/>
-              <a:t>‹#›</a:t>
+              <a:t>‹nr.›</a:t>
             </a:fld>
             <a:endParaRPr lang="en-GB">
               <a:solidFill>
@@ -4322,7 +4406,7 @@
           <a:bodyPr/>
           <a:lstStyle/>
           <a:p>
-            <a:fld id="{F3D739F3-F049-4668-9751-BA05E0D64F44}" type="datetime1">
+            <a:fld id="{F91AEF8F-C0A9-4190-AB54-A4BC7BA822F5}" type="datetime1">
               <a:rPr lang="en-GB" smtClean="0">
                 <a:solidFill>
                   <a:prstClr val="black">
@@ -4330,7 +4414,7 @@
                   </a:prstClr>
                 </a:solidFill>
               </a:rPr>
-              <a:t>08/12/2016</a:t>
+              <a:t>11/12/2017</a:t>
             </a:fld>
             <a:endParaRPr lang="en-GB">
               <a:solidFill>
@@ -4358,14 +4442,14 @@
           <a:lstStyle/>
           <a:p>
             <a:r>
-              <a:rPr lang="it-IT">
+              <a:rPr lang="it-IT" smtClean="0">
                 <a:solidFill>
                   <a:prstClr val="black">
                     <a:tint val="75000"/>
                   </a:prstClr>
                 </a:solidFill>
               </a:rPr>
-              <a:t>INFDEV026A - G. Costantini, F. Di Giacomo, G. Maggiore</a:t>
+              <a:t>INFDEV036A - G. Costantini, F. Di Giacomo</a:t>
             </a:r>
             <a:endParaRPr lang="en-GB">
               <a:solidFill>
@@ -4401,7 +4485,7 @@
                 </a:solidFill>
               </a:rPr>
               <a:pPr/>
-              <a:t>‹#›</a:t>
+              <a:t>‹nr.›</a:t>
             </a:fld>
             <a:endParaRPr lang="en-GB">
               <a:solidFill>
@@ -4737,7 +4821,7 @@
           <a:bodyPr/>
           <a:lstStyle/>
           <a:p>
-            <a:fld id="{86E4F50E-E910-4BAD-9338-574B2337161C}" type="datetime1">
+            <a:fld id="{562B5624-56A0-4D0D-AA48-810B23A9C590}" type="datetime1">
               <a:rPr lang="en-GB" smtClean="0">
                 <a:solidFill>
                   <a:prstClr val="black">
@@ -4745,7 +4829,7 @@
                   </a:prstClr>
                 </a:solidFill>
               </a:rPr>
-              <a:t>08/12/2016</a:t>
+              <a:t>11/12/2017</a:t>
             </a:fld>
             <a:endParaRPr lang="en-GB">
               <a:solidFill>
@@ -4773,14 +4857,14 @@
           <a:lstStyle/>
           <a:p>
             <a:r>
-              <a:rPr lang="it-IT">
+              <a:rPr lang="it-IT" smtClean="0">
                 <a:solidFill>
                   <a:prstClr val="black">
                     <a:tint val="75000"/>
                   </a:prstClr>
                 </a:solidFill>
               </a:rPr>
-              <a:t>INFDEV026A - G. Costantini, F. Di Giacomo, G. Maggiore</a:t>
+              <a:t>INFDEV036A - G. Costantini, F. Di Giacomo</a:t>
             </a:r>
             <a:endParaRPr lang="en-GB">
               <a:solidFill>
@@ -4816,7 +4900,7 @@
                 </a:solidFill>
               </a:rPr>
               <a:pPr/>
-              <a:t>‹#›</a:t>
+              <a:t>‹nr.›</a:t>
             </a:fld>
             <a:endParaRPr lang="en-GB">
               <a:solidFill>
@@ -4901,7 +4985,7 @@
           <a:bodyPr/>
           <a:lstStyle/>
           <a:p>
-            <a:fld id="{4C4EBAC3-E4A7-4351-9613-BC84D503DA4E}" type="datetime1">
+            <a:fld id="{226F82C3-39BF-4BF9-9B4C-83B7D45E788D}" type="datetime1">
               <a:rPr lang="en-GB" smtClean="0">
                 <a:solidFill>
                   <a:prstClr val="black">
@@ -4909,7 +4993,7 @@
                   </a:prstClr>
                 </a:solidFill>
               </a:rPr>
-              <a:t>08/12/2016</a:t>
+              <a:t>11/12/2017</a:t>
             </a:fld>
             <a:endParaRPr lang="en-GB">
               <a:solidFill>
@@ -4937,14 +5021,14 @@
           <a:lstStyle/>
           <a:p>
             <a:r>
-              <a:rPr lang="it-IT">
+              <a:rPr lang="it-IT" smtClean="0">
                 <a:solidFill>
                   <a:prstClr val="black">
                     <a:tint val="75000"/>
                   </a:prstClr>
                 </a:solidFill>
               </a:rPr>
-              <a:t>INFDEV026A - G. Costantini, F. Di Giacomo, G. Maggiore</a:t>
+              <a:t>INFDEV036A - G. Costantini, F. Di Giacomo</a:t>
             </a:r>
             <a:endParaRPr lang="en-GB">
               <a:solidFill>
@@ -4980,7 +5064,7 @@
                 </a:solidFill>
               </a:rPr>
               <a:pPr/>
-              <a:t>‹#›</a:t>
+              <a:t>‹nr.›</a:t>
             </a:fld>
             <a:endParaRPr lang="en-GB">
               <a:solidFill>
@@ -5037,7 +5121,7 @@
           <a:bodyPr/>
           <a:lstStyle/>
           <a:p>
-            <a:fld id="{530E7ADB-C8D3-43B9-877D-F2DE65F5DBEF}" type="datetime1">
+            <a:fld id="{6FFA7DD6-D2E6-4DC8-9ED2-677636957D2E}" type="datetime1">
               <a:rPr lang="en-GB" smtClean="0">
                 <a:solidFill>
                   <a:prstClr val="black">
@@ -5045,7 +5129,7 @@
                   </a:prstClr>
                 </a:solidFill>
               </a:rPr>
-              <a:t>08/12/2016</a:t>
+              <a:t>11/12/2017</a:t>
             </a:fld>
             <a:endParaRPr lang="en-GB">
               <a:solidFill>
@@ -5073,14 +5157,14 @@
           <a:lstStyle/>
           <a:p>
             <a:r>
-              <a:rPr lang="it-IT">
+              <a:rPr lang="it-IT" smtClean="0">
                 <a:solidFill>
                   <a:prstClr val="black">
                     <a:tint val="75000"/>
                   </a:prstClr>
                 </a:solidFill>
               </a:rPr>
-              <a:t>INFDEV026A - G. Costantini, F. Di Giacomo, G. Maggiore</a:t>
+              <a:t>INFDEV036A - G. Costantini, F. Di Giacomo</a:t>
             </a:r>
             <a:endParaRPr lang="en-GB">
               <a:solidFill>
@@ -5116,7 +5200,7 @@
                 </a:solidFill>
               </a:rPr>
               <a:pPr/>
-              <a:t>‹#›</a:t>
+              <a:t>‹nr.›</a:t>
             </a:fld>
             <a:endParaRPr lang="en-GB">
               <a:solidFill>
@@ -5333,7 +5417,7 @@
           <a:bodyPr/>
           <a:lstStyle/>
           <a:p>
-            <a:fld id="{B9296E5A-C251-4669-9707-4A559422DAA2}" type="datetime1">
+            <a:fld id="{072E866B-3CB7-42BD-B9F2-F4A40F5E4888}" type="datetime1">
               <a:rPr lang="en-GB" smtClean="0">
                 <a:solidFill>
                   <a:prstClr val="black">
@@ -5341,7 +5425,7 @@
                   </a:prstClr>
                 </a:solidFill>
               </a:rPr>
-              <a:t>08/12/2016</a:t>
+              <a:t>11/12/2017</a:t>
             </a:fld>
             <a:endParaRPr lang="en-GB">
               <a:solidFill>
@@ -5369,14 +5453,14 @@
           <a:lstStyle/>
           <a:p>
             <a:r>
-              <a:rPr lang="it-IT">
+              <a:rPr lang="it-IT" smtClean="0">
                 <a:solidFill>
                   <a:prstClr val="black">
                     <a:tint val="75000"/>
                   </a:prstClr>
                 </a:solidFill>
               </a:rPr>
-              <a:t>INFDEV026A - G. Costantini, F. Di Giacomo, G. Maggiore</a:t>
+              <a:t>INFDEV036A - G. Costantini, F. Di Giacomo</a:t>
             </a:r>
             <a:endParaRPr lang="en-GB">
               <a:solidFill>
@@ -5412,7 +5496,7 @@
                 </a:solidFill>
               </a:rPr>
               <a:pPr/>
-              <a:t>‹#›</a:t>
+              <a:t>‹nr.›</a:t>
             </a:fld>
             <a:endParaRPr lang="en-GB">
               <a:solidFill>
@@ -5637,7 +5721,7 @@
           <a:bodyPr/>
           <a:lstStyle/>
           <a:p>
-            <a:fld id="{4AADDF78-DA30-4210-BC74-E9400D8CBE8E}" type="datetime1">
+            <a:fld id="{A5F623F9-7921-4222-99AF-BEBEC7F4A167}" type="datetime1">
               <a:rPr lang="en-GB" smtClean="0">
                 <a:solidFill>
                   <a:prstClr val="black">
@@ -5645,7 +5729,7 @@
                   </a:prstClr>
                 </a:solidFill>
               </a:rPr>
-              <a:t>08/12/2016</a:t>
+              <a:t>11/12/2017</a:t>
             </a:fld>
             <a:endParaRPr lang="en-GB">
               <a:solidFill>
@@ -5673,14 +5757,14 @@
           <a:lstStyle/>
           <a:p>
             <a:r>
-              <a:rPr lang="it-IT">
+              <a:rPr lang="it-IT" smtClean="0">
                 <a:solidFill>
                   <a:prstClr val="black">
                     <a:tint val="75000"/>
                   </a:prstClr>
                 </a:solidFill>
               </a:rPr>
-              <a:t>INFDEV026A - G. Costantini, F. Di Giacomo, G. Maggiore</a:t>
+              <a:t>INFDEV036A - G. Costantini, F. Di Giacomo</a:t>
             </a:r>
             <a:endParaRPr lang="en-GB">
               <a:solidFill>
@@ -5716,7 +5800,7 @@
                 </a:solidFill>
               </a:rPr>
               <a:pPr/>
-              <a:t>‹#›</a:t>
+              <a:t>‹nr.›</a:t>
             </a:fld>
             <a:endParaRPr lang="en-GB">
               <a:solidFill>
@@ -6423,7 +6507,7 @@
             </a:lvl1pPr>
           </a:lstStyle>
           <a:p>
-            <a:fld id="{BC943C5A-DECB-4F5E-B5E1-A3CA309B4CDB}" type="datetime1">
+            <a:fld id="{61BCB7E2-1C3C-4BC3-AC64-E4284E4F69BD}" type="datetime1">
               <a:rPr lang="en-GB" smtClean="0">
                 <a:solidFill>
                   <a:prstClr val="black">
@@ -6431,7 +6515,7 @@
                   </a:prstClr>
                 </a:solidFill>
               </a:rPr>
-              <a:t>08/12/2016</a:t>
+              <a:t>11/12/2017</a:t>
             </a:fld>
             <a:endParaRPr lang="en-GB">
               <a:solidFill>
@@ -6477,14 +6561,14 @@
           </a:lstStyle>
           <a:p>
             <a:r>
-              <a:rPr lang="it-IT">
+              <a:rPr lang="it-IT" smtClean="0">
                 <a:solidFill>
                   <a:prstClr val="black">
                     <a:tint val="75000"/>
                   </a:prstClr>
                 </a:solidFill>
               </a:rPr>
-              <a:t>INFDEV026A - G. Costantini, F. Di Giacomo, G. Maggiore</a:t>
+              <a:t>INFDEV036A - G. Costantini, F. Di Giacomo</a:t>
             </a:r>
             <a:endParaRPr lang="en-GB">
               <a:solidFill>
@@ -6538,7 +6622,7 @@
                 </a:solidFill>
               </a:rPr>
               <a:pPr/>
-              <a:t>‹#›</a:t>
+              <a:t>‹nr.›</a:t>
             </a:fld>
             <a:endParaRPr lang="en-GB">
               <a:solidFill>
@@ -7034,23 +7118,27 @@
           <a:lstStyle/>
           <a:p>
             <a:r>
+              <a:rPr lang="en-GB" dirty="0" smtClean="0"/>
+              <a:t>INFDEV036A </a:t>
+            </a:r>
+            <a:r>
               <a:rPr lang="en-GB" dirty="0"/>
-              <a:t>INFDEV026A - </a:t>
-            </a:r>
-            <a:r>
-              <a:rPr lang="en-GB" dirty="0" err="1"/>
-              <a:t>Algoritmiek</a:t>
+              <a:t>- </a:t>
+            </a:r>
+            <a:r>
+              <a:rPr lang="en-GB" dirty="0" smtClean="0"/>
+              <a:t>Algorithms</a:t>
             </a:r>
             <a:r>
               <a:rPr lang="en-GB" dirty="0"/>
-              <a:t> </a:t>
+              <a:t/>
             </a:r>
             <a:br>
-              <a:rPr lang="en-GB"/>
+              <a:rPr lang="en-GB" dirty="0"/>
             </a:br>
             <a:r>
-              <a:rPr lang="en-GB"/>
-              <a:t>Unit </a:t>
+              <a:rPr lang="en-GB" dirty="0" smtClean="0"/>
+              <a:t>Lesson Unit </a:t>
             </a:r>
             <a:r>
               <a:rPr lang="en-GB" dirty="0"/>
@@ -7078,75 +7166,44 @@
           <a:p>
             <a:r>
               <a:rPr lang="en-GB" sz="2000" dirty="0"/>
-              <a:t>G. Costantini, F. Di Giacomo, G. Maggiore</a:t>
-            </a:r>
-          </a:p>
-          <a:p>
-            <a:r>
-              <a:rPr lang="en-GB" sz="2000" dirty="0">
-                <a:hlinkClick r:id="rId2"/>
-              </a:rPr>
-              <a:t>costg@hr.nl</a:t>
-            </a:r>
-            <a:r>
-              <a:rPr lang="en-GB" sz="2000" dirty="0"/>
-              <a:t>, </a:t>
-            </a:r>
+              <a:t>G. Costantini, F. Di </a:t>
+            </a:r>
+            <a:r>
+              <a:rPr lang="en-GB" sz="2000" dirty="0" smtClean="0"/>
+              <a:t>Giacomo</a:t>
+            </a:r>
+            <a:endParaRPr lang="en-GB" sz="2000" dirty="0"/>
+          </a:p>
+          <a:p>
             <a:r>
               <a:rPr lang="en-GB" sz="2000" dirty="0">
                 <a:hlinkClick r:id="rId3"/>
               </a:rPr>
-              <a:t>giacf@hr.nl</a:t>
+              <a:t>costg@hr.nl</a:t>
             </a:r>
             <a:r>
               <a:rPr lang="en-GB" sz="2000" dirty="0"/>
               <a:t>, </a:t>
             </a:r>
             <a:r>
-              <a:rPr lang="en-GB" sz="2000" dirty="0">
+              <a:rPr lang="en-GB" sz="2000" dirty="0" smtClean="0">
                 <a:hlinkClick r:id="rId4"/>
               </a:rPr>
-              <a:t>maggg@hr.nl</a:t>
+              <a:t>giacf@hr.nl</a:t>
+            </a:r>
+            <a:r>
+              <a:rPr lang="en-GB" sz="2000" dirty="0" smtClean="0"/>
+              <a:t> </a:t>
             </a:r>
             <a:r>
               <a:rPr lang="en-GB" sz="2000" dirty="0"/>
-              <a:t> – Office H4.204</a:t>
-            </a:r>
-          </a:p>
-        </p:txBody>
-      </p:sp>
-      <p:sp>
-        <p:nvSpPr>
-          <p:cNvPr id="4" name="Tijdelijke aanduiding voor voettekst 3"/>
-          <p:cNvSpPr>
-            <a:spLocks noGrp="1"/>
-          </p:cNvSpPr>
-          <p:nvPr>
-            <p:ph type="ftr" sz="quarter" idx="11"/>
-          </p:nvPr>
-        </p:nvSpPr>
-        <p:spPr/>
-        <p:txBody>
-          <a:bodyPr/>
-          <a:lstStyle/>
-          <a:p>
-            <a:r>
-              <a:rPr lang="it-IT">
-                <a:solidFill>
-                  <a:prstClr val="black">
-                    <a:tint val="75000"/>
-                  </a:prstClr>
-                </a:solidFill>
-              </a:rPr>
-              <a:t>INFDEV026A - G. Costantini, F. Di Giacomo, G. Maggiore</a:t>
-            </a:r>
-            <a:endParaRPr lang="en-GB">
-              <a:solidFill>
-                <a:prstClr val="black">
-                  <a:tint val="75000"/>
-                </a:prstClr>
-              </a:solidFill>
-            </a:endParaRPr>
+              <a:t>– Office </a:t>
+            </a:r>
+            <a:r>
+              <a:rPr lang="en-GB" sz="2000" dirty="0" smtClean="0"/>
+              <a:t>H4.206</a:t>
+            </a:r>
+            <a:endParaRPr lang="en-GB" sz="2000" dirty="0"/>
           </a:p>
         </p:txBody>
       </p:sp>
@@ -7278,14 +7335,14 @@
           <a:lstStyle/>
           <a:p>
             <a:r>
-              <a:rPr lang="it-IT">
+              <a:rPr lang="it-IT" smtClean="0">
                 <a:solidFill>
                   <a:prstClr val="black">
                     <a:tint val="75000"/>
                   </a:prstClr>
                 </a:solidFill>
               </a:rPr>
-              <a:t>INFDEV026A - G. Costantini, F. Di Giacomo, G. Maggiore</a:t>
+              <a:t>INFDEV036A - G. Costantini, F. Di Giacomo</a:t>
             </a:r>
             <a:endParaRPr lang="en-GB">
               <a:solidFill>
@@ -7598,14 +7655,14 @@
           <a:lstStyle/>
           <a:p>
             <a:r>
-              <a:rPr lang="it-IT">
+              <a:rPr lang="it-IT" smtClean="0">
                 <a:solidFill>
                   <a:prstClr val="black">
                     <a:tint val="75000"/>
                   </a:prstClr>
                 </a:solidFill>
               </a:rPr>
-              <a:t>INFDEV026A - G. Costantini, F. Di Giacomo, G. Maggiore</a:t>
+              <a:t>INFDEV036A - G. Costantini, F. Di Giacomo</a:t>
             </a:r>
             <a:endParaRPr lang="en-GB">
               <a:solidFill>
@@ -8208,14 +8265,14 @@
           <a:lstStyle/>
           <a:p>
             <a:r>
-              <a:rPr lang="it-IT">
+              <a:rPr lang="it-IT" smtClean="0">
                 <a:solidFill>
                   <a:prstClr val="black">
                     <a:tint val="75000"/>
                   </a:prstClr>
                 </a:solidFill>
               </a:rPr>
-              <a:t>INFDEV026A - G. Costantini, F. Di Giacomo, G. Maggiore</a:t>
+              <a:t>INFDEV036A - G. Costantini, F. Di Giacomo</a:t>
             </a:r>
             <a:endParaRPr lang="en-GB">
               <a:solidFill>
@@ -9443,14 +9500,14 @@
           <a:lstStyle/>
           <a:p>
             <a:r>
-              <a:rPr lang="it-IT">
+              <a:rPr lang="it-IT" smtClean="0">
                 <a:solidFill>
                   <a:prstClr val="black">
                     <a:tint val="75000"/>
                   </a:prstClr>
                 </a:solidFill>
               </a:rPr>
-              <a:t>INFDEV026A - G. Costantini, F. Di Giacomo, G. Maggiore</a:t>
+              <a:t>INFDEV036A - G. Costantini, F. Di Giacomo</a:t>
             </a:r>
             <a:endParaRPr lang="en-GB">
               <a:solidFill>
@@ -9761,14 +9818,14 @@
           <a:lstStyle/>
           <a:p>
             <a:r>
-              <a:rPr lang="it-IT">
+              <a:rPr lang="it-IT" smtClean="0">
                 <a:solidFill>
                   <a:prstClr val="black">
                     <a:tint val="75000"/>
                   </a:prstClr>
                 </a:solidFill>
               </a:rPr>
-              <a:t>INFDEV026A - G. Costantini, F. Di Giacomo, G. Maggiore</a:t>
+              <a:t>INFDEV036A - G. Costantini, F. Di Giacomo</a:t>
             </a:r>
             <a:endParaRPr lang="en-GB">
               <a:solidFill>
@@ -10181,14 +10238,14 @@
           <a:lstStyle/>
           <a:p>
             <a:r>
-              <a:rPr lang="it-IT">
+              <a:rPr lang="it-IT" smtClean="0">
                 <a:solidFill>
                   <a:prstClr val="black">
                     <a:tint val="75000"/>
                   </a:prstClr>
                 </a:solidFill>
               </a:rPr>
-              <a:t>INFDEV026A - G. Costantini, F. Di Giacomo, G. Maggiore</a:t>
+              <a:t>INFDEV036A - G. Costantini, F. Di Giacomo</a:t>
             </a:r>
             <a:endParaRPr lang="en-GB">
               <a:solidFill>
@@ -10714,14 +10771,14 @@
           <a:lstStyle/>
           <a:p>
             <a:r>
-              <a:rPr lang="it-IT">
+              <a:rPr lang="it-IT" smtClean="0">
                 <a:solidFill>
                   <a:prstClr val="black">
                     <a:tint val="75000"/>
                   </a:prstClr>
                 </a:solidFill>
               </a:rPr>
-              <a:t>INFDEV026A - G. Costantini, F. Di Giacomo, G. Maggiore</a:t>
+              <a:t>INFDEV036A - G. Costantini, F. Di Giacomo</a:t>
             </a:r>
             <a:endParaRPr lang="en-GB">
               <a:solidFill>
@@ -11182,14 +11239,14 @@
           <a:lstStyle/>
           <a:p>
             <a:r>
-              <a:rPr lang="it-IT">
+              <a:rPr lang="it-IT" smtClean="0">
                 <a:solidFill>
                   <a:prstClr val="black">
                     <a:tint val="75000"/>
                   </a:prstClr>
                 </a:solidFill>
               </a:rPr>
-              <a:t>INFDEV026A - G. Costantini, F. Di Giacomo, G. Maggiore</a:t>
+              <a:t>INFDEV036A - G. Costantini, F. Di Giacomo</a:t>
             </a:r>
             <a:endParaRPr lang="en-GB">
               <a:solidFill>
@@ -11685,14 +11742,14 @@
           <a:lstStyle/>
           <a:p>
             <a:r>
-              <a:rPr lang="it-IT">
+              <a:rPr lang="it-IT" smtClean="0">
                 <a:solidFill>
                   <a:prstClr val="black">
                     <a:tint val="75000"/>
                   </a:prstClr>
                 </a:solidFill>
               </a:rPr>
-              <a:t>INFDEV026A - G. Costantini, F. Di Giacomo, G. Maggiore</a:t>
+              <a:t>INFDEV036A - G. Costantini, F. Di Giacomo</a:t>
             </a:r>
             <a:endParaRPr lang="en-GB">
               <a:solidFill>
@@ -12157,14 +12214,14 @@
           <a:lstStyle/>
           <a:p>
             <a:r>
-              <a:rPr lang="it-IT">
+              <a:rPr lang="it-IT" smtClean="0">
                 <a:solidFill>
                   <a:prstClr val="black">
                     <a:tint val="75000"/>
                   </a:prstClr>
                 </a:solidFill>
               </a:rPr>
-              <a:t>INFDEV026A - G. Costantini, F. Di Giacomo, G. Maggiore</a:t>
+              <a:t>INFDEV036A - G. Costantini, F. Di Giacomo</a:t>
             </a:r>
             <a:endParaRPr lang="en-GB">
               <a:solidFill>
@@ -12486,8 +12543,8 @@
           <a:lstStyle/>
           <a:p>
             <a:r>
-              <a:rPr lang="it-IT" dirty="0"/>
-              <a:t>INFDEV026A - G. Costantini, F. Di Giacomo, G. Maggiore</a:t>
+              <a:rPr lang="it-IT" smtClean="0"/>
+              <a:t>INFDEV036A - G. Costantini, F. Di Giacomo</a:t>
             </a:r>
             <a:endParaRPr lang="en-GB" dirty="0"/>
           </a:p>
@@ -12941,14 +12998,14 @@
           <a:lstStyle/>
           <a:p>
             <a:r>
-              <a:rPr lang="it-IT">
+              <a:rPr lang="it-IT" smtClean="0">
                 <a:solidFill>
                   <a:prstClr val="black">
                     <a:tint val="75000"/>
                   </a:prstClr>
                 </a:solidFill>
               </a:rPr>
-              <a:t>INFDEV026A - G. Costantini, F. Di Giacomo, G. Maggiore</a:t>
+              <a:t>INFDEV036A - G. Costantini, F. Di Giacomo</a:t>
             </a:r>
             <a:endParaRPr lang="en-GB">
               <a:solidFill>
@@ -13151,14 +13208,14 @@
           <a:lstStyle/>
           <a:p>
             <a:r>
-              <a:rPr lang="it-IT">
+              <a:rPr lang="it-IT" smtClean="0">
                 <a:solidFill>
                   <a:prstClr val="black">
                     <a:tint val="75000"/>
                   </a:prstClr>
                 </a:solidFill>
               </a:rPr>
-              <a:t>INFDEV026A - G. Costantini, F. Di Giacomo, G. Maggiore</a:t>
+              <a:t>INFDEV036A - G. Costantini, F. Di Giacomo</a:t>
             </a:r>
             <a:endParaRPr lang="en-GB">
               <a:solidFill>
@@ -13282,29 +13339,6 @@
           </a:p>
         </p:txBody>
       </p:sp>
-      <p:sp>
-        <p:nvSpPr>
-          <p:cNvPr id="4" name="Footer Placeholder 3"/>
-          <p:cNvSpPr>
-            <a:spLocks noGrp="1"/>
-          </p:cNvSpPr>
-          <p:nvPr>
-            <p:ph type="ftr" sz="quarter" idx="11"/>
-          </p:nvPr>
-        </p:nvSpPr>
-        <p:spPr/>
-        <p:txBody>
-          <a:bodyPr/>
-          <a:lstStyle/>
-          <a:p>
-            <a:r>
-              <a:rPr lang="it-IT"/>
-              <a:t>INFDEV026A - G. Costantini, F. Di Giacomo, G. Maggiore</a:t>
-            </a:r>
-            <a:endParaRPr lang="en-GB"/>
-          </a:p>
-        </p:txBody>
-      </p:sp>
     </p:spTree>
     <p:extLst>
       <p:ext uri="{BB962C8B-B14F-4D97-AF65-F5344CB8AC3E}">
@@ -13585,14 +13619,14 @@
           <a:lstStyle/>
           <a:p>
             <a:r>
-              <a:rPr lang="it-IT">
+              <a:rPr lang="it-IT" smtClean="0">
                 <a:solidFill>
                   <a:prstClr val="black">
                     <a:tint val="75000"/>
                   </a:prstClr>
                 </a:solidFill>
               </a:rPr>
-              <a:t>INFDEV026A - G. Costantini, F. Di Giacomo, G. Maggiore</a:t>
+              <a:t>INFDEV036A - G. Costantini, F. Di Giacomo</a:t>
             </a:r>
             <a:endParaRPr lang="en-GB">
               <a:solidFill>
@@ -13737,14 +13771,14 @@
           <a:lstStyle/>
           <a:p>
             <a:r>
-              <a:rPr lang="it-IT">
+              <a:rPr lang="it-IT" smtClean="0">
                 <a:solidFill>
                   <a:prstClr val="black">
                     <a:tint val="75000"/>
                   </a:prstClr>
                 </a:solidFill>
               </a:rPr>
-              <a:t>INFDEV026A - G. Costantini, F. Di Giacomo, G. Maggiore</a:t>
+              <a:t>INFDEV036A - G. Costantini, F. Di Giacomo</a:t>
             </a:r>
             <a:endParaRPr lang="en-GB">
               <a:solidFill>
@@ -14145,14 +14179,14 @@
           <a:lstStyle/>
           <a:p>
             <a:r>
-              <a:rPr lang="it-IT">
+              <a:rPr lang="it-IT" smtClean="0">
                 <a:solidFill>
                   <a:prstClr val="black">
                     <a:tint val="75000"/>
                   </a:prstClr>
                 </a:solidFill>
               </a:rPr>
-              <a:t>INFDEV026A - G. Costantini, F. Di Giacomo, G. Maggiore</a:t>
+              <a:t>INFDEV036A - G. Costantini, F. Di Giacomo</a:t>
             </a:r>
             <a:endParaRPr lang="en-GB">
               <a:solidFill>
@@ -14424,14 +14458,14 @@
           <a:lstStyle/>
           <a:p>
             <a:r>
-              <a:rPr lang="it-IT">
+              <a:rPr lang="it-IT" smtClean="0">
                 <a:solidFill>
                   <a:prstClr val="black">
                     <a:tint val="75000"/>
                   </a:prstClr>
                 </a:solidFill>
               </a:rPr>
-              <a:t>INFDEV026A - G. Costantini, F. Di Giacomo, G. Maggiore</a:t>
+              <a:t>INFDEV036A - G. Costantini, F. Di Giacomo</a:t>
             </a:r>
             <a:endParaRPr lang="en-GB">
               <a:solidFill>
@@ -14811,14 +14845,14 @@
           <a:lstStyle/>
           <a:p>
             <a:r>
-              <a:rPr lang="it-IT">
+              <a:rPr lang="it-IT" smtClean="0">
                 <a:solidFill>
                   <a:prstClr val="black">
                     <a:tint val="75000"/>
                   </a:prstClr>
                 </a:solidFill>
               </a:rPr>
-              <a:t>INFDEV026A - G. Costantini, F. Di Giacomo, G. Maggiore</a:t>
+              <a:t>INFDEV036A - G. Costantini, F. Di Giacomo</a:t>
             </a:r>
             <a:endParaRPr lang="en-GB">
               <a:solidFill>
@@ -15341,14 +15375,14 @@
           <a:lstStyle/>
           <a:p>
             <a:r>
-              <a:rPr lang="it-IT">
+              <a:rPr lang="it-IT" smtClean="0">
                 <a:solidFill>
                   <a:prstClr val="black">
                     <a:tint val="75000"/>
                   </a:prstClr>
                 </a:solidFill>
               </a:rPr>
-              <a:t>INFDEV026A - G. Costantini, F. Di Giacomo, G. Maggiore</a:t>
+              <a:t>INFDEV036A - G. Costantini, F. Di Giacomo</a:t>
             </a:r>
             <a:endParaRPr lang="en-GB">
               <a:solidFill>
@@ -16311,14 +16345,14 @@
           <a:lstStyle/>
           <a:p>
             <a:r>
-              <a:rPr lang="it-IT">
+              <a:rPr lang="it-IT" smtClean="0">
                 <a:solidFill>
                   <a:prstClr val="black">
                     <a:tint val="75000"/>
                   </a:prstClr>
                 </a:solidFill>
               </a:rPr>
-              <a:t>INFDEV026A - G. Costantini, F. Di Giacomo, G. Maggiore</a:t>
+              <a:t>INFDEV036A - G. Costantini, F. Di Giacomo</a:t>
             </a:r>
             <a:endParaRPr lang="en-GB">
               <a:solidFill>
@@ -16555,14 +16589,14 @@
           <a:lstStyle/>
           <a:p>
             <a:r>
-              <a:rPr lang="it-IT">
+              <a:rPr lang="it-IT" smtClean="0">
                 <a:solidFill>
                   <a:prstClr val="black">
                     <a:tint val="75000"/>
                   </a:prstClr>
                 </a:solidFill>
               </a:rPr>
-              <a:t>INFDEV026A - G. Costantini, F. Di Giacomo, G. Maggiore</a:t>
+              <a:t>INFDEV036A - G. Costantini, F. Di Giacomo</a:t>
             </a:r>
             <a:endParaRPr lang="en-GB">
               <a:solidFill>
@@ -17101,14 +17135,14 @@
           <a:lstStyle/>
           <a:p>
             <a:r>
-              <a:rPr lang="it-IT">
+              <a:rPr lang="it-IT" smtClean="0">
                 <a:solidFill>
                   <a:prstClr val="black">
                     <a:tint val="75000"/>
                   </a:prstClr>
                 </a:solidFill>
               </a:rPr>
-              <a:t>INFDEV026A - G. Costantini, F. Di Giacomo, G. Maggiore</a:t>
+              <a:t>INFDEV036A - G. Costantini, F. Di Giacomo</a:t>
             </a:r>
             <a:endParaRPr lang="en-GB" dirty="0">
               <a:solidFill>
@@ -17979,14 +18013,14 @@
           <a:lstStyle/>
           <a:p>
             <a:r>
-              <a:rPr lang="it-IT">
+              <a:rPr lang="it-IT" smtClean="0">
                 <a:solidFill>
                   <a:prstClr val="black">
                     <a:tint val="75000"/>
                   </a:prstClr>
                 </a:solidFill>
               </a:rPr>
-              <a:t>INFDEV026A - G. Costantini, F. Di Giacomo, G. Maggiore</a:t>
+              <a:t>INFDEV036A - G. Costantini, F. Di Giacomo</a:t>
             </a:r>
             <a:endParaRPr lang="en-GB" dirty="0">
               <a:solidFill>
@@ -18850,14 +18884,14 @@
           <a:lstStyle/>
           <a:p>
             <a:r>
-              <a:rPr lang="it-IT">
+              <a:rPr lang="it-IT" smtClean="0">
                 <a:solidFill>
                   <a:prstClr val="black">
                     <a:tint val="75000"/>
                   </a:prstClr>
                 </a:solidFill>
               </a:rPr>
-              <a:t>INFDEV026A - G. Costantini, F. Di Giacomo, G. Maggiore</a:t>
+              <a:t>INFDEV036A - G. Costantini, F. Di Giacomo</a:t>
             </a:r>
             <a:endParaRPr lang="en-GB">
               <a:solidFill>
@@ -19374,14 +19408,14 @@
           <a:lstStyle/>
           <a:p>
             <a:r>
-              <a:rPr lang="it-IT">
+              <a:rPr lang="it-IT" smtClean="0">
                 <a:solidFill>
                   <a:prstClr val="black">
                     <a:tint val="75000"/>
                   </a:prstClr>
                 </a:solidFill>
               </a:rPr>
-              <a:t>INFDEV026A - G. Costantini, F. Di Giacomo, G. Maggiore</a:t>
+              <a:t>INFDEV036A - G. Costantini, F. Di Giacomo</a:t>
             </a:r>
             <a:endParaRPr lang="en-GB">
               <a:solidFill>
@@ -19742,14 +19776,14 @@
           <a:lstStyle/>
           <a:p>
             <a:r>
-              <a:rPr lang="it-IT">
+              <a:rPr lang="it-IT" smtClean="0">
                 <a:solidFill>
                   <a:prstClr val="black">
                     <a:tint val="75000"/>
                   </a:prstClr>
                 </a:solidFill>
               </a:rPr>
-              <a:t>INFDEV026A - G. Costantini, F. Di Giacomo, G. Maggiore</a:t>
+              <a:t>INFDEV036A - G. Costantini, F. Di Giacomo</a:t>
             </a:r>
             <a:endParaRPr lang="en-GB">
               <a:solidFill>
@@ -19943,14 +19977,14 @@
           <a:lstStyle/>
           <a:p>
             <a:r>
-              <a:rPr lang="it-IT">
+              <a:rPr lang="it-IT" smtClean="0">
                 <a:solidFill>
                   <a:prstClr val="black">
                     <a:tint val="75000"/>
                   </a:prstClr>
                 </a:solidFill>
               </a:rPr>
-              <a:t>INFDEV026A - G. Costantini, F. Di Giacomo, G. Maggiore</a:t>
+              <a:t>INFDEV036A - G. Costantini, F. Di Giacomo</a:t>
             </a:r>
             <a:endParaRPr lang="en-GB">
               <a:solidFill>
@@ -20409,14 +20443,14 @@
           <a:lstStyle/>
           <a:p>
             <a:r>
-              <a:rPr lang="it-IT">
+              <a:rPr lang="it-IT" smtClean="0">
                 <a:solidFill>
                   <a:prstClr val="black">
                     <a:tint val="75000"/>
                   </a:prstClr>
                 </a:solidFill>
               </a:rPr>
-              <a:t>INFDEV026A - G. Costantini, F. Di Giacomo, G. Maggiore</a:t>
+              <a:t>INFDEV036A - G. Costantini, F. Di Giacomo</a:t>
             </a:r>
             <a:endParaRPr lang="en-GB">
               <a:solidFill>
@@ -20737,14 +20771,14 @@
           <a:lstStyle/>
           <a:p>
             <a:r>
-              <a:rPr lang="it-IT">
+              <a:rPr lang="it-IT" smtClean="0">
                 <a:solidFill>
                   <a:prstClr val="black">
                     <a:tint val="75000"/>
                   </a:prstClr>
                 </a:solidFill>
               </a:rPr>
-              <a:t>INFDEV026A - G. Costantini, F. Di Giacomo, G. Maggiore</a:t>
+              <a:t>INFDEV036A - G. Costantini, F. Di Giacomo</a:t>
             </a:r>
             <a:endParaRPr lang="en-GB">
               <a:solidFill>
@@ -20988,14 +21022,14 @@
           <a:lstStyle/>
           <a:p>
             <a:r>
-              <a:rPr lang="it-IT">
+              <a:rPr lang="it-IT" smtClean="0">
                 <a:solidFill>
                   <a:prstClr val="black">
                     <a:tint val="75000"/>
                   </a:prstClr>
                 </a:solidFill>
               </a:rPr>
-              <a:t>INFDEV026A - G. Costantini, F. Di Giacomo, G. Maggiore</a:t>
+              <a:t>INFDEV036A - G. Costantini, F. Di Giacomo</a:t>
             </a:r>
             <a:endParaRPr lang="en-GB">
               <a:solidFill>
@@ -21151,14 +21185,14 @@
           <a:lstStyle/>
           <a:p>
             <a:r>
-              <a:rPr lang="it-IT">
+              <a:rPr lang="it-IT" smtClean="0">
                 <a:solidFill>
                   <a:prstClr val="black">
                     <a:tint val="75000"/>
                   </a:prstClr>
                 </a:solidFill>
               </a:rPr>
-              <a:t>INFDEV026A - G. Costantini, F. Di Giacomo, G. Maggiore</a:t>
+              <a:t>INFDEV036A - G. Costantini, F. Di Giacomo</a:t>
             </a:r>
             <a:endParaRPr lang="en-GB">
               <a:solidFill>
@@ -21449,14 +21483,14 @@
           <a:lstStyle/>
           <a:p>
             <a:r>
-              <a:rPr lang="it-IT">
+              <a:rPr lang="it-IT" smtClean="0">
                 <a:solidFill>
                   <a:prstClr val="black">
                     <a:tint val="75000"/>
                   </a:prstClr>
                 </a:solidFill>
               </a:rPr>
-              <a:t>INFDEV026A - G. Costantini, F. Di Giacomo, G. Maggiore</a:t>
+              <a:t>INFDEV036A - G. Costantini, F. Di Giacomo</a:t>
             </a:r>
             <a:endParaRPr lang="en-GB">
               <a:solidFill>
@@ -21633,14 +21667,14 @@
           <a:lstStyle/>
           <a:p>
             <a:r>
-              <a:rPr lang="it-IT">
+              <a:rPr lang="it-IT" smtClean="0">
                 <a:solidFill>
                   <a:prstClr val="black">
                     <a:tint val="75000"/>
                   </a:prstClr>
                 </a:solidFill>
               </a:rPr>
-              <a:t>INFDEV026A - G. Costantini, F. Di Giacomo, G. Maggiore</a:t>
+              <a:t>INFDEV036A - G. Costantini, F. Di Giacomo</a:t>
             </a:r>
             <a:endParaRPr lang="en-GB">
               <a:solidFill>
@@ -21806,14 +21840,14 @@
           <a:lstStyle/>
           <a:p>
             <a:r>
-              <a:rPr lang="it-IT">
+              <a:rPr lang="it-IT" smtClean="0">
                 <a:solidFill>
                   <a:prstClr val="black">
                     <a:tint val="75000"/>
                   </a:prstClr>
                 </a:solidFill>
               </a:rPr>
-              <a:t>INFDEV026A - G. Costantini, F. Di Giacomo, G. Maggiore</a:t>
+              <a:t>INFDEV036A - G. Costantini, F. Di Giacomo</a:t>
             </a:r>
             <a:endParaRPr lang="en-GB" dirty="0">
               <a:solidFill>
@@ -22475,14 +22509,14 @@
           <a:lstStyle/>
           <a:p>
             <a:r>
-              <a:rPr lang="it-IT">
+              <a:rPr lang="it-IT" smtClean="0">
                 <a:solidFill>
                   <a:prstClr val="black">
                     <a:tint val="75000"/>
                   </a:prstClr>
                 </a:solidFill>
               </a:rPr>
-              <a:t>INFDEV026A - G. Costantini, F. Di Giacomo, G. Maggiore</a:t>
+              <a:t>INFDEV036A - G. Costantini, F. Di Giacomo</a:t>
             </a:r>
             <a:endParaRPr lang="en-GB">
               <a:solidFill>
@@ -22524,21 +22558,21 @@
                     <a:gridCol w="1626301">
                       <a:extLst>
                         <a:ext uri="{9D8B030D-6E8A-4147-A177-3AD203B41FA5}">
-                          <a16:colId xmlns:a16="http://schemas.microsoft.com/office/drawing/2014/main" val="20000"/>
+                          <a16:colId xmlns:a16="http://schemas.microsoft.com/office/drawing/2014/main" xmlns="" val="20000"/>
                         </a:ext>
                       </a:extLst>
                     </a:gridCol>
                     <a:gridCol w="1814234">
                       <a:extLst>
                         <a:ext uri="{9D8B030D-6E8A-4147-A177-3AD203B41FA5}">
-                          <a16:colId xmlns:a16="http://schemas.microsoft.com/office/drawing/2014/main" val="20001"/>
+                          <a16:colId xmlns:a16="http://schemas.microsoft.com/office/drawing/2014/main" xmlns="" val="20001"/>
                         </a:ext>
                       </a:extLst>
                     </a:gridCol>
                     <a:gridCol w="1502411">
                       <a:extLst>
                         <a:ext uri="{9D8B030D-6E8A-4147-A177-3AD203B41FA5}">
-                          <a16:colId xmlns:a16="http://schemas.microsoft.com/office/drawing/2014/main" val="20002"/>
+                          <a16:colId xmlns:a16="http://schemas.microsoft.com/office/drawing/2014/main" xmlns="" val="20002"/>
                         </a:ext>
                       </a:extLst>
                     </a:gridCol>
@@ -22585,7 +22619,7 @@
                     </a:tc>
                     <a:extLst>
                       <a:ext uri="{0D108BD9-81ED-4DB2-BD59-A6C34878D82A}">
-                        <a16:rowId xmlns:a16="http://schemas.microsoft.com/office/drawing/2014/main" val="10000"/>
+                        <a16:rowId xmlns:a16="http://schemas.microsoft.com/office/drawing/2014/main" xmlns="" val="10000"/>
                       </a:ext>
                     </a:extLst>
                   </a:tr>
@@ -22715,7 +22749,7 @@
                     </a:tc>
                     <a:extLst>
                       <a:ext uri="{0D108BD9-81ED-4DB2-BD59-A6C34878D82A}">
-                        <a16:rowId xmlns:a16="http://schemas.microsoft.com/office/drawing/2014/main" val="10001"/>
+                        <a16:rowId xmlns:a16="http://schemas.microsoft.com/office/drawing/2014/main" xmlns="" val="10001"/>
                       </a:ext>
                     </a:extLst>
                   </a:tr>
@@ -22861,7 +22895,7 @@
                     </a:tc>
                     <a:extLst>
                       <a:ext uri="{0D108BD9-81ED-4DB2-BD59-A6C34878D82A}">
-                        <a16:rowId xmlns:a16="http://schemas.microsoft.com/office/drawing/2014/main" val="10002"/>
+                        <a16:rowId xmlns:a16="http://schemas.microsoft.com/office/drawing/2014/main" xmlns="" val="10002"/>
                       </a:ext>
                     </a:extLst>
                   </a:tr>
@@ -23007,7 +23041,7 @@
                     </a:tc>
                     <a:extLst>
                       <a:ext uri="{0D108BD9-81ED-4DB2-BD59-A6C34878D82A}">
-                        <a16:rowId xmlns:a16="http://schemas.microsoft.com/office/drawing/2014/main" val="10003"/>
+                        <a16:rowId xmlns:a16="http://schemas.microsoft.com/office/drawing/2014/main" xmlns="" val="10003"/>
                       </a:ext>
                     </a:extLst>
                   </a:tr>
@@ -23474,14 +23508,14 @@
           <a:lstStyle/>
           <a:p>
             <a:r>
-              <a:rPr lang="it-IT">
+              <a:rPr lang="it-IT" smtClean="0">
                 <a:solidFill>
                   <a:prstClr val="black">
                     <a:tint val="75000"/>
                   </a:prstClr>
                 </a:solidFill>
               </a:rPr>
-              <a:t>INFDEV026A - G. Costantini, F. Di Giacomo, G. Maggiore</a:t>
+              <a:t>INFDEV036A - G. Costantini, F. Di Giacomo</a:t>
             </a:r>
             <a:endParaRPr lang="en-GB">
               <a:solidFill>
@@ -23564,41 +23598,6 @@
           </a:p>
         </p:txBody>
       </p:sp>
-      <p:sp>
-        <p:nvSpPr>
-          <p:cNvPr id="4" name="Tijdelijke aanduiding voor voettekst 3"/>
-          <p:cNvSpPr>
-            <a:spLocks noGrp="1"/>
-          </p:cNvSpPr>
-          <p:nvPr>
-            <p:ph type="ftr" sz="quarter" idx="11"/>
-          </p:nvPr>
-        </p:nvSpPr>
-        <p:spPr/>
-        <p:txBody>
-          <a:bodyPr/>
-          <a:lstStyle/>
-          <a:p>
-            <a:r>
-              <a:rPr lang="it-IT">
-                <a:solidFill>
-                  <a:prstClr val="black">
-                    <a:tint val="75000"/>
-                  </a:prstClr>
-                </a:solidFill>
-              </a:rPr>
-              <a:t>INFDEV026A - G. Costantini, F. Di Giacomo, G. Maggiore</a:t>
-            </a:r>
-            <a:endParaRPr lang="en-GB">
-              <a:solidFill>
-                <a:prstClr val="black">
-                  <a:tint val="75000"/>
-                </a:prstClr>
-              </a:solidFill>
-            </a:endParaRPr>
-          </a:p>
-        </p:txBody>
-      </p:sp>
     </p:spTree>
     <p:extLst>
       <p:ext uri="{BB962C8B-B14F-4D97-AF65-F5344CB8AC3E}">
@@ -23877,14 +23876,14 @@
           <a:lstStyle/>
           <a:p>
             <a:r>
-              <a:rPr lang="it-IT">
+              <a:rPr lang="it-IT" smtClean="0">
                 <a:solidFill>
                   <a:prstClr val="black">
                     <a:tint val="75000"/>
                   </a:prstClr>
                 </a:solidFill>
               </a:rPr>
-              <a:t>INFDEV026A - G. Costantini, F. Di Giacomo, G. Maggiore</a:t>
+              <a:t>INFDEV036A - G. Costantini, F. Di Giacomo</a:t>
             </a:r>
             <a:endParaRPr lang="en-GB">
               <a:solidFill>
@@ -24054,14 +24053,14 @@
           <a:lstStyle/>
           <a:p>
             <a:r>
-              <a:rPr lang="it-IT">
+              <a:rPr lang="it-IT" smtClean="0">
                 <a:solidFill>
                   <a:prstClr val="black">
                     <a:tint val="75000"/>
                   </a:prstClr>
                 </a:solidFill>
               </a:rPr>
-              <a:t>INFDEV026A - G. Costantini, F. Di Giacomo, G. Maggiore</a:t>
+              <a:t>INFDEV036A - G. Costantini, F. Di Giacomo</a:t>
             </a:r>
             <a:endParaRPr lang="en-GB">
               <a:solidFill>
@@ -24223,14 +24222,14 @@
           <a:lstStyle/>
           <a:p>
             <a:r>
-              <a:rPr lang="it-IT">
+              <a:rPr lang="it-IT" smtClean="0">
                 <a:solidFill>
                   <a:prstClr val="black">
                     <a:tint val="75000"/>
                   </a:prstClr>
                 </a:solidFill>
               </a:rPr>
-              <a:t>INFDEV026A - G. Costantini, F. Di Giacomo, G. Maggiore</a:t>
+              <a:t>INFDEV036A - G. Costantini, F. Di Giacomo</a:t>
             </a:r>
             <a:endParaRPr lang="en-GB">
               <a:solidFill>
@@ -24452,14 +24451,14 @@
           <a:lstStyle/>
           <a:p>
             <a:r>
-              <a:rPr lang="it-IT">
+              <a:rPr lang="it-IT" smtClean="0">
                 <a:solidFill>
                   <a:prstClr val="black">
                     <a:tint val="75000"/>
                   </a:prstClr>
                 </a:solidFill>
               </a:rPr>
-              <a:t>INFDEV026A - G. Costantini, F. Di Giacomo, G. Maggiore</a:t>
+              <a:t>INFDEV036A - G. Costantini, F. Di Giacomo</a:t>
             </a:r>
             <a:endParaRPr lang="en-GB">
               <a:solidFill>
@@ -24594,41 +24593,6 @@
           </a:p>
         </p:txBody>
       </p:sp>
-      <p:sp>
-        <p:nvSpPr>
-          <p:cNvPr id="4" name="Tijdelijke aanduiding voor voettekst 3"/>
-          <p:cNvSpPr>
-            <a:spLocks noGrp="1"/>
-          </p:cNvSpPr>
-          <p:nvPr>
-            <p:ph type="ftr" sz="quarter" idx="11"/>
-          </p:nvPr>
-        </p:nvSpPr>
-        <p:spPr/>
-        <p:txBody>
-          <a:bodyPr/>
-          <a:lstStyle/>
-          <a:p>
-            <a:r>
-              <a:rPr lang="it-IT">
-                <a:solidFill>
-                  <a:prstClr val="black">
-                    <a:tint val="75000"/>
-                  </a:prstClr>
-                </a:solidFill>
-              </a:rPr>
-              <a:t>INFDEV026A - G. Costantini, F. Di Giacomo, G. Maggiore</a:t>
-            </a:r>
-            <a:endParaRPr lang="en-GB">
-              <a:solidFill>
-                <a:prstClr val="black">
-                  <a:tint val="75000"/>
-                </a:prstClr>
-              </a:solidFill>
-            </a:endParaRPr>
-          </a:p>
-        </p:txBody>
-      </p:sp>
       <p:pic>
         <p:nvPicPr>
           <p:cNvPr id="4098" name="Picture 2" descr="https://upload.wikimedia.org/wikipedia/commons/thumb/b/b6/3dtree.png/250px-3dtree.png"/>
@@ -25021,14 +24985,14 @@
           <a:lstStyle/>
           <a:p>
             <a:r>
-              <a:rPr lang="it-IT">
+              <a:rPr lang="it-IT" smtClean="0">
                 <a:solidFill>
                   <a:prstClr val="black">
                     <a:tint val="75000"/>
                   </a:prstClr>
                 </a:solidFill>
               </a:rPr>
-              <a:t>INFDEV026A - G. Costantini, F. Di Giacomo, G. Maggiore</a:t>
+              <a:t>INFDEV036A - G. Costantini, F. Di Giacomo</a:t>
             </a:r>
             <a:endParaRPr lang="en-GB">
               <a:solidFill>
@@ -25287,14 +25251,14 @@
           <a:lstStyle/>
           <a:p>
             <a:r>
-              <a:rPr lang="it-IT">
+              <a:rPr lang="it-IT" smtClean="0">
                 <a:solidFill>
                   <a:prstClr val="black">
                     <a:tint val="75000"/>
                   </a:prstClr>
                 </a:solidFill>
               </a:rPr>
-              <a:t>INFDEV026A - G. Costantini, F. Di Giacomo, G. Maggiore</a:t>
+              <a:t>INFDEV036A - G. Costantini, F. Di Giacomo</a:t>
             </a:r>
             <a:endParaRPr lang="en-GB">
               <a:solidFill>
@@ -25440,14 +25404,14 @@
           <a:lstStyle/>
           <a:p>
             <a:r>
-              <a:rPr lang="it-IT">
+              <a:rPr lang="it-IT" smtClean="0">
                 <a:solidFill>
                   <a:prstClr val="black">
                     <a:tint val="75000"/>
                   </a:prstClr>
                 </a:solidFill>
               </a:rPr>
-              <a:t>INFDEV026A - G. Costantini, F. Di Giacomo, G. Maggiore</a:t>
+              <a:t>INFDEV036A - G. Costantini, F. Di Giacomo</a:t>
             </a:r>
             <a:endParaRPr lang="en-GB">
               <a:solidFill>
@@ -25660,14 +25624,14 @@
           <a:lstStyle/>
           <a:p>
             <a:r>
-              <a:rPr lang="it-IT">
+              <a:rPr lang="it-IT" smtClean="0">
                 <a:solidFill>
                   <a:prstClr val="black">
                     <a:tint val="75000"/>
                   </a:prstClr>
                 </a:solidFill>
               </a:rPr>
-              <a:t>INFDEV026A - G. Costantini, F. Di Giacomo, G. Maggiore</a:t>
+              <a:t>INFDEV036A - G. Costantini, F. Di Giacomo</a:t>
             </a:r>
             <a:endParaRPr lang="en-GB">
               <a:solidFill>
@@ -25752,14 +25716,14 @@
           <a:lstStyle/>
           <a:p>
             <a:r>
-              <a:rPr lang="it-IT">
+              <a:rPr lang="it-IT" smtClean="0">
                 <a:solidFill>
                   <a:prstClr val="black">
                     <a:tint val="75000"/>
                   </a:prstClr>
                 </a:solidFill>
               </a:rPr>
-              <a:t>INFDEV026A - G. Costantini, F. Di Giacomo, G. Maggiore</a:t>
+              <a:t>INFDEV036A - G. Costantini, F. Di Giacomo</a:t>
             </a:r>
             <a:endParaRPr lang="en-GB">
               <a:solidFill>
@@ -25926,14 +25890,14 @@
           <a:lstStyle/>
           <a:p>
             <a:r>
-              <a:rPr lang="it-IT">
+              <a:rPr lang="it-IT" smtClean="0">
                 <a:solidFill>
                   <a:prstClr val="black">
                     <a:tint val="75000"/>
                   </a:prstClr>
                 </a:solidFill>
               </a:rPr>
-              <a:t>INFDEV026A - G. Costantini, F. Di Giacomo, G. Maggiore</a:t>
+              <a:t>INFDEV036A - G. Costantini, F. Di Giacomo</a:t>
             </a:r>
             <a:endParaRPr lang="en-GB">
               <a:solidFill>
@@ -27378,14 +27342,14 @@
           <a:lstStyle/>
           <a:p>
             <a:r>
-              <a:rPr lang="it-IT">
+              <a:rPr lang="it-IT" smtClean="0">
                 <a:solidFill>
                   <a:prstClr val="black">
                     <a:tint val="75000"/>
                   </a:prstClr>
                 </a:solidFill>
               </a:rPr>
-              <a:t>INFDEV026A - G. Costantini, F. Di Giacomo, G. Maggiore</a:t>
+              <a:t>INFDEV036A - G. Costantini, F. Di Giacomo</a:t>
             </a:r>
             <a:endParaRPr lang="en-GB">
               <a:solidFill>
@@ -27530,63 +27494,178 @@
           </a:p>
         </p:txBody>
       </p:sp>
-      <p:sp>
-        <p:nvSpPr>
-          <p:cNvPr id="3" name="Content Placeholder 2"/>
-          <p:cNvSpPr>
-            <a:spLocks noGrp="1"/>
-          </p:cNvSpPr>
-          <p:nvPr>
-            <p:ph idx="1"/>
-          </p:nvPr>
-        </p:nvSpPr>
-        <p:spPr/>
-        <p:txBody>
-          <a:bodyPr>
-            <a:normAutofit/>
-          </a:bodyPr>
-          <a:lstStyle/>
-          <a:p>
-            <a:r>
-              <a:rPr lang="en-GB" sz="2400" b="1" i="1" dirty="0">
-                <a:solidFill>
-                  <a:srgbClr val="FF0000"/>
-                </a:solidFill>
-              </a:rPr>
-              <a:t>GO ON WITH THE ASSIGNMENT!!!</a:t>
-            </a:r>
-          </a:p>
-          <a:p>
-            <a:pPr lvl="1"/>
-            <a:r>
-              <a:rPr lang="en-GB" sz="2000" b="1" i="1" dirty="0">
-                <a:solidFill>
-                  <a:srgbClr val="FF0000"/>
-                </a:solidFill>
-              </a:rPr>
-              <a:t>FINISH EXERCISE 1</a:t>
-            </a:r>
-          </a:p>
-          <a:p>
-            <a:pPr lvl="1"/>
-            <a:r>
-              <a:rPr lang="en-GB" sz="2000" b="1" i="1" dirty="0">
-                <a:solidFill>
-                  <a:srgbClr val="FF0000"/>
-                </a:solidFill>
-              </a:rPr>
-              <a:t>START EXERCISE 2</a:t>
-            </a:r>
-          </a:p>
-          <a:p>
-            <a:endParaRPr lang="en-GB" sz="2400" b="1" i="1" dirty="0">
-              <a:solidFill>
-                <a:srgbClr val="FF0000"/>
-              </a:solidFill>
-            </a:endParaRPr>
-          </a:p>
-        </p:txBody>
-      </p:sp>
+      <mc:AlternateContent xmlns:mc="http://schemas.openxmlformats.org/markup-compatibility/2006">
+        <mc:Choice xmlns:a14="http://schemas.microsoft.com/office/drawing/2010/main" Requires="a14">
+          <p:sp>
+            <p:nvSpPr>
+              <p:cNvPr id="3" name="Content Placeholder 2"/>
+              <p:cNvSpPr>
+                <a:spLocks noGrp="1"/>
+              </p:cNvSpPr>
+              <p:nvPr>
+                <p:ph idx="1"/>
+              </p:nvPr>
+            </p:nvSpPr>
+            <p:spPr/>
+            <p:txBody>
+              <a:bodyPr>
+                <a:normAutofit/>
+              </a:bodyPr>
+              <a:lstStyle/>
+              <a:p>
+                <a:r>
+                  <a:rPr lang="en-GB" dirty="0" smtClean="0"/>
+                  <a:t>Study the slides</a:t>
+                </a:r>
+              </a:p>
+              <a:p>
+                <a:r>
+                  <a:rPr lang="en-GB" dirty="0"/>
+                  <a:t>Answer the MC questions on </a:t>
+                </a:r>
+                <a:r>
+                  <a:rPr lang="en-GB" dirty="0" err="1"/>
+                  <a:t>GrandeOmega</a:t>
+                </a:r>
+                <a:endParaRPr lang="en-GB" dirty="0"/>
+              </a:p>
+              <a:p>
+                <a:r>
+                  <a:rPr lang="en-GB" dirty="0"/>
+                  <a:t>Implement </a:t>
+                </a:r>
+                <a14:m>
+                  <m:oMath xmlns:m="http://schemas.openxmlformats.org/officeDocument/2006/math">
+                    <m:r>
+                      <a:rPr lang="nl-NL" b="0" i="1" dirty="0" smtClean="0">
+                        <a:latin typeface="Cambria Math" panose="02040503050406030204" pitchFamily="18" charset="0"/>
+                      </a:rPr>
+                      <m:t>𝐵𝑖𝑛𝑎𝑟𝑦𝑆𝑒𝑎𝑟𝑐h𝑇𝑟𝑒𝑒</m:t>
+                    </m:r>
+                    <m:r>
+                      <a:rPr lang="en-GB" i="1" dirty="0">
+                        <a:latin typeface="Cambria Math" panose="02040503050406030204" pitchFamily="18" charset="0"/>
+                      </a:rPr>
+                      <m:t>&lt;</m:t>
+                    </m:r>
+                    <m:r>
+                      <a:rPr lang="en-GB" i="1" dirty="0">
+                        <a:latin typeface="Cambria Math" panose="02040503050406030204" pitchFamily="18" charset="0"/>
+                      </a:rPr>
+                      <m:t>𝑇</m:t>
+                    </m:r>
+                    <m:r>
+                      <a:rPr lang="en-GB" i="1" dirty="0">
+                        <a:latin typeface="Cambria Math" panose="02040503050406030204" pitchFamily="18" charset="0"/>
+                      </a:rPr>
+                      <m:t>&gt; </m:t>
+                    </m:r>
+                  </m:oMath>
+                </a14:m>
+                <a:endParaRPr lang="nl-NL" dirty="0"/>
+              </a:p>
+              <a:p>
+                <a:pPr lvl="1"/>
+                <a:r>
+                  <a:rPr lang="en-GB" dirty="0"/>
+                  <a:t>with </a:t>
+                </a:r>
+                <a:r>
+                  <a:rPr lang="en-GB" dirty="0" smtClean="0"/>
+                  <a:t>traversals (all 3),</a:t>
+                </a:r>
+                <a:r>
+                  <a:rPr lang="en-GB" dirty="0"/>
+                  <a:t> </a:t>
+                </a:r>
+                <a:r>
+                  <a:rPr lang="en-GB" dirty="0" smtClean="0"/>
+                  <a:t>insert, search and delete operations</a:t>
+                </a:r>
+                <a:endParaRPr lang="en-GB" dirty="0"/>
+              </a:p>
+              <a:p>
+                <a:r>
+                  <a:rPr lang="en-GB" dirty="0"/>
+                  <a:t>[optional] </a:t>
+                </a:r>
+                <a:r>
+                  <a:rPr lang="en-GB" dirty="0" smtClean="0"/>
+                  <a:t>Start second exercise </a:t>
+                </a:r>
+                <a:r>
+                  <a:rPr lang="en-GB" dirty="0"/>
+                  <a:t>of practical assignment (about </a:t>
+                </a:r>
+                <a:r>
+                  <a:rPr lang="en-GB" dirty="0" smtClean="0"/>
+                  <a:t>k-d trees)</a:t>
+                </a:r>
+                <a:endParaRPr lang="en-GB" dirty="0"/>
+              </a:p>
+              <a:p>
+                <a:endParaRPr lang="en-GB" dirty="0" smtClean="0"/>
+              </a:p>
+              <a:p>
+                <a:endParaRPr lang="en-GB" dirty="0"/>
+              </a:p>
+              <a:p>
+                <a:pPr marL="0" indent="0" algn="ctr">
+                  <a:buNone/>
+                </a:pPr>
+                <a:r>
+                  <a:rPr lang="en-GB" b="1" dirty="0"/>
+                  <a:t>See you next week </a:t>
+                </a:r>
+                <a:r>
+                  <a:rPr lang="en-GB" b="1" dirty="0">
+                    <a:sym typeface="Wingdings" panose="05000000000000000000" pitchFamily="2" charset="2"/>
+                  </a:rPr>
+                  <a:t> </a:t>
+                </a:r>
+                <a:endParaRPr lang="en-GB" b="1" dirty="0"/>
+              </a:p>
+              <a:p>
+                <a:pPr algn="ctr"/>
+                <a:endParaRPr lang="en-GB" b="1" dirty="0"/>
+              </a:p>
+            </p:txBody>
+          </p:sp>
+        </mc:Choice>
+        <mc:Fallback>
+          <p:sp>
+            <p:nvSpPr>
+              <p:cNvPr id="3" name="Content Placeholder 2"/>
+              <p:cNvSpPr>
+                <a:spLocks noGrp="1" noRot="1" noChangeAspect="1" noMove="1" noResize="1" noEditPoints="1" noAdjustHandles="1" noChangeArrowheads="1" noChangeShapeType="1" noTextEdit="1"/>
+              </p:cNvSpPr>
+              <p:nvPr>
+                <p:ph idx="1"/>
+              </p:nvPr>
+            </p:nvSpPr>
+            <p:spPr>
+              <a:blipFill rotWithShape="0">
+                <a:blip r:embed="rId2"/>
+                <a:stretch>
+                  <a:fillRect l="-142" t="-942"/>
+                </a:stretch>
+              </a:blipFill>
+            </p:spPr>
+            <p:txBody>
+              <a:bodyPr/>
+              <a:lstStyle/>
+              <a:p>
+                <a:r>
+                  <a:rPr lang="en-US">
+                    <a:noFill/>
+                  </a:rPr>
+                  <a:t> </a:t>
+                </a:r>
+              </a:p>
+            </p:txBody>
+          </p:sp>
+        </mc:Fallback>
+      </mc:AlternateContent>
       <p:sp>
         <p:nvSpPr>
           <p:cNvPr id="4" name="Footer Placeholder 3"/>
@@ -27603,14 +27682,14 @@
           <a:lstStyle/>
           <a:p>
             <a:r>
-              <a:rPr lang="it-IT">
+              <a:rPr lang="it-IT" smtClean="0">
                 <a:solidFill>
                   <a:prstClr val="black">
                     <a:tint val="75000"/>
                   </a:prstClr>
                 </a:solidFill>
               </a:rPr>
-              <a:t>INFDEV026A - G. Costantini, F. Di Giacomo, G. Maggiore</a:t>
+              <a:t>INFDEV036A - G. Costantini, F. Di Giacomo</a:t>
             </a:r>
             <a:endParaRPr lang="en-GB">
               <a:solidFill>
@@ -27690,41 +27769,6 @@
           <a:lstStyle/>
           <a:p>
             <a:endParaRPr lang="en-GB"/>
-          </a:p>
-        </p:txBody>
-      </p:sp>
-      <p:sp>
-        <p:nvSpPr>
-          <p:cNvPr id="4" name="Footer Placeholder 3"/>
-          <p:cNvSpPr>
-            <a:spLocks noGrp="1"/>
-          </p:cNvSpPr>
-          <p:nvPr>
-            <p:ph type="ftr" sz="quarter" idx="11"/>
-          </p:nvPr>
-        </p:nvSpPr>
-        <p:spPr/>
-        <p:txBody>
-          <a:bodyPr/>
-          <a:lstStyle/>
-          <a:p>
-            <a:r>
-              <a:rPr lang="it-IT">
-                <a:solidFill>
-                  <a:prstClr val="black">
-                    <a:tint val="75000"/>
-                  </a:prstClr>
-                </a:solidFill>
-              </a:rPr>
-              <a:t>INFDEV026A - G. Costantini, F. Di Giacomo, G. Maggiore</a:t>
-            </a:r>
-            <a:endParaRPr lang="en-GB">
-              <a:solidFill>
-                <a:prstClr val="black">
-                  <a:tint val="75000"/>
-                </a:prstClr>
-              </a:solidFill>
-            </a:endParaRPr>
           </a:p>
         </p:txBody>
       </p:sp>
@@ -28213,14 +28257,14 @@
           <a:lstStyle/>
           <a:p>
             <a:r>
-              <a:rPr lang="it-IT">
+              <a:rPr lang="it-IT" smtClean="0">
                 <a:solidFill>
                   <a:prstClr val="black">
                     <a:tint val="75000"/>
                   </a:prstClr>
                 </a:solidFill>
               </a:rPr>
-              <a:t>INFDEV026A - G. Costantini, F. Di Giacomo, G. Maggiore</a:t>
+              <a:t>INFDEV036A - G. Costantini, F. Di Giacomo</a:t>
             </a:r>
             <a:endParaRPr lang="en-GB">
               <a:solidFill>
@@ -28656,14 +28700,14 @@
           <a:lstStyle/>
           <a:p>
             <a:r>
-              <a:rPr lang="it-IT">
+              <a:rPr lang="it-IT" smtClean="0">
                 <a:solidFill>
                   <a:prstClr val="black">
                     <a:tint val="75000"/>
                   </a:prstClr>
                 </a:solidFill>
               </a:rPr>
-              <a:t>INFDEV026A - G. Costantini, F. Di Giacomo, G. Maggiore</a:t>
+              <a:t>INFDEV036A - G. Costantini, F. Di Giacomo</a:t>
             </a:r>
             <a:endParaRPr lang="en-GB">
               <a:solidFill>
@@ -29125,14 +29169,14 @@
           <a:lstStyle/>
           <a:p>
             <a:r>
-              <a:rPr lang="it-IT">
+              <a:rPr lang="it-IT" smtClean="0">
                 <a:solidFill>
                   <a:prstClr val="black">
                     <a:tint val="75000"/>
                   </a:prstClr>
                 </a:solidFill>
               </a:rPr>
-              <a:t>INFDEV026A - G. Costantini, F. Di Giacomo, G. Maggiore</a:t>
+              <a:t>INFDEV036A - G. Costantini, F. Di Giacomo</a:t>
             </a:r>
             <a:endParaRPr lang="en-GB">
               <a:solidFill>

</xml_diff>

<commit_message>
fix lesson 4 and added pdf
</commit_message>
<xml_diff>
--- a/Lesson slides/Unit 4 - Binary trees.pptx
+++ b/Lesson slides/Unit 4 - Binary trees.pptx
@@ -256,7 +256,7 @@
           <a:p>
             <a:fld id="{F58F4026-CF18-472A-B4DE-F2B442FB8B54}" type="datetimeFigureOut">
               <a:rPr lang="en-GB" smtClean="0"/>
-              <a:t>14/12/2017</a:t>
+              <a:t>15/12/2017</a:t>
             </a:fld>
             <a:endParaRPr lang="en-GB"/>
           </a:p>
@@ -1424,7 +1424,7 @@
                   </a:prstClr>
                 </a:solidFill>
               </a:rPr>
-              <a:t>14/12/2017</a:t>
+              <a:t>15/12/2017</a:t>
             </a:fld>
             <a:endParaRPr lang="en-GB">
               <a:solidFill>
@@ -1716,7 +1716,7 @@
                   </a:prstClr>
                 </a:solidFill>
               </a:rPr>
-              <a:t>14/12/2017</a:t>
+              <a:t>15/12/2017</a:t>
             </a:fld>
             <a:endParaRPr lang="en-GB">
               <a:solidFill>
@@ -2071,7 +2071,7 @@
                   </a:prstClr>
                 </a:solidFill>
               </a:rPr>
-              <a:t>14/12/2017</a:t>
+              <a:t>15/12/2017</a:t>
             </a:fld>
             <a:endParaRPr lang="en-GB">
               <a:solidFill>
@@ -2435,7 +2435,7 @@
                   </a:prstClr>
                 </a:solidFill>
               </a:rPr>
-              <a:t>14/12/2017</a:t>
+              <a:t>15/12/2017</a:t>
             </a:fld>
             <a:endParaRPr lang="en-GB">
               <a:solidFill>
@@ -2790,7 +2790,7 @@
                   </a:prstClr>
                 </a:solidFill>
               </a:rPr>
-              <a:t>14/12/2017</a:t>
+              <a:t>15/12/2017</a:t>
             </a:fld>
             <a:endParaRPr lang="en-GB">
               <a:solidFill>
@@ -3214,7 +3214,7 @@
                   </a:prstClr>
                 </a:solidFill>
               </a:rPr>
-              <a:t>14/12/2017</a:t>
+              <a:t>15/12/2017</a:t>
             </a:fld>
             <a:endParaRPr lang="en-GB">
               <a:solidFill>
@@ -3425,7 +3425,7 @@
                   </a:prstClr>
                 </a:solidFill>
               </a:rPr>
-              <a:t>14/12/2017</a:t>
+              <a:t>15/12/2017</a:t>
             </a:fld>
             <a:endParaRPr lang="en-GB">
               <a:solidFill>
@@ -3646,7 +3646,7 @@
                   </a:prstClr>
                 </a:solidFill>
               </a:rPr>
-              <a:t>14/12/2017</a:t>
+              <a:t>15/12/2017</a:t>
             </a:fld>
             <a:endParaRPr lang="en-GB">
               <a:solidFill>
@@ -3857,7 +3857,7 @@
                   </a:prstClr>
                 </a:solidFill>
               </a:rPr>
-              <a:t>14/12/2017</a:t>
+              <a:t>15/12/2017</a:t>
             </a:fld>
             <a:endParaRPr lang="en-GB">
               <a:solidFill>
@@ -4145,7 +4145,7 @@
                   </a:prstClr>
                 </a:solidFill>
               </a:rPr>
-              <a:t>14/12/2017</a:t>
+              <a:t>15/12/2017</a:t>
             </a:fld>
             <a:endParaRPr lang="en-GB">
               <a:solidFill>
@@ -4418,7 +4418,7 @@
                   </a:prstClr>
                 </a:solidFill>
               </a:rPr>
-              <a:t>14/12/2017</a:t>
+              <a:t>15/12/2017</a:t>
             </a:fld>
             <a:endParaRPr lang="en-GB">
               <a:solidFill>
@@ -4833,7 +4833,7 @@
                   </a:prstClr>
                 </a:solidFill>
               </a:rPr>
-              <a:t>14/12/2017</a:t>
+              <a:t>15/12/2017</a:t>
             </a:fld>
             <a:endParaRPr lang="en-GB">
               <a:solidFill>
@@ -4997,7 +4997,7 @@
                   </a:prstClr>
                 </a:solidFill>
               </a:rPr>
-              <a:t>14/12/2017</a:t>
+              <a:t>15/12/2017</a:t>
             </a:fld>
             <a:endParaRPr lang="en-GB">
               <a:solidFill>
@@ -5133,7 +5133,7 @@
                   </a:prstClr>
                 </a:solidFill>
               </a:rPr>
-              <a:t>14/12/2017</a:t>
+              <a:t>15/12/2017</a:t>
             </a:fld>
             <a:endParaRPr lang="en-GB">
               <a:solidFill>
@@ -5429,7 +5429,7 @@
                   </a:prstClr>
                 </a:solidFill>
               </a:rPr>
-              <a:t>14/12/2017</a:t>
+              <a:t>15/12/2017</a:t>
             </a:fld>
             <a:endParaRPr lang="en-GB">
               <a:solidFill>
@@ -5733,7 +5733,7 @@
                   </a:prstClr>
                 </a:solidFill>
               </a:rPr>
-              <a:t>14/12/2017</a:t>
+              <a:t>15/12/2017</a:t>
             </a:fld>
             <a:endParaRPr lang="en-GB">
               <a:solidFill>
@@ -6519,7 +6519,7 @@
                   </a:prstClr>
                 </a:solidFill>
               </a:rPr>
-              <a:t>14/12/2017</a:t>
+              <a:t>15/12/2017</a:t>
             </a:fld>
             <a:endParaRPr lang="en-GB">
               <a:solidFill>
@@ -7379,6 +7379,196 @@
   <p:clrMapOvr>
     <a:masterClrMapping/>
   </p:clrMapOvr>
+  <p:timing>
+    <p:tnLst>
+      <p:par>
+        <p:cTn id="1" dur="indefinite" restart="never" nodeType="tmRoot">
+          <p:childTnLst>
+            <p:seq concurrent="1" nextAc="seek">
+              <p:cTn id="2" dur="indefinite" nodeType="mainSeq">
+                <p:childTnLst>
+                  <p:par>
+                    <p:cTn id="3" fill="hold">
+                      <p:stCondLst>
+                        <p:cond delay="indefinite"/>
+                      </p:stCondLst>
+                      <p:childTnLst>
+                        <p:par>
+                          <p:cTn id="4" fill="hold">
+                            <p:stCondLst>
+                              <p:cond delay="0"/>
+                            </p:stCondLst>
+                            <p:childTnLst>
+                              <p:par>
+                                <p:cTn id="5" presetID="1" presetClass="entr" presetSubtype="0" fill="hold" nodeType="clickEffect">
+                                  <p:stCondLst>
+                                    <p:cond delay="0"/>
+                                  </p:stCondLst>
+                                  <p:childTnLst>
+                                    <p:set>
+                                      <p:cBhvr>
+                                        <p:cTn id="6" dur="1" fill="hold">
+                                          <p:stCondLst>
+                                            <p:cond delay="0"/>
+                                          </p:stCondLst>
+                                        </p:cTn>
+                                        <p:tgtEl>
+                                          <p:spTgt spid="3">
+                                            <p:txEl>
+                                              <p:pRg st="1" end="1"/>
+                                            </p:txEl>
+                                          </p:spTgt>
+                                        </p:tgtEl>
+                                        <p:attrNameLst>
+                                          <p:attrName>style.visibility</p:attrName>
+                                        </p:attrNameLst>
+                                      </p:cBhvr>
+                                      <p:to>
+                                        <p:strVal val="visible"/>
+                                      </p:to>
+                                    </p:set>
+                                  </p:childTnLst>
+                                </p:cTn>
+                              </p:par>
+                            </p:childTnLst>
+                          </p:cTn>
+                        </p:par>
+                      </p:childTnLst>
+                    </p:cTn>
+                  </p:par>
+                  <p:par>
+                    <p:cTn id="7" fill="hold">
+                      <p:stCondLst>
+                        <p:cond delay="indefinite"/>
+                      </p:stCondLst>
+                      <p:childTnLst>
+                        <p:par>
+                          <p:cTn id="8" fill="hold">
+                            <p:stCondLst>
+                              <p:cond delay="0"/>
+                            </p:stCondLst>
+                            <p:childTnLst>
+                              <p:par>
+                                <p:cTn id="9" presetID="1" presetClass="entr" presetSubtype="0" fill="hold" nodeType="clickEffect">
+                                  <p:stCondLst>
+                                    <p:cond delay="0"/>
+                                  </p:stCondLst>
+                                  <p:childTnLst>
+                                    <p:set>
+                                      <p:cBhvr>
+                                        <p:cTn id="10" dur="1" fill="hold">
+                                          <p:stCondLst>
+                                            <p:cond delay="0"/>
+                                          </p:stCondLst>
+                                        </p:cTn>
+                                        <p:tgtEl>
+                                          <p:spTgt spid="3">
+                                            <p:txEl>
+                                              <p:pRg st="3" end="3"/>
+                                            </p:txEl>
+                                          </p:spTgt>
+                                        </p:tgtEl>
+                                        <p:attrNameLst>
+                                          <p:attrName>style.visibility</p:attrName>
+                                        </p:attrNameLst>
+                                      </p:cBhvr>
+                                      <p:to>
+                                        <p:strVal val="visible"/>
+                                      </p:to>
+                                    </p:set>
+                                  </p:childTnLst>
+                                </p:cTn>
+                              </p:par>
+                              <p:par>
+                                <p:cTn id="11" presetID="1" presetClass="entr" presetSubtype="0" fill="hold" nodeType="withEffect">
+                                  <p:stCondLst>
+                                    <p:cond delay="0"/>
+                                  </p:stCondLst>
+                                  <p:childTnLst>
+                                    <p:set>
+                                      <p:cBhvr>
+                                        <p:cTn id="12" dur="1" fill="hold">
+                                          <p:stCondLst>
+                                            <p:cond delay="0"/>
+                                          </p:stCondLst>
+                                        </p:cTn>
+                                        <p:tgtEl>
+                                          <p:spTgt spid="3">
+                                            <p:txEl>
+                                              <p:pRg st="4" end="4"/>
+                                            </p:txEl>
+                                          </p:spTgt>
+                                        </p:tgtEl>
+                                        <p:attrNameLst>
+                                          <p:attrName>style.visibility</p:attrName>
+                                        </p:attrNameLst>
+                                      </p:cBhvr>
+                                      <p:to>
+                                        <p:strVal val="visible"/>
+                                      </p:to>
+                                    </p:set>
+                                  </p:childTnLst>
+                                </p:cTn>
+                              </p:par>
+                              <p:par>
+                                <p:cTn id="13" presetID="1" presetClass="entr" presetSubtype="0" fill="hold" nodeType="withEffect">
+                                  <p:stCondLst>
+                                    <p:cond delay="0"/>
+                                  </p:stCondLst>
+                                  <p:childTnLst>
+                                    <p:set>
+                                      <p:cBhvr>
+                                        <p:cTn id="14" dur="1" fill="hold">
+                                          <p:stCondLst>
+                                            <p:cond delay="0"/>
+                                          </p:stCondLst>
+                                        </p:cTn>
+                                        <p:tgtEl>
+                                          <p:spTgt spid="3">
+                                            <p:txEl>
+                                              <p:pRg st="5" end="5"/>
+                                            </p:txEl>
+                                          </p:spTgt>
+                                        </p:tgtEl>
+                                        <p:attrNameLst>
+                                          <p:attrName>style.visibility</p:attrName>
+                                        </p:attrNameLst>
+                                      </p:cBhvr>
+                                      <p:to>
+                                        <p:strVal val="visible"/>
+                                      </p:to>
+                                    </p:set>
+                                  </p:childTnLst>
+                                </p:cTn>
+                              </p:par>
+                            </p:childTnLst>
+                          </p:cTn>
+                        </p:par>
+                      </p:childTnLst>
+                    </p:cTn>
+                  </p:par>
+                </p:childTnLst>
+              </p:cTn>
+              <p:prevCondLst>
+                <p:cond evt="onPrev" delay="0">
+                  <p:tgtEl>
+                    <p:sldTgt/>
+                  </p:tgtEl>
+                </p:cond>
+              </p:prevCondLst>
+              <p:nextCondLst>
+                <p:cond evt="onNext" delay="0">
+                  <p:tgtEl>
+                    <p:sldTgt/>
+                  </p:tgtEl>
+                </p:cond>
+              </p:nextCondLst>
+            </p:seq>
+          </p:childTnLst>
+        </p:cTn>
+      </p:par>
+    </p:tnLst>
+  </p:timing>
 </p:sld>
 </file>
 
@@ -9527,6 +9717,116 @@
   <p:clrMapOvr>
     <a:masterClrMapping/>
   </p:clrMapOvr>
+  <p:timing>
+    <p:tnLst>
+      <p:par>
+        <p:cTn id="1" dur="indefinite" restart="never" nodeType="tmRoot">
+          <p:childTnLst>
+            <p:seq concurrent="1" nextAc="seek">
+              <p:cTn id="2" dur="indefinite" nodeType="mainSeq">
+                <p:childTnLst>
+                  <p:par>
+                    <p:cTn id="3" fill="hold">
+                      <p:stCondLst>
+                        <p:cond delay="indefinite"/>
+                      </p:stCondLst>
+                      <p:childTnLst>
+                        <p:par>
+                          <p:cTn id="4" fill="hold">
+                            <p:stCondLst>
+                              <p:cond delay="0"/>
+                            </p:stCondLst>
+                            <p:childTnLst>
+                              <p:par>
+                                <p:cTn id="5" presetID="1" presetClass="entr" presetSubtype="0" fill="hold" nodeType="clickEffect">
+                                  <p:stCondLst>
+                                    <p:cond delay="0"/>
+                                  </p:stCondLst>
+                                  <p:childTnLst>
+                                    <p:set>
+                                      <p:cBhvr>
+                                        <p:cTn id="6" dur="1" fill="hold">
+                                          <p:stCondLst>
+                                            <p:cond delay="0"/>
+                                          </p:stCondLst>
+                                        </p:cTn>
+                                        <p:tgtEl>
+                                          <p:spTgt spid="3">
+                                            <p:txEl>
+                                              <p:pRg st="8" end="8"/>
+                                            </p:txEl>
+                                          </p:spTgt>
+                                        </p:tgtEl>
+                                        <p:attrNameLst>
+                                          <p:attrName>style.visibility</p:attrName>
+                                        </p:attrNameLst>
+                                      </p:cBhvr>
+                                      <p:to>
+                                        <p:strVal val="visible"/>
+                                      </p:to>
+                                    </p:set>
+                                  </p:childTnLst>
+                                </p:cTn>
+                              </p:par>
+                              <p:par>
+                                <p:cTn id="7" presetID="1" presetClass="entr" presetSubtype="0" fill="hold" nodeType="withEffect">
+                                  <p:stCondLst>
+                                    <p:cond delay="0"/>
+                                  </p:stCondLst>
+                                  <p:childTnLst>
+                                    <p:set>
+                                      <p:cBhvr>
+                                        <p:cTn id="8" dur="1" fill="hold">
+                                          <p:stCondLst>
+                                            <p:cond delay="0"/>
+                                          </p:stCondLst>
+                                        </p:cTn>
+                                        <p:tgtEl>
+                                          <p:spTgt spid="3">
+                                            <p:txEl>
+                                              <p:pRg st="9" end="9"/>
+                                            </p:txEl>
+                                          </p:spTgt>
+                                        </p:tgtEl>
+                                        <p:attrNameLst>
+                                          <p:attrName>style.visibility</p:attrName>
+                                        </p:attrNameLst>
+                                      </p:cBhvr>
+                                      <p:to>
+                                        <p:strVal val="visible"/>
+                                      </p:to>
+                                    </p:set>
+                                  </p:childTnLst>
+                                </p:cTn>
+                              </p:par>
+                            </p:childTnLst>
+                          </p:cTn>
+                        </p:par>
+                      </p:childTnLst>
+                    </p:cTn>
+                  </p:par>
+                </p:childTnLst>
+              </p:cTn>
+              <p:prevCondLst>
+                <p:cond evt="onPrev" delay="0">
+                  <p:tgtEl>
+                    <p:sldTgt/>
+                  </p:tgtEl>
+                </p:cond>
+              </p:prevCondLst>
+              <p:nextCondLst>
+                <p:cond evt="onNext" delay="0">
+                  <p:tgtEl>
+                    <p:sldTgt/>
+                  </p:tgtEl>
+                </p:cond>
+              </p:nextCondLst>
+            </p:seq>
+          </p:childTnLst>
+        </p:cTn>
+      </p:par>
+    </p:tnLst>
+  </p:timing>
 </p:sld>
 </file>
 
@@ -14848,6 +15148,245 @@
   <p:clrMapOvr>
     <a:masterClrMapping/>
   </p:clrMapOvr>
+  <p:timing>
+    <p:tnLst>
+      <p:par>
+        <p:cTn id="1" dur="indefinite" restart="never" nodeType="tmRoot">
+          <p:childTnLst>
+            <p:seq concurrent="1" nextAc="seek">
+              <p:cTn id="2" dur="indefinite" nodeType="mainSeq">
+                <p:childTnLst>
+                  <p:par>
+                    <p:cTn id="3" fill="hold">
+                      <p:stCondLst>
+                        <p:cond delay="indefinite"/>
+                      </p:stCondLst>
+                      <p:childTnLst>
+                        <p:par>
+                          <p:cTn id="4" fill="hold">
+                            <p:stCondLst>
+                              <p:cond delay="0"/>
+                            </p:stCondLst>
+                            <p:childTnLst>
+                              <p:par>
+                                <p:cTn id="5" presetID="1" presetClass="entr" presetSubtype="0" fill="hold" nodeType="clickEffect">
+                                  <p:stCondLst>
+                                    <p:cond delay="0"/>
+                                  </p:stCondLst>
+                                  <p:childTnLst>
+                                    <p:set>
+                                      <p:cBhvr>
+                                        <p:cTn id="6" dur="1" fill="hold">
+                                          <p:stCondLst>
+                                            <p:cond delay="0"/>
+                                          </p:stCondLst>
+                                        </p:cTn>
+                                        <p:tgtEl>
+                                          <p:spTgt spid="3">
+                                            <p:txEl>
+                                              <p:pRg st="4" end="4"/>
+                                            </p:txEl>
+                                          </p:spTgt>
+                                        </p:tgtEl>
+                                        <p:attrNameLst>
+                                          <p:attrName>style.visibility</p:attrName>
+                                        </p:attrNameLst>
+                                      </p:cBhvr>
+                                      <p:to>
+                                        <p:strVal val="visible"/>
+                                      </p:to>
+                                    </p:set>
+                                  </p:childTnLst>
+                                </p:cTn>
+                              </p:par>
+                            </p:childTnLst>
+                          </p:cTn>
+                        </p:par>
+                      </p:childTnLst>
+                    </p:cTn>
+                  </p:par>
+                  <p:par>
+                    <p:cTn id="7" fill="hold">
+                      <p:stCondLst>
+                        <p:cond delay="indefinite"/>
+                      </p:stCondLst>
+                      <p:childTnLst>
+                        <p:par>
+                          <p:cTn id="8" fill="hold">
+                            <p:stCondLst>
+                              <p:cond delay="0"/>
+                            </p:stCondLst>
+                            <p:childTnLst>
+                              <p:par>
+                                <p:cTn id="9" presetID="1" presetClass="entr" presetSubtype="0" fill="hold" nodeType="clickEffect">
+                                  <p:stCondLst>
+                                    <p:cond delay="0"/>
+                                  </p:stCondLst>
+                                  <p:childTnLst>
+                                    <p:set>
+                                      <p:cBhvr>
+                                        <p:cTn id="10" dur="1" fill="hold">
+                                          <p:stCondLst>
+                                            <p:cond delay="0"/>
+                                          </p:stCondLst>
+                                        </p:cTn>
+                                        <p:tgtEl>
+                                          <p:spTgt spid="3">
+                                            <p:txEl>
+                                              <p:pRg st="5" end="5"/>
+                                            </p:txEl>
+                                          </p:spTgt>
+                                        </p:tgtEl>
+                                        <p:attrNameLst>
+                                          <p:attrName>style.visibility</p:attrName>
+                                        </p:attrNameLst>
+                                      </p:cBhvr>
+                                      <p:to>
+                                        <p:strVal val="visible"/>
+                                      </p:to>
+                                    </p:set>
+                                  </p:childTnLst>
+                                </p:cTn>
+                              </p:par>
+                            </p:childTnLst>
+                          </p:cTn>
+                        </p:par>
+                      </p:childTnLst>
+                    </p:cTn>
+                  </p:par>
+                  <p:par>
+                    <p:cTn id="11" fill="hold">
+                      <p:stCondLst>
+                        <p:cond delay="indefinite"/>
+                      </p:stCondLst>
+                      <p:childTnLst>
+                        <p:par>
+                          <p:cTn id="12" fill="hold">
+                            <p:stCondLst>
+                              <p:cond delay="0"/>
+                            </p:stCondLst>
+                            <p:childTnLst>
+                              <p:par>
+                                <p:cTn id="13" presetID="1" presetClass="entr" presetSubtype="0" fill="hold" nodeType="clickEffect">
+                                  <p:stCondLst>
+                                    <p:cond delay="0"/>
+                                  </p:stCondLst>
+                                  <p:childTnLst>
+                                    <p:set>
+                                      <p:cBhvr>
+                                        <p:cTn id="14" dur="1" fill="hold">
+                                          <p:stCondLst>
+                                            <p:cond delay="0"/>
+                                          </p:stCondLst>
+                                        </p:cTn>
+                                        <p:tgtEl>
+                                          <p:spTgt spid="3">
+                                            <p:txEl>
+                                              <p:pRg st="6" end="6"/>
+                                            </p:txEl>
+                                          </p:spTgt>
+                                        </p:tgtEl>
+                                        <p:attrNameLst>
+                                          <p:attrName>style.visibility</p:attrName>
+                                        </p:attrNameLst>
+                                      </p:cBhvr>
+                                      <p:to>
+                                        <p:strVal val="visible"/>
+                                      </p:to>
+                                    </p:set>
+                                  </p:childTnLst>
+                                </p:cTn>
+                              </p:par>
+                              <p:par>
+                                <p:cTn id="15" presetID="1" presetClass="entr" presetSubtype="0" fill="hold" nodeType="withEffect">
+                                  <p:stCondLst>
+                                    <p:cond delay="0"/>
+                                  </p:stCondLst>
+                                  <p:childTnLst>
+                                    <p:set>
+                                      <p:cBhvr>
+                                        <p:cTn id="16" dur="1" fill="hold">
+                                          <p:stCondLst>
+                                            <p:cond delay="0"/>
+                                          </p:stCondLst>
+                                        </p:cTn>
+                                        <p:tgtEl>
+                                          <p:spTgt spid="3">
+                                            <p:txEl>
+                                              <p:pRg st="7" end="7"/>
+                                            </p:txEl>
+                                          </p:spTgt>
+                                        </p:tgtEl>
+                                        <p:attrNameLst>
+                                          <p:attrName>style.visibility</p:attrName>
+                                        </p:attrNameLst>
+                                      </p:cBhvr>
+                                      <p:to>
+                                        <p:strVal val="visible"/>
+                                      </p:to>
+                                    </p:set>
+                                  </p:childTnLst>
+                                </p:cTn>
+                              </p:par>
+                              <p:par>
+                                <p:cTn id="17" presetID="1" presetClass="entr" presetSubtype="0" fill="hold" nodeType="withEffect">
+                                  <p:stCondLst>
+                                    <p:cond delay="0"/>
+                                  </p:stCondLst>
+                                  <p:childTnLst>
+                                    <p:set>
+                                      <p:cBhvr>
+                                        <p:cTn id="18" dur="1" fill="hold">
+                                          <p:stCondLst>
+                                            <p:cond delay="0"/>
+                                          </p:stCondLst>
+                                        </p:cTn>
+                                        <p:tgtEl>
+                                          <p:spTgt spid="3">
+                                            <p:txEl>
+                                              <p:pRg st="8" end="8"/>
+                                            </p:txEl>
+                                          </p:spTgt>
+                                        </p:tgtEl>
+                                        <p:attrNameLst>
+                                          <p:attrName>style.visibility</p:attrName>
+                                        </p:attrNameLst>
+                                      </p:cBhvr>
+                                      <p:to>
+                                        <p:strVal val="visible"/>
+                                      </p:to>
+                                    </p:set>
+                                  </p:childTnLst>
+                                </p:cTn>
+                              </p:par>
+                            </p:childTnLst>
+                          </p:cTn>
+                        </p:par>
+                      </p:childTnLst>
+                    </p:cTn>
+                  </p:par>
+                </p:childTnLst>
+              </p:cTn>
+              <p:prevCondLst>
+                <p:cond evt="onPrev" delay="0">
+                  <p:tgtEl>
+                    <p:sldTgt/>
+                  </p:tgtEl>
+                </p:cond>
+              </p:prevCondLst>
+              <p:nextCondLst>
+                <p:cond evt="onNext" delay="0">
+                  <p:tgtEl>
+                    <p:sldTgt/>
+                  </p:tgtEl>
+                </p:cond>
+              </p:nextCondLst>
+            </p:seq>
+          </p:childTnLst>
+        </p:cTn>
+      </p:par>
+    </p:tnLst>
+  </p:timing>
 </p:sld>
 </file>
 
@@ -16348,6 +16887,312 @@
   <p:clrMapOvr>
     <a:masterClrMapping/>
   </p:clrMapOvr>
+  <p:timing>
+    <p:tnLst>
+      <p:par>
+        <p:cTn id="1" dur="indefinite" restart="never" nodeType="tmRoot">
+          <p:childTnLst>
+            <p:seq concurrent="1" nextAc="seek">
+              <p:cTn id="2" dur="indefinite" nodeType="mainSeq">
+                <p:childTnLst>
+                  <p:par>
+                    <p:cTn id="3" fill="hold">
+                      <p:stCondLst>
+                        <p:cond delay="indefinite"/>
+                      </p:stCondLst>
+                      <p:childTnLst>
+                        <p:par>
+                          <p:cTn id="4" fill="hold">
+                            <p:stCondLst>
+                              <p:cond delay="0"/>
+                            </p:stCondLst>
+                            <p:childTnLst>
+                              <p:par>
+                                <p:cTn id="5" presetID="1" presetClass="entr" presetSubtype="0" fill="hold" nodeType="clickEffect">
+                                  <p:stCondLst>
+                                    <p:cond delay="0"/>
+                                  </p:stCondLst>
+                                  <p:childTnLst>
+                                    <p:set>
+                                      <p:cBhvr>
+                                        <p:cTn id="6" dur="1" fill="hold">
+                                          <p:stCondLst>
+                                            <p:cond delay="0"/>
+                                          </p:stCondLst>
+                                        </p:cTn>
+                                        <p:tgtEl>
+                                          <p:spTgt spid="3">
+                                            <p:txEl>
+                                              <p:pRg st="4" end="4"/>
+                                            </p:txEl>
+                                          </p:spTgt>
+                                        </p:tgtEl>
+                                        <p:attrNameLst>
+                                          <p:attrName>style.visibility</p:attrName>
+                                        </p:attrNameLst>
+                                      </p:cBhvr>
+                                      <p:to>
+                                        <p:strVal val="visible"/>
+                                      </p:to>
+                                    </p:set>
+                                  </p:childTnLst>
+                                </p:cTn>
+                              </p:par>
+                              <p:par>
+                                <p:cTn id="7" presetID="1" presetClass="entr" presetSubtype="0" fill="hold" nodeType="withEffect">
+                                  <p:stCondLst>
+                                    <p:cond delay="0"/>
+                                  </p:stCondLst>
+                                  <p:childTnLst>
+                                    <p:set>
+                                      <p:cBhvr>
+                                        <p:cTn id="8" dur="1" fill="hold">
+                                          <p:stCondLst>
+                                            <p:cond delay="0"/>
+                                          </p:stCondLst>
+                                        </p:cTn>
+                                        <p:tgtEl>
+                                          <p:spTgt spid="3">
+                                            <p:txEl>
+                                              <p:pRg st="7" end="7"/>
+                                            </p:txEl>
+                                          </p:spTgt>
+                                        </p:tgtEl>
+                                        <p:attrNameLst>
+                                          <p:attrName>style.visibility</p:attrName>
+                                        </p:attrNameLst>
+                                      </p:cBhvr>
+                                      <p:to>
+                                        <p:strVal val="visible"/>
+                                      </p:to>
+                                    </p:set>
+                                  </p:childTnLst>
+                                </p:cTn>
+                              </p:par>
+                            </p:childTnLst>
+                          </p:cTn>
+                        </p:par>
+                      </p:childTnLst>
+                    </p:cTn>
+                  </p:par>
+                  <p:par>
+                    <p:cTn id="9" fill="hold">
+                      <p:stCondLst>
+                        <p:cond delay="indefinite"/>
+                      </p:stCondLst>
+                      <p:childTnLst>
+                        <p:par>
+                          <p:cTn id="10" fill="hold">
+                            <p:stCondLst>
+                              <p:cond delay="0"/>
+                            </p:stCondLst>
+                            <p:childTnLst>
+                              <p:par>
+                                <p:cTn id="11" presetID="1" presetClass="entr" presetSubtype="0" fill="hold" nodeType="clickEffect">
+                                  <p:stCondLst>
+                                    <p:cond delay="0"/>
+                                  </p:stCondLst>
+                                  <p:childTnLst>
+                                    <p:set>
+                                      <p:cBhvr>
+                                        <p:cTn id="12" dur="1" fill="hold">
+                                          <p:stCondLst>
+                                            <p:cond delay="0"/>
+                                          </p:stCondLst>
+                                        </p:cTn>
+                                        <p:tgtEl>
+                                          <p:spTgt spid="3">
+                                            <p:txEl>
+                                              <p:pRg st="5" end="5"/>
+                                            </p:txEl>
+                                          </p:spTgt>
+                                        </p:tgtEl>
+                                        <p:attrNameLst>
+                                          <p:attrName>style.visibility</p:attrName>
+                                        </p:attrNameLst>
+                                      </p:cBhvr>
+                                      <p:to>
+                                        <p:strVal val="visible"/>
+                                      </p:to>
+                                    </p:set>
+                                  </p:childTnLst>
+                                </p:cTn>
+                              </p:par>
+                            </p:childTnLst>
+                          </p:cTn>
+                        </p:par>
+                      </p:childTnLst>
+                    </p:cTn>
+                  </p:par>
+                  <p:par>
+                    <p:cTn id="13" fill="hold">
+                      <p:stCondLst>
+                        <p:cond delay="indefinite"/>
+                      </p:stCondLst>
+                      <p:childTnLst>
+                        <p:par>
+                          <p:cTn id="14" fill="hold">
+                            <p:stCondLst>
+                              <p:cond delay="0"/>
+                            </p:stCondLst>
+                            <p:childTnLst>
+                              <p:par>
+                                <p:cTn id="15" presetID="1" presetClass="entr" presetSubtype="0" fill="hold" nodeType="clickEffect">
+                                  <p:stCondLst>
+                                    <p:cond delay="0"/>
+                                  </p:stCondLst>
+                                  <p:childTnLst>
+                                    <p:set>
+                                      <p:cBhvr>
+                                        <p:cTn id="16" dur="1" fill="hold">
+                                          <p:stCondLst>
+                                            <p:cond delay="0"/>
+                                          </p:stCondLst>
+                                        </p:cTn>
+                                        <p:tgtEl>
+                                          <p:spTgt spid="3">
+                                            <p:txEl>
+                                              <p:pRg st="6" end="6"/>
+                                            </p:txEl>
+                                          </p:spTgt>
+                                        </p:tgtEl>
+                                        <p:attrNameLst>
+                                          <p:attrName>style.visibility</p:attrName>
+                                        </p:attrNameLst>
+                                      </p:cBhvr>
+                                      <p:to>
+                                        <p:strVal val="visible"/>
+                                      </p:to>
+                                    </p:set>
+                                  </p:childTnLst>
+                                </p:cTn>
+                              </p:par>
+                            </p:childTnLst>
+                          </p:cTn>
+                        </p:par>
+                      </p:childTnLst>
+                    </p:cTn>
+                  </p:par>
+                  <p:par>
+                    <p:cTn id="17" fill="hold">
+                      <p:stCondLst>
+                        <p:cond delay="indefinite"/>
+                      </p:stCondLst>
+                      <p:childTnLst>
+                        <p:par>
+                          <p:cTn id="18" fill="hold">
+                            <p:stCondLst>
+                              <p:cond delay="0"/>
+                            </p:stCondLst>
+                            <p:childTnLst>
+                              <p:par>
+                                <p:cTn id="19" presetID="1" presetClass="entr" presetSubtype="0" fill="hold" nodeType="clickEffect">
+                                  <p:stCondLst>
+                                    <p:cond delay="0"/>
+                                  </p:stCondLst>
+                                  <p:childTnLst>
+                                    <p:set>
+                                      <p:cBhvr>
+                                        <p:cTn id="20" dur="1" fill="hold">
+                                          <p:stCondLst>
+                                            <p:cond delay="0"/>
+                                          </p:stCondLst>
+                                        </p:cTn>
+                                        <p:tgtEl>
+                                          <p:spTgt spid="3">
+                                            <p:txEl>
+                                              <p:pRg st="8" end="8"/>
+                                            </p:txEl>
+                                          </p:spTgt>
+                                        </p:tgtEl>
+                                        <p:attrNameLst>
+                                          <p:attrName>style.visibility</p:attrName>
+                                        </p:attrNameLst>
+                                      </p:cBhvr>
+                                      <p:to>
+                                        <p:strVal val="visible"/>
+                                      </p:to>
+                                    </p:set>
+                                  </p:childTnLst>
+                                </p:cTn>
+                              </p:par>
+                            </p:childTnLst>
+                          </p:cTn>
+                        </p:par>
+                      </p:childTnLst>
+                    </p:cTn>
+                  </p:par>
+                  <p:par>
+                    <p:cTn id="21" fill="hold">
+                      <p:stCondLst>
+                        <p:cond delay="indefinite"/>
+                      </p:stCondLst>
+                      <p:childTnLst>
+                        <p:par>
+                          <p:cTn id="22" fill="hold">
+                            <p:stCondLst>
+                              <p:cond delay="0"/>
+                            </p:stCondLst>
+                            <p:childTnLst>
+                              <p:par>
+                                <p:cTn id="23" presetID="1" presetClass="entr" presetSubtype="0" fill="hold" nodeType="clickEffect">
+                                  <p:stCondLst>
+                                    <p:cond delay="0"/>
+                                  </p:stCondLst>
+                                  <p:childTnLst>
+                                    <p:set>
+                                      <p:cBhvr>
+                                        <p:cTn id="24" dur="1" fill="hold">
+                                          <p:stCondLst>
+                                            <p:cond delay="0"/>
+                                          </p:stCondLst>
+                                        </p:cTn>
+                                        <p:tgtEl>
+                                          <p:spTgt spid="3">
+                                            <p:txEl>
+                                              <p:pRg st="9" end="9"/>
+                                            </p:txEl>
+                                          </p:spTgt>
+                                        </p:tgtEl>
+                                        <p:attrNameLst>
+                                          <p:attrName>style.visibility</p:attrName>
+                                        </p:attrNameLst>
+                                      </p:cBhvr>
+                                      <p:to>
+                                        <p:strVal val="visible"/>
+                                      </p:to>
+                                    </p:set>
+                                  </p:childTnLst>
+                                </p:cTn>
+                              </p:par>
+                            </p:childTnLst>
+                          </p:cTn>
+                        </p:par>
+                      </p:childTnLst>
+                    </p:cTn>
+                  </p:par>
+                </p:childTnLst>
+              </p:cTn>
+              <p:prevCondLst>
+                <p:cond evt="onPrev" delay="0">
+                  <p:tgtEl>
+                    <p:sldTgt/>
+                  </p:tgtEl>
+                </p:cond>
+              </p:prevCondLst>
+              <p:nextCondLst>
+                <p:cond evt="onNext" delay="0">
+                  <p:tgtEl>
+                    <p:sldTgt/>
+                  </p:tgtEl>
+                </p:cond>
+              </p:nextCondLst>
+            </p:seq>
+          </p:childTnLst>
+        </p:cTn>
+      </p:par>
+    </p:tnLst>
+  </p:timing>
 </p:sld>
 </file>
 
@@ -19771,6 +20616,294 @@
   <p:clrMapOvr>
     <a:masterClrMapping/>
   </p:clrMapOvr>
+  <p:timing>
+    <p:tnLst>
+      <p:par>
+        <p:cTn id="1" dur="indefinite" restart="never" nodeType="tmRoot">
+          <p:childTnLst>
+            <p:seq concurrent="1" nextAc="seek">
+              <p:cTn id="2" dur="indefinite" nodeType="mainSeq">
+                <p:childTnLst>
+                  <p:par>
+                    <p:cTn id="3" fill="hold">
+                      <p:stCondLst>
+                        <p:cond delay="indefinite"/>
+                      </p:stCondLst>
+                      <p:childTnLst>
+                        <p:par>
+                          <p:cTn id="4" fill="hold">
+                            <p:stCondLst>
+                              <p:cond delay="0"/>
+                            </p:stCondLst>
+                            <p:childTnLst>
+                              <p:par>
+                                <p:cTn id="5" presetID="1" presetClass="entr" presetSubtype="0" fill="hold" nodeType="clickEffect">
+                                  <p:stCondLst>
+                                    <p:cond delay="0"/>
+                                  </p:stCondLst>
+                                  <p:childTnLst>
+                                    <p:set>
+                                      <p:cBhvr>
+                                        <p:cTn id="6" dur="1" fill="hold">
+                                          <p:stCondLst>
+                                            <p:cond delay="0"/>
+                                          </p:stCondLst>
+                                        </p:cTn>
+                                        <p:tgtEl>
+                                          <p:spTgt spid="3">
+                                            <p:txEl>
+                                              <p:pRg st="2" end="2"/>
+                                            </p:txEl>
+                                          </p:spTgt>
+                                        </p:tgtEl>
+                                        <p:attrNameLst>
+                                          <p:attrName>style.visibility</p:attrName>
+                                        </p:attrNameLst>
+                                      </p:cBhvr>
+                                      <p:to>
+                                        <p:strVal val="visible"/>
+                                      </p:to>
+                                    </p:set>
+                                  </p:childTnLst>
+                                </p:cTn>
+                              </p:par>
+                            </p:childTnLst>
+                          </p:cTn>
+                        </p:par>
+                      </p:childTnLst>
+                    </p:cTn>
+                  </p:par>
+                  <p:par>
+                    <p:cTn id="7" fill="hold">
+                      <p:stCondLst>
+                        <p:cond delay="indefinite"/>
+                      </p:stCondLst>
+                      <p:childTnLst>
+                        <p:par>
+                          <p:cTn id="8" fill="hold">
+                            <p:stCondLst>
+                              <p:cond delay="0"/>
+                            </p:stCondLst>
+                            <p:childTnLst>
+                              <p:par>
+                                <p:cTn id="9" presetID="1" presetClass="entr" presetSubtype="0" fill="hold" nodeType="clickEffect">
+                                  <p:stCondLst>
+                                    <p:cond delay="0"/>
+                                  </p:stCondLst>
+                                  <p:childTnLst>
+                                    <p:set>
+                                      <p:cBhvr>
+                                        <p:cTn id="10" dur="1" fill="hold">
+                                          <p:stCondLst>
+                                            <p:cond delay="0"/>
+                                          </p:stCondLst>
+                                        </p:cTn>
+                                        <p:tgtEl>
+                                          <p:spTgt spid="3">
+                                            <p:txEl>
+                                              <p:pRg st="3" end="3"/>
+                                            </p:txEl>
+                                          </p:spTgt>
+                                        </p:tgtEl>
+                                        <p:attrNameLst>
+                                          <p:attrName>style.visibility</p:attrName>
+                                        </p:attrNameLst>
+                                      </p:cBhvr>
+                                      <p:to>
+                                        <p:strVal val="visible"/>
+                                      </p:to>
+                                    </p:set>
+                                  </p:childTnLst>
+                                </p:cTn>
+                              </p:par>
+                            </p:childTnLst>
+                          </p:cTn>
+                        </p:par>
+                      </p:childTnLst>
+                    </p:cTn>
+                  </p:par>
+                  <p:par>
+                    <p:cTn id="11" fill="hold">
+                      <p:stCondLst>
+                        <p:cond delay="indefinite"/>
+                      </p:stCondLst>
+                      <p:childTnLst>
+                        <p:par>
+                          <p:cTn id="12" fill="hold">
+                            <p:stCondLst>
+                              <p:cond delay="0"/>
+                            </p:stCondLst>
+                            <p:childTnLst>
+                              <p:par>
+                                <p:cTn id="13" presetID="1" presetClass="entr" presetSubtype="0" fill="hold" nodeType="clickEffect">
+                                  <p:stCondLst>
+                                    <p:cond delay="0"/>
+                                  </p:stCondLst>
+                                  <p:childTnLst>
+                                    <p:set>
+                                      <p:cBhvr>
+                                        <p:cTn id="14" dur="1" fill="hold">
+                                          <p:stCondLst>
+                                            <p:cond delay="0"/>
+                                          </p:stCondLst>
+                                        </p:cTn>
+                                        <p:tgtEl>
+                                          <p:spTgt spid="3">
+                                            <p:txEl>
+                                              <p:pRg st="4" end="4"/>
+                                            </p:txEl>
+                                          </p:spTgt>
+                                        </p:tgtEl>
+                                        <p:attrNameLst>
+                                          <p:attrName>style.visibility</p:attrName>
+                                        </p:attrNameLst>
+                                      </p:cBhvr>
+                                      <p:to>
+                                        <p:strVal val="visible"/>
+                                      </p:to>
+                                    </p:set>
+                                  </p:childTnLst>
+                                </p:cTn>
+                              </p:par>
+                            </p:childTnLst>
+                          </p:cTn>
+                        </p:par>
+                      </p:childTnLst>
+                    </p:cTn>
+                  </p:par>
+                  <p:par>
+                    <p:cTn id="15" fill="hold">
+                      <p:stCondLst>
+                        <p:cond delay="indefinite"/>
+                      </p:stCondLst>
+                      <p:childTnLst>
+                        <p:par>
+                          <p:cTn id="16" fill="hold">
+                            <p:stCondLst>
+                              <p:cond delay="0"/>
+                            </p:stCondLst>
+                            <p:childTnLst>
+                              <p:par>
+                                <p:cTn id="17" presetID="1" presetClass="entr" presetSubtype="0" fill="hold" nodeType="clickEffect">
+                                  <p:stCondLst>
+                                    <p:cond delay="0"/>
+                                  </p:stCondLst>
+                                  <p:childTnLst>
+                                    <p:set>
+                                      <p:cBhvr>
+                                        <p:cTn id="18" dur="1" fill="hold">
+                                          <p:stCondLst>
+                                            <p:cond delay="0"/>
+                                          </p:stCondLst>
+                                        </p:cTn>
+                                        <p:tgtEl>
+                                          <p:spTgt spid="3">
+                                            <p:txEl>
+                                              <p:pRg st="5" end="5"/>
+                                            </p:txEl>
+                                          </p:spTgt>
+                                        </p:tgtEl>
+                                        <p:attrNameLst>
+                                          <p:attrName>style.visibility</p:attrName>
+                                        </p:attrNameLst>
+                                      </p:cBhvr>
+                                      <p:to>
+                                        <p:strVal val="visible"/>
+                                      </p:to>
+                                    </p:set>
+                                  </p:childTnLst>
+                                </p:cTn>
+                              </p:par>
+                              <p:par>
+                                <p:cTn id="19" presetID="1" presetClass="entr" presetSubtype="0" fill="hold" nodeType="withEffect">
+                                  <p:stCondLst>
+                                    <p:cond delay="0"/>
+                                  </p:stCondLst>
+                                  <p:childTnLst>
+                                    <p:set>
+                                      <p:cBhvr>
+                                        <p:cTn id="20" dur="1" fill="hold">
+                                          <p:stCondLst>
+                                            <p:cond delay="0"/>
+                                          </p:stCondLst>
+                                        </p:cTn>
+                                        <p:tgtEl>
+                                          <p:spTgt spid="3">
+                                            <p:txEl>
+                                              <p:pRg st="6" end="6"/>
+                                            </p:txEl>
+                                          </p:spTgt>
+                                        </p:tgtEl>
+                                        <p:attrNameLst>
+                                          <p:attrName>style.visibility</p:attrName>
+                                        </p:attrNameLst>
+                                      </p:cBhvr>
+                                      <p:to>
+                                        <p:strVal val="visible"/>
+                                      </p:to>
+                                    </p:set>
+                                  </p:childTnLst>
+                                </p:cTn>
+                              </p:par>
+                              <p:par>
+                                <p:cTn id="21" presetID="1" presetClass="entr" presetSubtype="0" fill="hold" nodeType="withEffect">
+                                  <p:stCondLst>
+                                    <p:cond delay="0"/>
+                                  </p:stCondLst>
+                                  <p:childTnLst>
+                                    <p:set>
+                                      <p:cBhvr>
+                                        <p:cTn id="22" dur="1" fill="hold">
+                                          <p:stCondLst>
+                                            <p:cond delay="0"/>
+                                          </p:stCondLst>
+                                        </p:cTn>
+                                        <p:tgtEl>
+                                          <p:spTgt spid="3">
+                                            <p:txEl>
+                                              <p:pRg st="7" end="7"/>
+                                            </p:txEl>
+                                          </p:spTgt>
+                                        </p:tgtEl>
+                                        <p:attrNameLst>
+                                          <p:attrName>style.visibility</p:attrName>
+                                        </p:attrNameLst>
+                                      </p:cBhvr>
+                                      <p:to>
+                                        <p:strVal val="visible"/>
+                                      </p:to>
+                                    </p:set>
+                                  </p:childTnLst>
+                                </p:cTn>
+                              </p:par>
+                            </p:childTnLst>
+                          </p:cTn>
+                        </p:par>
+                      </p:childTnLst>
+                    </p:cTn>
+                  </p:par>
+                </p:childTnLst>
+              </p:cTn>
+              <p:prevCondLst>
+                <p:cond evt="onPrev" delay="0">
+                  <p:tgtEl>
+                    <p:sldTgt/>
+                  </p:tgtEl>
+                </p:cond>
+              </p:prevCondLst>
+              <p:nextCondLst>
+                <p:cond evt="onNext" delay="0">
+                  <p:tgtEl>
+                    <p:sldTgt/>
+                  </p:tgtEl>
+                </p:cond>
+              </p:nextCondLst>
+            </p:seq>
+          </p:childTnLst>
+        </p:cTn>
+      </p:par>
+    </p:tnLst>
+  </p:timing>
 </p:sld>
 </file>
 
@@ -21261,8 +22394,8 @@
           </a:p>
         </p:txBody>
       </p:sp>
-      <mc:AlternateContent xmlns:mc="http://schemas.openxmlformats.org/markup-compatibility/2006" xmlns:a14="http://schemas.microsoft.com/office/drawing/2010/main">
-        <mc:Choice Requires="a14">
+      <mc:AlternateContent xmlns:mc="http://schemas.openxmlformats.org/markup-compatibility/2006">
+        <mc:Choice xmlns:a14="http://schemas.microsoft.com/office/drawing/2010/main" Requires="a14">
           <p:sp>
             <p:nvSpPr>
               <p:cNvPr id="3" name="Content Placeholder 2"/>
@@ -21287,6 +22420,47 @@
                   <a:rPr lang="nl-NL" dirty="0"/>
                   <a:t>Tree </a:t>
                 </a:r>
+              </a:p>
+              <a:p>
+                <a:pPr lvl="1"/>
+                <a:r>
+                  <a:rPr lang="en-US" dirty="0"/>
+                  <a:t>nonlinear data structure made of </a:t>
+                </a:r>
+                <a:r>
+                  <a:rPr lang="en-US" i="1" dirty="0"/>
+                  <a:t>nodes</a:t>
+                </a:r>
+                <a:r>
+                  <a:rPr lang="en-US" dirty="0"/>
+                  <a:t> that models a hierarchical organization</a:t>
+                </a:r>
+              </a:p>
+              <a:p>
+                <a:pPr lvl="1"/>
+                <a:r>
+                  <a:rPr lang="en-US" dirty="0"/>
+                  <a:t>very common structure in computer science</a:t>
+                </a:r>
+              </a:p>
+              <a:p>
+                <a:pPr lvl="2"/>
+                <a:r>
+                  <a:rPr lang="en-US" dirty="0"/>
+                  <a:t>file systems, inheritance structure of Java classes, classification of Java types, etc…</a:t>
+                </a:r>
+              </a:p>
+              <a:p>
+                <a:endParaRPr lang="en-US" dirty="0"/>
+              </a:p>
+              <a:p>
+                <a:endParaRPr lang="en-US" dirty="0"/>
+              </a:p>
+              <a:p>
+                <a:r>
+                  <a:rPr lang="en-US" dirty="0"/>
+                  <a:t>Tree with no nodes </a:t>
+                </a:r>
                 <a14:m>
                   <m:oMath xmlns:m="http://schemas.openxmlformats.org/officeDocument/2006/math">
                     <m:r>
@@ -21298,57 +22472,6 @@
                   </m:oMath>
                 </a14:m>
                 <a:r>
-                  <a:rPr lang="nl-NL" dirty="0"/>
-                  <a:t> </a:t>
-                </a:r>
-                <a:r>
-                  <a:rPr lang="en-US" dirty="0"/>
-                  <a:t>nonlinear data structure made of </a:t>
-                </a:r>
-                <a:r>
-                  <a:rPr lang="en-US" i="1" dirty="0"/>
-                  <a:t>nodes</a:t>
-                </a:r>
-                <a:r>
-                  <a:rPr lang="en-US" dirty="0"/>
-                  <a:t> that models a hierarchical organization</a:t>
-                </a:r>
-              </a:p>
-              <a:p>
-                <a:endParaRPr lang="en-US" dirty="0"/>
-              </a:p>
-              <a:p>
-                <a:r>
-                  <a:rPr lang="en-US" dirty="0"/>
-                  <a:t>Very common structure in computer science</a:t>
-                </a:r>
-              </a:p>
-              <a:p>
-                <a:pPr lvl="1"/>
-                <a:r>
-                  <a:rPr lang="en-US" dirty="0"/>
-                  <a:t>file systems, inheritance structure of Java classes, classification of Java types, etc…</a:t>
-                </a:r>
-              </a:p>
-              <a:p>
-                <a:endParaRPr lang="en-US" dirty="0"/>
-              </a:p>
-              <a:p>
-                <a:r>
-                  <a:rPr lang="en-US" dirty="0"/>
-                  <a:t>Tree with no nodes </a:t>
-                </a:r>
-                <a14:m>
-                  <m:oMath xmlns:m="http://schemas.openxmlformats.org/officeDocument/2006/math">
-                    <m:r>
-                      <a:rPr lang="en-GB" i="1">
-                        <a:latin typeface="Cambria Math" panose="02040503050406030204" pitchFamily="18" charset="0"/>
-                      </a:rPr>
-                      <m:t>⇒</m:t>
-                    </m:r>
-                  </m:oMath>
-                </a14:m>
-                <a:r>
                   <a:rPr lang="en-US" dirty="0">
                     <a:sym typeface="Wingdings" panose="05000000000000000000" pitchFamily="2" charset="2"/>
                   </a:rPr>
@@ -21395,7 +22518,7 @@
             </p:txBody>
           </p:sp>
         </mc:Choice>
-        <mc:Fallback xmlns="">
+        <mc:Fallback>
           <p:sp>
             <p:nvSpPr>
               <p:cNvPr id="3" name="Content Placeholder 2"/>
@@ -21411,7 +22534,7 @@
                 <a:off x="677333" y="2160589"/>
                 <a:ext cx="8787679" cy="3880773"/>
               </a:xfrm>
-              <a:blipFill rotWithShape="0">
+              <a:blipFill>
                 <a:blip r:embed="rId2"/>
                 <a:stretch>
                   <a:fillRect l="-139" t="-942"/>
@@ -21423,7 +22546,7 @@
               <a:lstStyle/>
               <a:p>
                 <a:r>
-                  <a:rPr lang="en-GB">
+                  <a:rPr lang="nl-NL">
                     <a:noFill/>
                   </a:rPr>
                   <a:t> </a:t>
@@ -21478,6 +22601,165 @@
   <p:clrMapOvr>
     <a:masterClrMapping/>
   </p:clrMapOvr>
+  <p:timing>
+    <p:tnLst>
+      <p:par>
+        <p:cTn id="1" dur="indefinite" restart="never" nodeType="tmRoot">
+          <p:childTnLst>
+            <p:seq concurrent="1" nextAc="seek">
+              <p:cTn id="2" dur="indefinite" nodeType="mainSeq">
+                <p:childTnLst>
+                  <p:par>
+                    <p:cTn id="3" fill="hold">
+                      <p:stCondLst>
+                        <p:cond delay="indefinite"/>
+                      </p:stCondLst>
+                      <p:childTnLst>
+                        <p:par>
+                          <p:cTn id="4" fill="hold">
+                            <p:stCondLst>
+                              <p:cond delay="0"/>
+                            </p:stCondLst>
+                            <p:childTnLst>
+                              <p:par>
+                                <p:cTn id="5" presetID="1" presetClass="entr" presetSubtype="0" fill="hold" nodeType="clickEffect">
+                                  <p:stCondLst>
+                                    <p:cond delay="0"/>
+                                  </p:stCondLst>
+                                  <p:childTnLst>
+                                    <p:set>
+                                      <p:cBhvr>
+                                        <p:cTn id="6" dur="1" fill="hold">
+                                          <p:stCondLst>
+                                            <p:cond delay="0"/>
+                                          </p:stCondLst>
+                                        </p:cTn>
+                                        <p:tgtEl>
+                                          <p:spTgt spid="3">
+                                            <p:txEl>
+                                              <p:pRg st="6" end="6"/>
+                                            </p:txEl>
+                                          </p:spTgt>
+                                        </p:tgtEl>
+                                        <p:attrNameLst>
+                                          <p:attrName>style.visibility</p:attrName>
+                                        </p:attrNameLst>
+                                      </p:cBhvr>
+                                      <p:to>
+                                        <p:strVal val="visible"/>
+                                      </p:to>
+                                    </p:set>
+                                  </p:childTnLst>
+                                </p:cTn>
+                              </p:par>
+                            </p:childTnLst>
+                          </p:cTn>
+                        </p:par>
+                      </p:childTnLst>
+                    </p:cTn>
+                  </p:par>
+                  <p:par>
+                    <p:cTn id="7" fill="hold">
+                      <p:stCondLst>
+                        <p:cond delay="indefinite"/>
+                      </p:stCondLst>
+                      <p:childTnLst>
+                        <p:par>
+                          <p:cTn id="8" fill="hold">
+                            <p:stCondLst>
+                              <p:cond delay="0"/>
+                            </p:stCondLst>
+                            <p:childTnLst>
+                              <p:par>
+                                <p:cTn id="9" presetID="1" presetClass="entr" presetSubtype="0" fill="hold" nodeType="clickEffect">
+                                  <p:stCondLst>
+                                    <p:cond delay="0"/>
+                                  </p:stCondLst>
+                                  <p:childTnLst>
+                                    <p:set>
+                                      <p:cBhvr>
+                                        <p:cTn id="10" dur="1" fill="hold">
+                                          <p:stCondLst>
+                                            <p:cond delay="0"/>
+                                          </p:stCondLst>
+                                        </p:cTn>
+                                        <p:tgtEl>
+                                          <p:spTgt spid="3">
+                                            <p:txEl>
+                                              <p:pRg st="7" end="7"/>
+                                            </p:txEl>
+                                          </p:spTgt>
+                                        </p:tgtEl>
+                                        <p:attrNameLst>
+                                          <p:attrName>style.visibility</p:attrName>
+                                        </p:attrNameLst>
+                                      </p:cBhvr>
+                                      <p:to>
+                                        <p:strVal val="visible"/>
+                                      </p:to>
+                                    </p:set>
+                                  </p:childTnLst>
+                                </p:cTn>
+                              </p:par>
+                              <p:par>
+                                <p:cTn id="11" presetID="1" presetClass="entr" presetSubtype="0" fill="hold" nodeType="withEffect">
+                                  <p:stCondLst>
+                                    <p:cond delay="0"/>
+                                  </p:stCondLst>
+                                  <p:childTnLst>
+                                    <p:set>
+                                      <p:cBhvr>
+                                        <p:cTn id="12" dur="1" fill="hold">
+                                          <p:stCondLst>
+                                            <p:cond delay="0"/>
+                                          </p:stCondLst>
+                                        </p:cTn>
+                                        <p:tgtEl>
+                                          <p:spTgt spid="3">
+                                            <p:txEl>
+                                              <p:pRg st="8" end="8"/>
+                                            </p:txEl>
+                                          </p:spTgt>
+                                        </p:tgtEl>
+                                        <p:attrNameLst>
+                                          <p:attrName>style.visibility</p:attrName>
+                                        </p:attrNameLst>
+                                      </p:cBhvr>
+                                      <p:to>
+                                        <p:strVal val="visible"/>
+                                      </p:to>
+                                    </p:set>
+                                  </p:childTnLst>
+                                </p:cTn>
+                              </p:par>
+                            </p:childTnLst>
+                          </p:cTn>
+                        </p:par>
+                      </p:childTnLst>
+                    </p:cTn>
+                  </p:par>
+                </p:childTnLst>
+              </p:cTn>
+              <p:prevCondLst>
+                <p:cond evt="onPrev" delay="0">
+                  <p:tgtEl>
+                    <p:sldTgt/>
+                  </p:tgtEl>
+                </p:cond>
+              </p:prevCondLst>
+              <p:nextCondLst>
+                <p:cond evt="onNext" delay="0">
+                  <p:tgtEl>
+                    <p:sldTgt/>
+                  </p:tgtEl>
+                </p:cond>
+              </p:nextCondLst>
+            </p:seq>
+          </p:childTnLst>
+        </p:cTn>
+      </p:par>
+    </p:tnLst>
+  </p:timing>
 </p:sld>
 </file>
 
@@ -22156,6 +23438,205 @@
   <p:clrMapOvr>
     <a:masterClrMapping/>
   </p:clrMapOvr>
+  <p:timing>
+    <p:tnLst>
+      <p:par>
+        <p:cTn id="1" dur="indefinite" restart="never" nodeType="tmRoot">
+          <p:childTnLst>
+            <p:seq concurrent="1" nextAc="seek">
+              <p:cTn id="2" dur="indefinite" nodeType="mainSeq">
+                <p:childTnLst>
+                  <p:par>
+                    <p:cTn id="3" fill="hold">
+                      <p:stCondLst>
+                        <p:cond delay="indefinite"/>
+                      </p:stCondLst>
+                      <p:childTnLst>
+                        <p:par>
+                          <p:cTn id="4" fill="hold">
+                            <p:stCondLst>
+                              <p:cond delay="0"/>
+                            </p:stCondLst>
+                            <p:childTnLst>
+                              <p:par>
+                                <p:cTn id="5" presetID="1" presetClass="entr" presetSubtype="0" fill="hold" nodeType="clickEffect">
+                                  <p:stCondLst>
+                                    <p:cond delay="0"/>
+                                  </p:stCondLst>
+                                  <p:childTnLst>
+                                    <p:set>
+                                      <p:cBhvr>
+                                        <p:cTn id="6" dur="1" fill="hold">
+                                          <p:stCondLst>
+                                            <p:cond delay="0"/>
+                                          </p:stCondLst>
+                                        </p:cTn>
+                                        <p:tgtEl>
+                                          <p:spTgt spid="3">
+                                            <p:txEl>
+                                              <p:pRg st="1" end="1"/>
+                                            </p:txEl>
+                                          </p:spTgt>
+                                        </p:tgtEl>
+                                        <p:attrNameLst>
+                                          <p:attrName>style.visibility</p:attrName>
+                                        </p:attrNameLst>
+                                      </p:cBhvr>
+                                      <p:to>
+                                        <p:strVal val="visible"/>
+                                      </p:to>
+                                    </p:set>
+                                  </p:childTnLst>
+                                </p:cTn>
+                              </p:par>
+                              <p:par>
+                                <p:cTn id="7" presetID="1" presetClass="entr" presetSubtype="0" fill="hold" nodeType="withEffect">
+                                  <p:stCondLst>
+                                    <p:cond delay="0"/>
+                                  </p:stCondLst>
+                                  <p:childTnLst>
+                                    <p:set>
+                                      <p:cBhvr>
+                                        <p:cTn id="8" dur="1" fill="hold">
+                                          <p:stCondLst>
+                                            <p:cond delay="0"/>
+                                          </p:stCondLst>
+                                        </p:cTn>
+                                        <p:tgtEl>
+                                          <p:spTgt spid="3">
+                                            <p:txEl>
+                                              <p:pRg st="2" end="2"/>
+                                            </p:txEl>
+                                          </p:spTgt>
+                                        </p:tgtEl>
+                                        <p:attrNameLst>
+                                          <p:attrName>style.visibility</p:attrName>
+                                        </p:attrNameLst>
+                                      </p:cBhvr>
+                                      <p:to>
+                                        <p:strVal val="visible"/>
+                                      </p:to>
+                                    </p:set>
+                                  </p:childTnLst>
+                                </p:cTn>
+                              </p:par>
+                              <p:par>
+                                <p:cTn id="9" presetID="1" presetClass="entr" presetSubtype="0" fill="hold" nodeType="withEffect">
+                                  <p:stCondLst>
+                                    <p:cond delay="0"/>
+                                  </p:stCondLst>
+                                  <p:childTnLst>
+                                    <p:set>
+                                      <p:cBhvr>
+                                        <p:cTn id="10" dur="1" fill="hold">
+                                          <p:stCondLst>
+                                            <p:cond delay="0"/>
+                                          </p:stCondLst>
+                                        </p:cTn>
+                                        <p:tgtEl>
+                                          <p:spTgt spid="7">
+                                            <p:txEl>
+                                              <p:pRg st="3" end="3"/>
+                                            </p:txEl>
+                                          </p:spTgt>
+                                        </p:tgtEl>
+                                        <p:attrNameLst>
+                                          <p:attrName>style.visibility</p:attrName>
+                                        </p:attrNameLst>
+                                      </p:cBhvr>
+                                      <p:to>
+                                        <p:strVal val="visible"/>
+                                      </p:to>
+                                    </p:set>
+                                  </p:childTnLst>
+                                </p:cTn>
+                              </p:par>
+                              <p:par>
+                                <p:cTn id="11" presetID="1" presetClass="entr" presetSubtype="0" fill="hold" nodeType="withEffect">
+                                  <p:stCondLst>
+                                    <p:cond delay="0"/>
+                                  </p:stCondLst>
+                                  <p:childTnLst>
+                                    <p:set>
+                                      <p:cBhvr>
+                                        <p:cTn id="12" dur="1" fill="hold">
+                                          <p:stCondLst>
+                                            <p:cond delay="0"/>
+                                          </p:stCondLst>
+                                        </p:cTn>
+                                        <p:tgtEl>
+                                          <p:spTgt spid="7">
+                                            <p:txEl>
+                                              <p:pRg st="4" end="4"/>
+                                            </p:txEl>
+                                          </p:spTgt>
+                                        </p:tgtEl>
+                                        <p:attrNameLst>
+                                          <p:attrName>style.visibility</p:attrName>
+                                        </p:attrNameLst>
+                                      </p:cBhvr>
+                                      <p:to>
+                                        <p:strVal val="visible"/>
+                                      </p:to>
+                                    </p:set>
+                                  </p:childTnLst>
+                                </p:cTn>
+                              </p:par>
+                              <p:par>
+                                <p:cTn id="13" presetID="1" presetClass="entr" presetSubtype="0" fill="hold" nodeType="withEffect">
+                                  <p:stCondLst>
+                                    <p:cond delay="0"/>
+                                  </p:stCondLst>
+                                  <p:childTnLst>
+                                    <p:set>
+                                      <p:cBhvr>
+                                        <p:cTn id="14" dur="1" fill="hold">
+                                          <p:stCondLst>
+                                            <p:cond delay="0"/>
+                                          </p:stCondLst>
+                                        </p:cTn>
+                                        <p:tgtEl>
+                                          <p:spTgt spid="6"/>
+                                        </p:tgtEl>
+                                        <p:attrNameLst>
+                                          <p:attrName>style.visibility</p:attrName>
+                                        </p:attrNameLst>
+                                      </p:cBhvr>
+                                      <p:to>
+                                        <p:strVal val="visible"/>
+                                      </p:to>
+                                    </p:set>
+                                  </p:childTnLst>
+                                </p:cTn>
+                              </p:par>
+                            </p:childTnLst>
+                          </p:cTn>
+                        </p:par>
+                      </p:childTnLst>
+                    </p:cTn>
+                  </p:par>
+                </p:childTnLst>
+              </p:cTn>
+              <p:prevCondLst>
+                <p:cond evt="onPrev" delay="0">
+                  <p:tgtEl>
+                    <p:sldTgt/>
+                  </p:tgtEl>
+                </p:cond>
+              </p:prevCondLst>
+              <p:nextCondLst>
+                <p:cond evt="onNext" delay="0">
+                  <p:tgtEl>
+                    <p:sldTgt/>
+                  </p:tgtEl>
+                </p:cond>
+              </p:nextCondLst>
+            </p:seq>
+          </p:childTnLst>
+        </p:cTn>
+      </p:par>
+    </p:tnLst>
+  </p:timing>
 </p:sld>
 </file>
 
@@ -23248,6 +24729,339 @@
   <p:clrMapOvr>
     <a:masterClrMapping/>
   </p:clrMapOvr>
+  <p:timing>
+    <p:tnLst>
+      <p:par>
+        <p:cTn id="1" dur="indefinite" restart="never" nodeType="tmRoot">
+          <p:childTnLst>
+            <p:seq concurrent="1" nextAc="seek">
+              <p:cTn id="2" dur="indefinite" nodeType="mainSeq">
+                <p:childTnLst>
+                  <p:par>
+                    <p:cTn id="3" fill="hold">
+                      <p:stCondLst>
+                        <p:cond delay="indefinite"/>
+                      </p:stCondLst>
+                      <p:childTnLst>
+                        <p:par>
+                          <p:cTn id="4" fill="hold">
+                            <p:stCondLst>
+                              <p:cond delay="0"/>
+                            </p:stCondLst>
+                            <p:childTnLst>
+                              <p:par>
+                                <p:cTn id="5" presetID="1" presetClass="entr" presetSubtype="0" fill="hold" nodeType="clickEffect">
+                                  <p:stCondLst>
+                                    <p:cond delay="0"/>
+                                  </p:stCondLst>
+                                  <p:childTnLst>
+                                    <p:set>
+                                      <p:cBhvr>
+                                        <p:cTn id="6" dur="1" fill="hold">
+                                          <p:stCondLst>
+                                            <p:cond delay="0"/>
+                                          </p:stCondLst>
+                                        </p:cTn>
+                                        <p:tgtEl>
+                                          <p:spTgt spid="3">
+                                            <p:txEl>
+                                              <p:pRg st="1" end="1"/>
+                                            </p:txEl>
+                                          </p:spTgt>
+                                        </p:tgtEl>
+                                        <p:attrNameLst>
+                                          <p:attrName>style.visibility</p:attrName>
+                                        </p:attrNameLst>
+                                      </p:cBhvr>
+                                      <p:to>
+                                        <p:strVal val="visible"/>
+                                      </p:to>
+                                    </p:set>
+                                  </p:childTnLst>
+                                </p:cTn>
+                              </p:par>
+                            </p:childTnLst>
+                          </p:cTn>
+                        </p:par>
+                      </p:childTnLst>
+                    </p:cTn>
+                  </p:par>
+                  <p:par>
+                    <p:cTn id="7" fill="hold">
+                      <p:stCondLst>
+                        <p:cond delay="indefinite"/>
+                      </p:stCondLst>
+                      <p:childTnLst>
+                        <p:par>
+                          <p:cTn id="8" fill="hold">
+                            <p:stCondLst>
+                              <p:cond delay="0"/>
+                            </p:stCondLst>
+                            <p:childTnLst>
+                              <p:par>
+                                <p:cTn id="9" presetID="1" presetClass="entr" presetSubtype="0" fill="hold" nodeType="clickEffect">
+                                  <p:stCondLst>
+                                    <p:cond delay="0"/>
+                                  </p:stCondLst>
+                                  <p:childTnLst>
+                                    <p:set>
+                                      <p:cBhvr>
+                                        <p:cTn id="10" dur="1" fill="hold">
+                                          <p:stCondLst>
+                                            <p:cond delay="0"/>
+                                          </p:stCondLst>
+                                        </p:cTn>
+                                        <p:tgtEl>
+                                          <p:spTgt spid="3">
+                                            <p:txEl>
+                                              <p:pRg st="2" end="2"/>
+                                            </p:txEl>
+                                          </p:spTgt>
+                                        </p:tgtEl>
+                                        <p:attrNameLst>
+                                          <p:attrName>style.visibility</p:attrName>
+                                        </p:attrNameLst>
+                                      </p:cBhvr>
+                                      <p:to>
+                                        <p:strVal val="visible"/>
+                                      </p:to>
+                                    </p:set>
+                                  </p:childTnLst>
+                                </p:cTn>
+                              </p:par>
+                            </p:childTnLst>
+                          </p:cTn>
+                        </p:par>
+                      </p:childTnLst>
+                    </p:cTn>
+                  </p:par>
+                  <p:par>
+                    <p:cTn id="11" fill="hold">
+                      <p:stCondLst>
+                        <p:cond delay="indefinite"/>
+                      </p:stCondLst>
+                      <p:childTnLst>
+                        <p:par>
+                          <p:cTn id="12" fill="hold">
+                            <p:stCondLst>
+                              <p:cond delay="0"/>
+                            </p:stCondLst>
+                            <p:childTnLst>
+                              <p:par>
+                                <p:cTn id="13" presetID="1" presetClass="entr" presetSubtype="0" fill="hold" nodeType="clickEffect">
+                                  <p:stCondLst>
+                                    <p:cond delay="0"/>
+                                  </p:stCondLst>
+                                  <p:childTnLst>
+                                    <p:set>
+                                      <p:cBhvr>
+                                        <p:cTn id="14" dur="1" fill="hold">
+                                          <p:stCondLst>
+                                            <p:cond delay="0"/>
+                                          </p:stCondLst>
+                                        </p:cTn>
+                                        <p:tgtEl>
+                                          <p:spTgt spid="3">
+                                            <p:txEl>
+                                              <p:pRg st="3" end="3"/>
+                                            </p:txEl>
+                                          </p:spTgt>
+                                        </p:tgtEl>
+                                        <p:attrNameLst>
+                                          <p:attrName>style.visibility</p:attrName>
+                                        </p:attrNameLst>
+                                      </p:cBhvr>
+                                      <p:to>
+                                        <p:strVal val="visible"/>
+                                      </p:to>
+                                    </p:set>
+                                  </p:childTnLst>
+                                </p:cTn>
+                              </p:par>
+                            </p:childTnLst>
+                          </p:cTn>
+                        </p:par>
+                      </p:childTnLst>
+                    </p:cTn>
+                  </p:par>
+                  <p:par>
+                    <p:cTn id="15" fill="hold">
+                      <p:stCondLst>
+                        <p:cond delay="indefinite"/>
+                      </p:stCondLst>
+                      <p:childTnLst>
+                        <p:par>
+                          <p:cTn id="16" fill="hold">
+                            <p:stCondLst>
+                              <p:cond delay="0"/>
+                            </p:stCondLst>
+                            <p:childTnLst>
+                              <p:par>
+                                <p:cTn id="17" presetID="1" presetClass="entr" presetSubtype="0" fill="hold" nodeType="clickEffect">
+                                  <p:stCondLst>
+                                    <p:cond delay="0"/>
+                                  </p:stCondLst>
+                                  <p:childTnLst>
+                                    <p:set>
+                                      <p:cBhvr>
+                                        <p:cTn id="18" dur="1" fill="hold">
+                                          <p:stCondLst>
+                                            <p:cond delay="0"/>
+                                          </p:stCondLst>
+                                        </p:cTn>
+                                        <p:tgtEl>
+                                          <p:spTgt spid="3">
+                                            <p:txEl>
+                                              <p:pRg st="4" end="4"/>
+                                            </p:txEl>
+                                          </p:spTgt>
+                                        </p:tgtEl>
+                                        <p:attrNameLst>
+                                          <p:attrName>style.visibility</p:attrName>
+                                        </p:attrNameLst>
+                                      </p:cBhvr>
+                                      <p:to>
+                                        <p:strVal val="visible"/>
+                                      </p:to>
+                                    </p:set>
+                                  </p:childTnLst>
+                                </p:cTn>
+                              </p:par>
+                              <p:par>
+                                <p:cTn id="19" presetID="1" presetClass="entr" presetSubtype="0" fill="hold" nodeType="withEffect">
+                                  <p:stCondLst>
+                                    <p:cond delay="0"/>
+                                  </p:stCondLst>
+                                  <p:childTnLst>
+                                    <p:set>
+                                      <p:cBhvr>
+                                        <p:cTn id="20" dur="1" fill="hold">
+                                          <p:stCondLst>
+                                            <p:cond delay="0"/>
+                                          </p:stCondLst>
+                                        </p:cTn>
+                                        <p:tgtEl>
+                                          <p:spTgt spid="3">
+                                            <p:txEl>
+                                              <p:pRg st="5" end="5"/>
+                                            </p:txEl>
+                                          </p:spTgt>
+                                        </p:tgtEl>
+                                        <p:attrNameLst>
+                                          <p:attrName>style.visibility</p:attrName>
+                                        </p:attrNameLst>
+                                      </p:cBhvr>
+                                      <p:to>
+                                        <p:strVal val="visible"/>
+                                      </p:to>
+                                    </p:set>
+                                  </p:childTnLst>
+                                </p:cTn>
+                              </p:par>
+                              <p:par>
+                                <p:cTn id="21" presetID="1" presetClass="entr" presetSubtype="0" fill="hold" nodeType="withEffect">
+                                  <p:stCondLst>
+                                    <p:cond delay="0"/>
+                                  </p:stCondLst>
+                                  <p:childTnLst>
+                                    <p:set>
+                                      <p:cBhvr>
+                                        <p:cTn id="22" dur="1" fill="hold">
+                                          <p:stCondLst>
+                                            <p:cond delay="0"/>
+                                          </p:stCondLst>
+                                        </p:cTn>
+                                        <p:tgtEl>
+                                          <p:spTgt spid="3">
+                                            <p:txEl>
+                                              <p:pRg st="6" end="6"/>
+                                            </p:txEl>
+                                          </p:spTgt>
+                                        </p:tgtEl>
+                                        <p:attrNameLst>
+                                          <p:attrName>style.visibility</p:attrName>
+                                        </p:attrNameLst>
+                                      </p:cBhvr>
+                                      <p:to>
+                                        <p:strVal val="visible"/>
+                                      </p:to>
+                                    </p:set>
+                                  </p:childTnLst>
+                                </p:cTn>
+                              </p:par>
+                            </p:childTnLst>
+                          </p:cTn>
+                        </p:par>
+                      </p:childTnLst>
+                    </p:cTn>
+                  </p:par>
+                  <p:par>
+                    <p:cTn id="23" fill="hold">
+                      <p:stCondLst>
+                        <p:cond delay="indefinite"/>
+                      </p:stCondLst>
+                      <p:childTnLst>
+                        <p:par>
+                          <p:cTn id="24" fill="hold">
+                            <p:stCondLst>
+                              <p:cond delay="0"/>
+                            </p:stCondLst>
+                            <p:childTnLst>
+                              <p:par>
+                                <p:cTn id="25" presetID="1" presetClass="entr" presetSubtype="0" fill="hold" nodeType="clickEffect">
+                                  <p:stCondLst>
+                                    <p:cond delay="0"/>
+                                  </p:stCondLst>
+                                  <p:childTnLst>
+                                    <p:set>
+                                      <p:cBhvr>
+                                        <p:cTn id="26" dur="1" fill="hold">
+                                          <p:stCondLst>
+                                            <p:cond delay="0"/>
+                                          </p:stCondLst>
+                                        </p:cTn>
+                                        <p:tgtEl>
+                                          <p:spTgt spid="5"/>
+                                        </p:tgtEl>
+                                        <p:attrNameLst>
+                                          <p:attrName>style.visibility</p:attrName>
+                                        </p:attrNameLst>
+                                      </p:cBhvr>
+                                      <p:to>
+                                        <p:strVal val="visible"/>
+                                      </p:to>
+                                    </p:set>
+                                  </p:childTnLst>
+                                </p:cTn>
+                              </p:par>
+                            </p:childTnLst>
+                          </p:cTn>
+                        </p:par>
+                      </p:childTnLst>
+                    </p:cTn>
+                  </p:par>
+                </p:childTnLst>
+              </p:cTn>
+              <p:prevCondLst>
+                <p:cond evt="onPrev" delay="0">
+                  <p:tgtEl>
+                    <p:sldTgt/>
+                  </p:tgtEl>
+                </p:cond>
+              </p:prevCondLst>
+              <p:nextCondLst>
+                <p:cond evt="onNext" delay="0">
+                  <p:tgtEl>
+                    <p:sldTgt/>
+                  </p:tgtEl>
+                </p:cond>
+              </p:nextCondLst>
+            </p:seq>
+          </p:childTnLst>
+        </p:cTn>
+      </p:par>
+    </p:tnLst>
+  </p:timing>
 </p:sld>
 </file>
 
@@ -25093,6 +26907,139 @@
   <p:clrMapOvr>
     <a:masterClrMapping/>
   </p:clrMapOvr>
+  <p:timing>
+    <p:tnLst>
+      <p:par>
+        <p:cTn id="1" dur="indefinite" restart="never" nodeType="tmRoot">
+          <p:childTnLst>
+            <p:seq concurrent="1" nextAc="seek">
+              <p:cTn id="2" dur="indefinite" nodeType="mainSeq">
+                <p:childTnLst>
+                  <p:par>
+                    <p:cTn id="3" fill="hold">
+                      <p:stCondLst>
+                        <p:cond delay="indefinite"/>
+                      </p:stCondLst>
+                      <p:childTnLst>
+                        <p:par>
+                          <p:cTn id="4" fill="hold">
+                            <p:stCondLst>
+                              <p:cond delay="0"/>
+                            </p:stCondLst>
+                            <p:childTnLst>
+                              <p:par>
+                                <p:cTn id="5" presetID="1" presetClass="entr" presetSubtype="0" fill="hold" nodeType="clickEffect">
+                                  <p:stCondLst>
+                                    <p:cond delay="0"/>
+                                  </p:stCondLst>
+                                  <p:childTnLst>
+                                    <p:set>
+                                      <p:cBhvr>
+                                        <p:cTn id="6" dur="1" fill="hold">
+                                          <p:stCondLst>
+                                            <p:cond delay="0"/>
+                                          </p:stCondLst>
+                                        </p:cTn>
+                                        <p:tgtEl>
+                                          <p:spTgt spid="3">
+                                            <p:txEl>
+                                              <p:pRg st="5" end="5"/>
+                                            </p:txEl>
+                                          </p:spTgt>
+                                        </p:tgtEl>
+                                        <p:attrNameLst>
+                                          <p:attrName>style.visibility</p:attrName>
+                                        </p:attrNameLst>
+                                      </p:cBhvr>
+                                      <p:to>
+                                        <p:strVal val="visible"/>
+                                      </p:to>
+                                    </p:set>
+                                  </p:childTnLst>
+                                </p:cTn>
+                              </p:par>
+                              <p:par>
+                                <p:cTn id="7" presetID="1" presetClass="entr" presetSubtype="0" fill="hold" nodeType="withEffect">
+                                  <p:stCondLst>
+                                    <p:cond delay="0"/>
+                                  </p:stCondLst>
+                                  <p:childTnLst>
+                                    <p:set>
+                                      <p:cBhvr>
+                                        <p:cTn id="8" dur="1" fill="hold">
+                                          <p:stCondLst>
+                                            <p:cond delay="0"/>
+                                          </p:stCondLst>
+                                        </p:cTn>
+                                        <p:tgtEl>
+                                          <p:spTgt spid="1030"/>
+                                        </p:tgtEl>
+                                        <p:attrNameLst>
+                                          <p:attrName>style.visibility</p:attrName>
+                                        </p:attrNameLst>
+                                      </p:cBhvr>
+                                      <p:to>
+                                        <p:strVal val="visible"/>
+                                      </p:to>
+                                    </p:set>
+                                  </p:childTnLst>
+                                </p:cTn>
+                              </p:par>
+                              <p:par>
+                                <p:cTn id="9" presetID="1" presetClass="entr" presetSubtype="0" fill="hold" nodeType="withEffect">
+                                  <p:stCondLst>
+                                    <p:cond delay="0"/>
+                                  </p:stCondLst>
+                                  <p:childTnLst>
+                                    <p:set>
+                                      <p:cBhvr>
+                                        <p:cTn id="10" dur="1" fill="hold">
+                                          <p:stCondLst>
+                                            <p:cond delay="0"/>
+                                          </p:stCondLst>
+                                        </p:cTn>
+                                        <p:tgtEl>
+                                          <p:spTgt spid="1028"/>
+                                        </p:tgtEl>
+                                        <p:attrNameLst>
+                                          <p:attrName>style.visibility</p:attrName>
+                                        </p:attrNameLst>
+                                      </p:cBhvr>
+                                      <p:to>
+                                        <p:strVal val="visible"/>
+                                      </p:to>
+                                    </p:set>
+                                  </p:childTnLst>
+                                </p:cTn>
+                              </p:par>
+                            </p:childTnLst>
+                          </p:cTn>
+                        </p:par>
+                      </p:childTnLst>
+                    </p:cTn>
+                  </p:par>
+                </p:childTnLst>
+              </p:cTn>
+              <p:prevCondLst>
+                <p:cond evt="onPrev" delay="0">
+                  <p:tgtEl>
+                    <p:sldTgt/>
+                  </p:tgtEl>
+                </p:cond>
+              </p:prevCondLst>
+              <p:nextCondLst>
+                <p:cond evt="onNext" delay="0">
+                  <p:tgtEl>
+                    <p:sldTgt/>
+                  </p:tgtEl>
+                </p:cond>
+              </p:nextCondLst>
+            </p:seq>
+          </p:childTnLst>
+        </p:cTn>
+      </p:par>
+    </p:tnLst>
+  </p:timing>
 </p:sld>
 </file>
 
@@ -27452,8 +29399,8 @@
           </a:p>
         </p:txBody>
       </p:sp>
-      <mc:AlternateContent xmlns:mc="http://schemas.openxmlformats.org/markup-compatibility/2006">
-        <mc:Choice xmlns:a14="http://schemas.microsoft.com/office/drawing/2010/main" Requires="a14">
+      <mc:AlternateContent xmlns:mc="http://schemas.openxmlformats.org/markup-compatibility/2006" xmlns:a14="http://schemas.microsoft.com/office/drawing/2010/main">
+        <mc:Choice Requires="a14">
           <p:sp>
             <p:nvSpPr>
               <p:cNvPr id="3" name="Content Placeholder 2"/>
@@ -27564,7 +29511,7 @@
             </p:txBody>
           </p:sp>
         </mc:Choice>
-        <mc:Fallback>
+        <mc:Fallback xmlns="">
           <p:sp>
             <p:nvSpPr>
               <p:cNvPr id="3" name="Content Placeholder 2"/>
@@ -28218,6 +30165,254 @@
   <p:clrMapOvr>
     <a:masterClrMapping/>
   </p:clrMapOvr>
+  <p:timing>
+    <p:tnLst>
+      <p:par>
+        <p:cTn id="1" dur="indefinite" restart="never" nodeType="tmRoot">
+          <p:childTnLst>
+            <p:seq concurrent="1" nextAc="seek">
+              <p:cTn id="2" dur="indefinite" nodeType="mainSeq">
+                <p:childTnLst>
+                  <p:par>
+                    <p:cTn id="3" fill="hold">
+                      <p:stCondLst>
+                        <p:cond delay="indefinite"/>
+                      </p:stCondLst>
+                      <p:childTnLst>
+                        <p:par>
+                          <p:cTn id="4" fill="hold">
+                            <p:stCondLst>
+                              <p:cond delay="0"/>
+                            </p:stCondLst>
+                            <p:childTnLst>
+                              <p:par>
+                                <p:cTn id="5" presetID="1" presetClass="entr" presetSubtype="0" fill="hold" nodeType="clickEffect">
+                                  <p:stCondLst>
+                                    <p:cond delay="0"/>
+                                  </p:stCondLst>
+                                  <p:childTnLst>
+                                    <p:set>
+                                      <p:cBhvr>
+                                        <p:cTn id="6" dur="1" fill="hold">
+                                          <p:stCondLst>
+                                            <p:cond delay="0"/>
+                                          </p:stCondLst>
+                                        </p:cTn>
+                                        <p:tgtEl>
+                                          <p:spTgt spid="3">
+                                            <p:txEl>
+                                              <p:pRg st="3" end="3"/>
+                                            </p:txEl>
+                                          </p:spTgt>
+                                        </p:tgtEl>
+                                        <p:attrNameLst>
+                                          <p:attrName>style.visibility</p:attrName>
+                                        </p:attrNameLst>
+                                      </p:cBhvr>
+                                      <p:to>
+                                        <p:strVal val="visible"/>
+                                      </p:to>
+                                    </p:set>
+                                  </p:childTnLst>
+                                </p:cTn>
+                              </p:par>
+                              <p:par>
+                                <p:cTn id="7" presetID="1" presetClass="entr" presetSubtype="0" fill="hold" nodeType="withEffect">
+                                  <p:stCondLst>
+                                    <p:cond delay="0"/>
+                                  </p:stCondLst>
+                                  <p:childTnLst>
+                                    <p:set>
+                                      <p:cBhvr>
+                                        <p:cTn id="8" dur="1" fill="hold">
+                                          <p:stCondLst>
+                                            <p:cond delay="0"/>
+                                          </p:stCondLst>
+                                        </p:cTn>
+                                        <p:tgtEl>
+                                          <p:spTgt spid="3">
+                                            <p:txEl>
+                                              <p:pRg st="4" end="4"/>
+                                            </p:txEl>
+                                          </p:spTgt>
+                                        </p:tgtEl>
+                                        <p:attrNameLst>
+                                          <p:attrName>style.visibility</p:attrName>
+                                        </p:attrNameLst>
+                                      </p:cBhvr>
+                                      <p:to>
+                                        <p:strVal val="visible"/>
+                                      </p:to>
+                                    </p:set>
+                                  </p:childTnLst>
+                                </p:cTn>
+                              </p:par>
+                              <p:par>
+                                <p:cTn id="9" presetID="1" presetClass="entr" presetSubtype="0" fill="hold" nodeType="withEffect">
+                                  <p:stCondLst>
+                                    <p:cond delay="0"/>
+                                  </p:stCondLst>
+                                  <p:childTnLst>
+                                    <p:set>
+                                      <p:cBhvr>
+                                        <p:cTn id="10" dur="1" fill="hold">
+                                          <p:stCondLst>
+                                            <p:cond delay="0"/>
+                                          </p:stCondLst>
+                                        </p:cTn>
+                                        <p:tgtEl>
+                                          <p:spTgt spid="3">
+                                            <p:txEl>
+                                              <p:pRg st="5" end="5"/>
+                                            </p:txEl>
+                                          </p:spTgt>
+                                        </p:tgtEl>
+                                        <p:attrNameLst>
+                                          <p:attrName>style.visibility</p:attrName>
+                                        </p:attrNameLst>
+                                      </p:cBhvr>
+                                      <p:to>
+                                        <p:strVal val="visible"/>
+                                      </p:to>
+                                    </p:set>
+                                  </p:childTnLst>
+                                </p:cTn>
+                              </p:par>
+                              <p:par>
+                                <p:cTn id="11" presetID="1" presetClass="entr" presetSubtype="0" fill="hold" nodeType="withEffect">
+                                  <p:stCondLst>
+                                    <p:cond delay="0"/>
+                                  </p:stCondLst>
+                                  <p:childTnLst>
+                                    <p:set>
+                                      <p:cBhvr>
+                                        <p:cTn id="12" dur="1" fill="hold">
+                                          <p:stCondLst>
+                                            <p:cond delay="0"/>
+                                          </p:stCondLst>
+                                        </p:cTn>
+                                        <p:tgtEl>
+                                          <p:spTgt spid="3">
+                                            <p:txEl>
+                                              <p:pRg st="6" end="6"/>
+                                            </p:txEl>
+                                          </p:spTgt>
+                                        </p:tgtEl>
+                                        <p:attrNameLst>
+                                          <p:attrName>style.visibility</p:attrName>
+                                        </p:attrNameLst>
+                                      </p:cBhvr>
+                                      <p:to>
+                                        <p:strVal val="visible"/>
+                                      </p:to>
+                                    </p:set>
+                                  </p:childTnLst>
+                                </p:cTn>
+                              </p:par>
+                              <p:par>
+                                <p:cTn id="13" presetID="1" presetClass="entr" presetSubtype="0" fill="hold" nodeType="withEffect">
+                                  <p:stCondLst>
+                                    <p:cond delay="0"/>
+                                  </p:stCondLst>
+                                  <p:childTnLst>
+                                    <p:set>
+                                      <p:cBhvr>
+                                        <p:cTn id="14" dur="1" fill="hold">
+                                          <p:stCondLst>
+                                            <p:cond delay="0"/>
+                                          </p:stCondLst>
+                                        </p:cTn>
+                                        <p:tgtEl>
+                                          <p:spTgt spid="3">
+                                            <p:txEl>
+                                              <p:pRg st="7" end="7"/>
+                                            </p:txEl>
+                                          </p:spTgt>
+                                        </p:tgtEl>
+                                        <p:attrNameLst>
+                                          <p:attrName>style.visibility</p:attrName>
+                                        </p:attrNameLst>
+                                      </p:cBhvr>
+                                      <p:to>
+                                        <p:strVal val="visible"/>
+                                      </p:to>
+                                    </p:set>
+                                  </p:childTnLst>
+                                </p:cTn>
+                              </p:par>
+                            </p:childTnLst>
+                          </p:cTn>
+                        </p:par>
+                      </p:childTnLst>
+                    </p:cTn>
+                  </p:par>
+                  <p:par>
+                    <p:cTn id="15" fill="hold">
+                      <p:stCondLst>
+                        <p:cond delay="indefinite"/>
+                      </p:stCondLst>
+                      <p:childTnLst>
+                        <p:par>
+                          <p:cTn id="16" fill="hold">
+                            <p:stCondLst>
+                              <p:cond delay="0"/>
+                            </p:stCondLst>
+                            <p:childTnLst>
+                              <p:par>
+                                <p:cTn id="17" presetID="1" presetClass="entr" presetSubtype="0" fill="hold" nodeType="clickEffect">
+                                  <p:stCondLst>
+                                    <p:cond delay="0"/>
+                                  </p:stCondLst>
+                                  <p:childTnLst>
+                                    <p:set>
+                                      <p:cBhvr>
+                                        <p:cTn id="18" dur="1" fill="hold">
+                                          <p:stCondLst>
+                                            <p:cond delay="0"/>
+                                          </p:stCondLst>
+                                        </p:cTn>
+                                        <p:tgtEl>
+                                          <p:spTgt spid="5"/>
+                                        </p:tgtEl>
+                                        <p:attrNameLst>
+                                          <p:attrName>style.visibility</p:attrName>
+                                        </p:attrNameLst>
+                                      </p:cBhvr>
+                                      <p:to>
+                                        <p:strVal val="visible"/>
+                                      </p:to>
+                                    </p:set>
+                                  </p:childTnLst>
+                                </p:cTn>
+                              </p:par>
+                            </p:childTnLst>
+                          </p:cTn>
+                        </p:par>
+                      </p:childTnLst>
+                    </p:cTn>
+                  </p:par>
+                </p:childTnLst>
+              </p:cTn>
+              <p:prevCondLst>
+                <p:cond evt="onPrev" delay="0">
+                  <p:tgtEl>
+                    <p:sldTgt/>
+                  </p:tgtEl>
+                </p:cond>
+              </p:prevCondLst>
+              <p:nextCondLst>
+                <p:cond evt="onNext" delay="0">
+                  <p:tgtEl>
+                    <p:sldTgt/>
+                  </p:tgtEl>
+                </p:cond>
+              </p:nextCondLst>
+            </p:seq>
+          </p:childTnLst>
+        </p:cTn>
+      </p:par>
+    </p:tnLst>
+  </p:timing>
 </p:sld>
 </file>
 
@@ -28260,8 +30455,8 @@
           </a:p>
         </p:txBody>
       </p:sp>
-      <mc:AlternateContent xmlns:mc="http://schemas.openxmlformats.org/markup-compatibility/2006" xmlns:a14="http://schemas.microsoft.com/office/drawing/2010/main">
-        <mc:Choice Requires="a14">
+      <mc:AlternateContent xmlns:mc="http://schemas.openxmlformats.org/markup-compatibility/2006">
+        <mc:Choice xmlns:a14="http://schemas.microsoft.com/office/drawing/2010/main" Requires="a14">
           <p:sp>
             <p:nvSpPr>
               <p:cNvPr id="3" name="Content Placeholder 2"/>
@@ -28286,7 +30481,7 @@
                 <a:pPr lvl="1"/>
                 <a:r>
                   <a:rPr lang="en-GB" dirty="0"/>
-                  <a:t>Number of nodes it contain</a:t>
+                  <a:t>Number of nodes it contains</a:t>
                 </a:r>
               </a:p>
               <a:p>
@@ -28582,7 +30777,7 @@
             </p:txBody>
           </p:sp>
         </mc:Choice>
-        <mc:Fallback xmlns="">
+        <mc:Fallback>
           <p:sp>
             <p:nvSpPr>
               <p:cNvPr id="3" name="Content Placeholder 2"/>
@@ -28594,7 +30789,7 @@
               </p:nvPr>
             </p:nvSpPr>
             <p:spPr>
-              <a:blipFill rotWithShape="0">
+              <a:blipFill>
                 <a:blip r:embed="rId2"/>
                 <a:stretch>
                   <a:fillRect l="-142" t="-942"/>
@@ -28606,7 +30801,7 @@
               <a:lstStyle/>
               <a:p>
                 <a:r>
-                  <a:rPr lang="en-GB">
+                  <a:rPr lang="nl-NL">
                     <a:noFill/>
                   </a:rPr>
                   <a:t> </a:t>
@@ -28702,6 +30897,294 @@
   <p:clrMapOvr>
     <a:masterClrMapping/>
   </p:clrMapOvr>
+  <p:timing>
+    <p:tnLst>
+      <p:par>
+        <p:cTn id="1" dur="indefinite" restart="never" nodeType="tmRoot">
+          <p:childTnLst>
+            <p:seq concurrent="1" nextAc="seek">
+              <p:cTn id="2" dur="indefinite" nodeType="mainSeq">
+                <p:childTnLst>
+                  <p:par>
+                    <p:cTn id="3" fill="hold">
+                      <p:stCondLst>
+                        <p:cond delay="indefinite"/>
+                      </p:stCondLst>
+                      <p:childTnLst>
+                        <p:par>
+                          <p:cTn id="4" fill="hold">
+                            <p:stCondLst>
+                              <p:cond delay="0"/>
+                            </p:stCondLst>
+                            <p:childTnLst>
+                              <p:par>
+                                <p:cTn id="5" presetID="1" presetClass="entr" presetSubtype="0" fill="hold" nodeType="clickEffect">
+                                  <p:stCondLst>
+                                    <p:cond delay="0"/>
+                                  </p:stCondLst>
+                                  <p:childTnLst>
+                                    <p:set>
+                                      <p:cBhvr>
+                                        <p:cTn id="6" dur="1" fill="hold">
+                                          <p:stCondLst>
+                                            <p:cond delay="0"/>
+                                          </p:stCondLst>
+                                        </p:cTn>
+                                        <p:tgtEl>
+                                          <p:spTgt spid="3">
+                                            <p:txEl>
+                                              <p:pRg st="1" end="1"/>
+                                            </p:txEl>
+                                          </p:spTgt>
+                                        </p:tgtEl>
+                                        <p:attrNameLst>
+                                          <p:attrName>style.visibility</p:attrName>
+                                        </p:attrNameLst>
+                                      </p:cBhvr>
+                                      <p:to>
+                                        <p:strVal val="visible"/>
+                                      </p:to>
+                                    </p:set>
+                                  </p:childTnLst>
+                                </p:cTn>
+                              </p:par>
+                              <p:par>
+                                <p:cTn id="7" presetID="1" presetClass="entr" presetSubtype="0" fill="hold" nodeType="withEffect">
+                                  <p:stCondLst>
+                                    <p:cond delay="0"/>
+                                  </p:stCondLst>
+                                  <p:childTnLst>
+                                    <p:set>
+                                      <p:cBhvr>
+                                        <p:cTn id="8" dur="1" fill="hold">
+                                          <p:stCondLst>
+                                            <p:cond delay="0"/>
+                                          </p:stCondLst>
+                                        </p:cTn>
+                                        <p:tgtEl>
+                                          <p:spTgt spid="3">
+                                            <p:txEl>
+                                              <p:pRg st="2" end="2"/>
+                                            </p:txEl>
+                                          </p:spTgt>
+                                        </p:tgtEl>
+                                        <p:attrNameLst>
+                                          <p:attrName>style.visibility</p:attrName>
+                                        </p:attrNameLst>
+                                      </p:cBhvr>
+                                      <p:to>
+                                        <p:strVal val="visible"/>
+                                      </p:to>
+                                    </p:set>
+                                  </p:childTnLst>
+                                </p:cTn>
+                              </p:par>
+                            </p:childTnLst>
+                          </p:cTn>
+                        </p:par>
+                      </p:childTnLst>
+                    </p:cTn>
+                  </p:par>
+                  <p:par>
+                    <p:cTn id="9" fill="hold">
+                      <p:stCondLst>
+                        <p:cond delay="indefinite"/>
+                      </p:stCondLst>
+                      <p:childTnLst>
+                        <p:par>
+                          <p:cTn id="10" fill="hold">
+                            <p:stCondLst>
+                              <p:cond delay="0"/>
+                            </p:stCondLst>
+                            <p:childTnLst>
+                              <p:par>
+                                <p:cTn id="11" presetID="1" presetClass="entr" presetSubtype="0" fill="hold" nodeType="clickEffect">
+                                  <p:stCondLst>
+                                    <p:cond delay="0"/>
+                                  </p:stCondLst>
+                                  <p:childTnLst>
+                                    <p:set>
+                                      <p:cBhvr>
+                                        <p:cTn id="12" dur="1" fill="hold">
+                                          <p:stCondLst>
+                                            <p:cond delay="0"/>
+                                          </p:stCondLst>
+                                        </p:cTn>
+                                        <p:tgtEl>
+                                          <p:spTgt spid="3">
+                                            <p:txEl>
+                                              <p:pRg st="4" end="4"/>
+                                            </p:txEl>
+                                          </p:spTgt>
+                                        </p:tgtEl>
+                                        <p:attrNameLst>
+                                          <p:attrName>style.visibility</p:attrName>
+                                        </p:attrNameLst>
+                                      </p:cBhvr>
+                                      <p:to>
+                                        <p:strVal val="visible"/>
+                                      </p:to>
+                                    </p:set>
+                                  </p:childTnLst>
+                                </p:cTn>
+                              </p:par>
+                              <p:par>
+                                <p:cTn id="13" presetID="1" presetClass="entr" presetSubtype="0" fill="hold" nodeType="withEffect">
+                                  <p:stCondLst>
+                                    <p:cond delay="0"/>
+                                  </p:stCondLst>
+                                  <p:childTnLst>
+                                    <p:set>
+                                      <p:cBhvr>
+                                        <p:cTn id="14" dur="1" fill="hold">
+                                          <p:stCondLst>
+                                            <p:cond delay="0"/>
+                                          </p:stCondLst>
+                                        </p:cTn>
+                                        <p:tgtEl>
+                                          <p:spTgt spid="3">
+                                            <p:txEl>
+                                              <p:pRg st="5" end="5"/>
+                                            </p:txEl>
+                                          </p:spTgt>
+                                        </p:tgtEl>
+                                        <p:attrNameLst>
+                                          <p:attrName>style.visibility</p:attrName>
+                                        </p:attrNameLst>
+                                      </p:cBhvr>
+                                      <p:to>
+                                        <p:strVal val="visible"/>
+                                      </p:to>
+                                    </p:set>
+                                  </p:childTnLst>
+                                </p:cTn>
+                              </p:par>
+                            </p:childTnLst>
+                          </p:cTn>
+                        </p:par>
+                      </p:childTnLst>
+                    </p:cTn>
+                  </p:par>
+                  <p:par>
+                    <p:cTn id="15" fill="hold">
+                      <p:stCondLst>
+                        <p:cond delay="indefinite"/>
+                      </p:stCondLst>
+                      <p:childTnLst>
+                        <p:par>
+                          <p:cTn id="16" fill="hold">
+                            <p:stCondLst>
+                              <p:cond delay="0"/>
+                            </p:stCondLst>
+                            <p:childTnLst>
+                              <p:par>
+                                <p:cTn id="17" presetID="1" presetClass="entr" presetSubtype="0" fill="hold" nodeType="clickEffect">
+                                  <p:stCondLst>
+                                    <p:cond delay="0"/>
+                                  </p:stCondLst>
+                                  <p:childTnLst>
+                                    <p:set>
+                                      <p:cBhvr>
+                                        <p:cTn id="18" dur="1" fill="hold">
+                                          <p:stCondLst>
+                                            <p:cond delay="0"/>
+                                          </p:stCondLst>
+                                        </p:cTn>
+                                        <p:tgtEl>
+                                          <p:spTgt spid="3">
+                                            <p:txEl>
+                                              <p:pRg st="7" end="7"/>
+                                            </p:txEl>
+                                          </p:spTgt>
+                                        </p:tgtEl>
+                                        <p:attrNameLst>
+                                          <p:attrName>style.visibility</p:attrName>
+                                        </p:attrNameLst>
+                                      </p:cBhvr>
+                                      <p:to>
+                                        <p:strVal val="visible"/>
+                                      </p:to>
+                                    </p:set>
+                                  </p:childTnLst>
+                                </p:cTn>
+                              </p:par>
+                            </p:childTnLst>
+                          </p:cTn>
+                        </p:par>
+                      </p:childTnLst>
+                    </p:cTn>
+                  </p:par>
+                  <p:par>
+                    <p:cTn id="19" fill="hold">
+                      <p:stCondLst>
+                        <p:cond delay="indefinite"/>
+                      </p:stCondLst>
+                      <p:childTnLst>
+                        <p:par>
+                          <p:cTn id="20" fill="hold">
+                            <p:stCondLst>
+                              <p:cond delay="0"/>
+                            </p:stCondLst>
+                            <p:childTnLst>
+                              <p:par>
+                                <p:cTn id="21" presetID="1" presetClass="entr" presetSubtype="0" fill="hold" nodeType="clickEffect">
+                                  <p:stCondLst>
+                                    <p:cond delay="0"/>
+                                  </p:stCondLst>
+                                  <p:childTnLst>
+                                    <p:set>
+                                      <p:cBhvr>
+                                        <p:cTn id="22" dur="1" fill="hold">
+                                          <p:stCondLst>
+                                            <p:cond delay="0"/>
+                                          </p:stCondLst>
+                                        </p:cTn>
+                                        <p:tgtEl>
+                                          <p:spTgt spid="3">
+                                            <p:txEl>
+                                              <p:pRg st="9" end="9"/>
+                                            </p:txEl>
+                                          </p:spTgt>
+                                        </p:tgtEl>
+                                        <p:attrNameLst>
+                                          <p:attrName>style.visibility</p:attrName>
+                                        </p:attrNameLst>
+                                      </p:cBhvr>
+                                      <p:to>
+                                        <p:strVal val="visible"/>
+                                      </p:to>
+                                    </p:set>
+                                  </p:childTnLst>
+                                </p:cTn>
+                              </p:par>
+                            </p:childTnLst>
+                          </p:cTn>
+                        </p:par>
+                      </p:childTnLst>
+                    </p:cTn>
+                  </p:par>
+                </p:childTnLst>
+              </p:cTn>
+              <p:prevCondLst>
+                <p:cond evt="onPrev" delay="0">
+                  <p:tgtEl>
+                    <p:sldTgt/>
+                  </p:tgtEl>
+                </p:cond>
+              </p:prevCondLst>
+              <p:nextCondLst>
+                <p:cond evt="onNext" delay="0">
+                  <p:tgtEl>
+                    <p:sldTgt/>
+                  </p:tgtEl>
+                </p:cond>
+              </p:nextCondLst>
+            </p:seq>
+          </p:childTnLst>
+        </p:cTn>
+      </p:par>
+    </p:tnLst>
+  </p:timing>
 </p:sld>
 </file>
 
@@ -29171,6 +31654,294 @@
   <p:clrMapOvr>
     <a:masterClrMapping/>
   </p:clrMapOvr>
+  <p:timing>
+    <p:tnLst>
+      <p:par>
+        <p:cTn id="1" dur="indefinite" restart="never" nodeType="tmRoot">
+          <p:childTnLst>
+            <p:seq concurrent="1" nextAc="seek">
+              <p:cTn id="2" dur="indefinite" nodeType="mainSeq">
+                <p:childTnLst>
+                  <p:par>
+                    <p:cTn id="3" fill="hold">
+                      <p:stCondLst>
+                        <p:cond delay="indefinite"/>
+                      </p:stCondLst>
+                      <p:childTnLst>
+                        <p:par>
+                          <p:cTn id="4" fill="hold">
+                            <p:stCondLst>
+                              <p:cond delay="0"/>
+                            </p:stCondLst>
+                            <p:childTnLst>
+                              <p:par>
+                                <p:cTn id="5" presetID="1" presetClass="entr" presetSubtype="0" fill="hold" nodeType="clickEffect">
+                                  <p:stCondLst>
+                                    <p:cond delay="0"/>
+                                  </p:stCondLst>
+                                  <p:childTnLst>
+                                    <p:set>
+                                      <p:cBhvr>
+                                        <p:cTn id="6" dur="1" fill="hold">
+                                          <p:stCondLst>
+                                            <p:cond delay="0"/>
+                                          </p:stCondLst>
+                                        </p:cTn>
+                                        <p:tgtEl>
+                                          <p:spTgt spid="3">
+                                            <p:txEl>
+                                              <p:pRg st="1" end="1"/>
+                                            </p:txEl>
+                                          </p:spTgt>
+                                        </p:tgtEl>
+                                        <p:attrNameLst>
+                                          <p:attrName>style.visibility</p:attrName>
+                                        </p:attrNameLst>
+                                      </p:cBhvr>
+                                      <p:to>
+                                        <p:strVal val="visible"/>
+                                      </p:to>
+                                    </p:set>
+                                  </p:childTnLst>
+                                </p:cTn>
+                              </p:par>
+                            </p:childTnLst>
+                          </p:cTn>
+                        </p:par>
+                      </p:childTnLst>
+                    </p:cTn>
+                  </p:par>
+                  <p:par>
+                    <p:cTn id="7" fill="hold">
+                      <p:stCondLst>
+                        <p:cond delay="indefinite"/>
+                      </p:stCondLst>
+                      <p:childTnLst>
+                        <p:par>
+                          <p:cTn id="8" fill="hold">
+                            <p:stCondLst>
+                              <p:cond delay="0"/>
+                            </p:stCondLst>
+                            <p:childTnLst>
+                              <p:par>
+                                <p:cTn id="9" presetID="1" presetClass="entr" presetSubtype="0" fill="hold" nodeType="clickEffect">
+                                  <p:stCondLst>
+                                    <p:cond delay="0"/>
+                                  </p:stCondLst>
+                                  <p:childTnLst>
+                                    <p:set>
+                                      <p:cBhvr>
+                                        <p:cTn id="10" dur="1" fill="hold">
+                                          <p:stCondLst>
+                                            <p:cond delay="0"/>
+                                          </p:stCondLst>
+                                        </p:cTn>
+                                        <p:tgtEl>
+                                          <p:spTgt spid="3">
+                                            <p:txEl>
+                                              <p:pRg st="3" end="3"/>
+                                            </p:txEl>
+                                          </p:spTgt>
+                                        </p:tgtEl>
+                                        <p:attrNameLst>
+                                          <p:attrName>style.visibility</p:attrName>
+                                        </p:attrNameLst>
+                                      </p:cBhvr>
+                                      <p:to>
+                                        <p:strVal val="visible"/>
+                                      </p:to>
+                                    </p:set>
+                                  </p:childTnLst>
+                                </p:cTn>
+                              </p:par>
+                              <p:par>
+                                <p:cTn id="11" presetID="1" presetClass="entr" presetSubtype="0" fill="hold" nodeType="withEffect">
+                                  <p:stCondLst>
+                                    <p:cond delay="0"/>
+                                  </p:stCondLst>
+                                  <p:childTnLst>
+                                    <p:set>
+                                      <p:cBhvr>
+                                        <p:cTn id="12" dur="1" fill="hold">
+                                          <p:stCondLst>
+                                            <p:cond delay="0"/>
+                                          </p:stCondLst>
+                                        </p:cTn>
+                                        <p:tgtEl>
+                                          <p:spTgt spid="3">
+                                            <p:txEl>
+                                              <p:pRg st="4" end="4"/>
+                                            </p:txEl>
+                                          </p:spTgt>
+                                        </p:tgtEl>
+                                        <p:attrNameLst>
+                                          <p:attrName>style.visibility</p:attrName>
+                                        </p:attrNameLst>
+                                      </p:cBhvr>
+                                      <p:to>
+                                        <p:strVal val="visible"/>
+                                      </p:to>
+                                    </p:set>
+                                  </p:childTnLst>
+                                </p:cTn>
+                              </p:par>
+                              <p:par>
+                                <p:cTn id="13" presetID="1" presetClass="entr" presetSubtype="0" fill="hold" nodeType="withEffect">
+                                  <p:stCondLst>
+                                    <p:cond delay="0"/>
+                                  </p:stCondLst>
+                                  <p:childTnLst>
+                                    <p:set>
+                                      <p:cBhvr>
+                                        <p:cTn id="14" dur="1" fill="hold">
+                                          <p:stCondLst>
+                                            <p:cond delay="0"/>
+                                          </p:stCondLst>
+                                        </p:cTn>
+                                        <p:tgtEl>
+                                          <p:spTgt spid="3">
+                                            <p:txEl>
+                                              <p:pRg st="5" end="5"/>
+                                            </p:txEl>
+                                          </p:spTgt>
+                                        </p:tgtEl>
+                                        <p:attrNameLst>
+                                          <p:attrName>style.visibility</p:attrName>
+                                        </p:attrNameLst>
+                                      </p:cBhvr>
+                                      <p:to>
+                                        <p:strVal val="visible"/>
+                                      </p:to>
+                                    </p:set>
+                                  </p:childTnLst>
+                                </p:cTn>
+                              </p:par>
+                            </p:childTnLst>
+                          </p:cTn>
+                        </p:par>
+                      </p:childTnLst>
+                    </p:cTn>
+                  </p:par>
+                  <p:par>
+                    <p:cTn id="15" fill="hold">
+                      <p:stCondLst>
+                        <p:cond delay="indefinite"/>
+                      </p:stCondLst>
+                      <p:childTnLst>
+                        <p:par>
+                          <p:cTn id="16" fill="hold">
+                            <p:stCondLst>
+                              <p:cond delay="0"/>
+                            </p:stCondLst>
+                            <p:childTnLst>
+                              <p:par>
+                                <p:cTn id="17" presetID="1" presetClass="entr" presetSubtype="0" fill="hold" nodeType="clickEffect">
+                                  <p:stCondLst>
+                                    <p:cond delay="0"/>
+                                  </p:stCondLst>
+                                  <p:childTnLst>
+                                    <p:set>
+                                      <p:cBhvr>
+                                        <p:cTn id="18" dur="1" fill="hold">
+                                          <p:stCondLst>
+                                            <p:cond delay="0"/>
+                                          </p:stCondLst>
+                                        </p:cTn>
+                                        <p:tgtEl>
+                                          <p:spTgt spid="3">
+                                            <p:txEl>
+                                              <p:pRg st="7" end="7"/>
+                                            </p:txEl>
+                                          </p:spTgt>
+                                        </p:tgtEl>
+                                        <p:attrNameLst>
+                                          <p:attrName>style.visibility</p:attrName>
+                                        </p:attrNameLst>
+                                      </p:cBhvr>
+                                      <p:to>
+                                        <p:strVal val="visible"/>
+                                      </p:to>
+                                    </p:set>
+                                  </p:childTnLst>
+                                </p:cTn>
+                              </p:par>
+                            </p:childTnLst>
+                          </p:cTn>
+                        </p:par>
+                      </p:childTnLst>
+                    </p:cTn>
+                  </p:par>
+                  <p:par>
+                    <p:cTn id="19" fill="hold">
+                      <p:stCondLst>
+                        <p:cond delay="indefinite"/>
+                      </p:stCondLst>
+                      <p:childTnLst>
+                        <p:par>
+                          <p:cTn id="20" fill="hold">
+                            <p:stCondLst>
+                              <p:cond delay="0"/>
+                            </p:stCondLst>
+                            <p:childTnLst>
+                              <p:par>
+                                <p:cTn id="21" presetID="1" presetClass="entr" presetSubtype="0" fill="hold" nodeType="clickEffect">
+                                  <p:stCondLst>
+                                    <p:cond delay="0"/>
+                                  </p:stCondLst>
+                                  <p:childTnLst>
+                                    <p:set>
+                                      <p:cBhvr>
+                                        <p:cTn id="22" dur="1" fill="hold">
+                                          <p:stCondLst>
+                                            <p:cond delay="0"/>
+                                          </p:stCondLst>
+                                        </p:cTn>
+                                        <p:tgtEl>
+                                          <p:spTgt spid="3">
+                                            <p:txEl>
+                                              <p:pRg st="9" end="9"/>
+                                            </p:txEl>
+                                          </p:spTgt>
+                                        </p:tgtEl>
+                                        <p:attrNameLst>
+                                          <p:attrName>style.visibility</p:attrName>
+                                        </p:attrNameLst>
+                                      </p:cBhvr>
+                                      <p:to>
+                                        <p:strVal val="visible"/>
+                                      </p:to>
+                                    </p:set>
+                                  </p:childTnLst>
+                                </p:cTn>
+                              </p:par>
+                            </p:childTnLst>
+                          </p:cTn>
+                        </p:par>
+                      </p:childTnLst>
+                    </p:cTn>
+                  </p:par>
+                </p:childTnLst>
+              </p:cTn>
+              <p:prevCondLst>
+                <p:cond evt="onPrev" delay="0">
+                  <p:tgtEl>
+                    <p:sldTgt/>
+                  </p:tgtEl>
+                </p:cond>
+              </p:prevCondLst>
+              <p:nextCondLst>
+                <p:cond evt="onNext" delay="0">
+                  <p:tgtEl>
+                    <p:sldTgt/>
+                  </p:tgtEl>
+                </p:cond>
+              </p:nextCondLst>
+            </p:seq>
+          </p:childTnLst>
+        </p:cTn>
+      </p:par>
+    </p:tnLst>
+  </p:timing>
 </p:sld>
 </file>
 

</xml_diff>